<commit_message>
Almost completed project solution part. ToDo: Make Final results part maybe with video.
</commit_message>
<xml_diff>
--- a/Presentation/NMSTU_Presentation.pptx
+++ b/Presentation/NMSTU_Presentation.pptx
@@ -15,9 +15,10 @@
     <p:sldId id="267" r:id="rId9"/>
     <p:sldId id="261" r:id="rId10"/>
     <p:sldId id="270" r:id="rId11"/>
-    <p:sldId id="266" r:id="rId12"/>
-    <p:sldId id="264" r:id="rId13"/>
-    <p:sldId id="265" r:id="rId14"/>
+    <p:sldId id="271" r:id="rId12"/>
+    <p:sldId id="266" r:id="rId13"/>
+    <p:sldId id="264" r:id="rId14"/>
+    <p:sldId id="265" r:id="rId15"/>
   </p:sldIdLst>
   <p:sldSz cx="12192000" cy="6858000"/>
   <p:notesSz cx="6888163" cy="10020300"/>
@@ -3279,7 +3280,7 @@
                 </a:solidFill>
                 <a:latin typeface="Century Gothic" panose="020B0502020202020204" pitchFamily="34" charset="0"/>
               </a:rPr>
-              <a:t>Университет им. Г.И. Носова» </a:t>
+              <a:t>университет им. Г.И. Носова» </a:t>
             </a:r>
           </a:p>
         </p:txBody>
@@ -3726,7 +3727,7 @@
           <a:p>
             <a:pPr algn="ctr"/>
             <a:r>
-              <a:rPr lang="ru-RU" sz="3600" dirty="0" smtClean="0">
+              <a:rPr lang="ru-RU" sz="3600" dirty="0">
                 <a:solidFill>
                   <a:schemeClr val="bg1">
                     <a:lumMod val="95000"/>
@@ -3743,21 +3744,6 @@
               </a:rPr>
               <a:t>Проектное решение драйвера</a:t>
             </a:r>
-            <a:endParaRPr lang="ru-RU" sz="3600" dirty="0">
-              <a:solidFill>
-                <a:schemeClr val="bg1">
-                  <a:lumMod val="95000"/>
-                </a:schemeClr>
-              </a:solidFill>
-              <a:effectLst>
-                <a:outerShdw blurRad="38100" dist="38100" dir="2700000" algn="tl">
-                  <a:srgbClr val="000000">
-                    <a:alpha val="43137"/>
-                  </a:srgbClr>
-                </a:outerShdw>
-              </a:effectLst>
-              <a:latin typeface="Century Gothic" panose="020B0502020202020204" pitchFamily="34" charset="0"/>
-            </a:endParaRPr>
           </a:p>
         </p:txBody>
       </p:sp>
@@ -3805,7 +3791,7 @@
         </p:nvGrpSpPr>
         <p:grpSpPr>
           <a:xfrm>
-            <a:off x="6384761" y="3096158"/>
+            <a:off x="5800453" y="2573774"/>
             <a:ext cx="1321445" cy="1562459"/>
             <a:chOff x="4459057" y="4591624"/>
             <a:chExt cx="1321445" cy="1562459"/>
@@ -3940,7 +3926,7 @@
         </p:nvGrpSpPr>
         <p:grpSpPr>
           <a:xfrm>
-            <a:off x="6384761" y="1224903"/>
+            <a:off x="4579783" y="2580432"/>
             <a:ext cx="1307252" cy="1562459"/>
             <a:chOff x="2008240" y="4591624"/>
             <a:chExt cx="1307252" cy="1562459"/>
@@ -4067,7 +4053,7 @@
         </p:nvGrpSpPr>
         <p:grpSpPr>
           <a:xfrm>
-            <a:off x="292790" y="2578593"/>
+            <a:off x="292790" y="1247377"/>
             <a:ext cx="2103407" cy="2597590"/>
             <a:chOff x="6698461" y="1494327"/>
             <a:chExt cx="1265206" cy="1562459"/>
@@ -4175,7 +4161,7 @@
             <a:p>
               <a:pPr algn="ctr"/>
               <a:r>
-                <a:rPr lang="en-US" sz="2400" dirty="0" smtClean="0">
+                <a:rPr lang="en-US" sz="2400" dirty="0">
                   <a:latin typeface="Century Gothic" panose="020B0502020202020204" pitchFamily="34" charset="0"/>
                 </a:rPr>
                 <a:t>Chip</a:t>
@@ -4184,7 +4170,7 @@
             <a:p>
               <a:pPr algn="ctr"/>
               <a:r>
-                <a:rPr lang="en-US" sz="2400" dirty="0" smtClean="0">
+                <a:rPr lang="en-US" sz="2400" dirty="0">
                   <a:latin typeface="Century Gothic" panose="020B0502020202020204" pitchFamily="34" charset="0"/>
                 </a:rPr>
                 <a:t>Writer</a:t>
@@ -4193,18 +4179,1637 @@
             <a:p>
               <a:pPr algn="ctr"/>
               <a:r>
-                <a:rPr lang="en-US" sz="2400" dirty="0" smtClean="0">
+                <a:rPr lang="en-US" sz="2400" dirty="0">
                   <a:latin typeface="Century Gothic" panose="020B0502020202020204" pitchFamily="34" charset="0"/>
                 </a:rPr>
                 <a:t>Driver</a:t>
               </a:r>
-              <a:endParaRPr lang="en-US" sz="2400" dirty="0">
+            </a:p>
+          </p:txBody>
+        </p:sp>
+      </p:grpSp>
+      <p:sp>
+        <p:nvSpPr>
+          <p:cNvPr id="3" name="Rectangle 2">
+            <a:extLst>
+              <a:ext uri="{FF2B5EF4-FFF2-40B4-BE49-F238E27FC236}">
+                <a16:creationId xmlns:a16="http://schemas.microsoft.com/office/drawing/2014/main" id="{D2DBB5B7-CC96-A62C-2CDE-A7BB0954FCD9}"/>
+              </a:ext>
+            </a:extLst>
+          </p:cNvPr>
+          <p:cNvSpPr/>
+          <p:nvPr/>
+        </p:nvSpPr>
+        <p:spPr>
+          <a:xfrm>
+            <a:off x="4472777" y="1247377"/>
+            <a:ext cx="3076508" cy="687297"/>
+          </a:xfrm>
+          <a:prstGeom prst="rect">
+            <a:avLst/>
+          </a:prstGeom>
+          <a:noFill/>
+          <a:ln w="76200">
+            <a:solidFill>
+              <a:schemeClr val="accent1">
+                <a:lumMod val="50000"/>
+              </a:schemeClr>
+            </a:solidFill>
+          </a:ln>
+        </p:spPr>
+        <p:style>
+          <a:lnRef idx="2">
+            <a:schemeClr val="accent6"/>
+          </a:lnRef>
+          <a:fillRef idx="1">
+            <a:schemeClr val="lt1"/>
+          </a:fillRef>
+          <a:effectRef idx="0">
+            <a:schemeClr val="accent6"/>
+          </a:effectRef>
+          <a:fontRef idx="minor">
+            <a:schemeClr val="dk1"/>
+          </a:fontRef>
+        </p:style>
+        <p:txBody>
+          <a:bodyPr rtlCol="0" anchor="ctr"/>
+          <a:lstStyle/>
+          <a:p>
+            <a:pPr algn="ctr"/>
+            <a:r>
+              <a:rPr lang="en-US" sz="2400" dirty="0">
+                <a:latin typeface="Century Gothic" panose="020B0502020202020204" pitchFamily="34" charset="0"/>
+              </a:rPr>
+              <a:t>void start()</a:t>
+            </a:r>
+          </a:p>
+        </p:txBody>
+      </p:sp>
+      <p:cxnSp>
+        <p:nvCxnSpPr>
+          <p:cNvPr id="6" name="Connector: Elbow 5">
+            <a:extLst>
+              <a:ext uri="{FF2B5EF4-FFF2-40B4-BE49-F238E27FC236}">
+                <a16:creationId xmlns:a16="http://schemas.microsoft.com/office/drawing/2014/main" id="{665BA14E-9F7B-4BB7-3BEB-39821038FC25}"/>
+              </a:ext>
+            </a:extLst>
+          </p:cNvPr>
+          <p:cNvCxnSpPr>
+            <a:cxnSpLocks/>
+            <a:stCxn id="66" idx="3"/>
+            <a:endCxn id="3" idx="1"/>
+          </p:cNvCxnSpPr>
+          <p:nvPr/>
+        </p:nvCxnSpPr>
+        <p:spPr>
+          <a:xfrm flipV="1">
+            <a:off x="2313210" y="1591026"/>
+            <a:ext cx="2159567" cy="955146"/>
+          </a:xfrm>
+          <a:prstGeom prst="bentConnector3">
+            <a:avLst/>
+          </a:prstGeom>
+          <a:ln w="57150">
+            <a:solidFill>
+              <a:schemeClr val="accent1">
+                <a:lumMod val="50000"/>
+              </a:schemeClr>
+            </a:solidFill>
+            <a:tailEnd type="triangle"/>
+          </a:ln>
+        </p:spPr>
+        <p:style>
+          <a:lnRef idx="1">
+            <a:schemeClr val="accent1"/>
+          </a:lnRef>
+          <a:fillRef idx="0">
+            <a:schemeClr val="accent1"/>
+          </a:fillRef>
+          <a:effectRef idx="0">
+            <a:schemeClr val="accent1"/>
+          </a:effectRef>
+          <a:fontRef idx="minor">
+            <a:schemeClr val="tx1"/>
+          </a:fontRef>
+        </p:style>
+      </p:cxnSp>
+      <p:sp>
+        <p:nvSpPr>
+          <p:cNvPr id="13" name="Rectangle 12">
+            <a:extLst>
+              <a:ext uri="{FF2B5EF4-FFF2-40B4-BE49-F238E27FC236}">
+                <a16:creationId xmlns:a16="http://schemas.microsoft.com/office/drawing/2014/main" id="{DD6F9F61-C666-59BF-BE4D-91ED34DF8EF7}"/>
+              </a:ext>
+            </a:extLst>
+          </p:cNvPr>
+          <p:cNvSpPr/>
+          <p:nvPr/>
+        </p:nvSpPr>
+        <p:spPr>
+          <a:xfrm>
+            <a:off x="376493" y="4260381"/>
+            <a:ext cx="2019704" cy="2429466"/>
+          </a:xfrm>
+          <a:prstGeom prst="rect">
+            <a:avLst/>
+          </a:prstGeom>
+          <a:noFill/>
+          <a:ln w="76200">
+            <a:solidFill>
+              <a:schemeClr val="accent1">
+                <a:lumMod val="50000"/>
+              </a:schemeClr>
+            </a:solidFill>
+          </a:ln>
+        </p:spPr>
+        <p:style>
+          <a:lnRef idx="2">
+            <a:schemeClr val="accent6"/>
+          </a:lnRef>
+          <a:fillRef idx="1">
+            <a:schemeClr val="lt1"/>
+          </a:fillRef>
+          <a:effectRef idx="0">
+            <a:schemeClr val="accent6"/>
+          </a:effectRef>
+          <a:fontRef idx="minor">
+            <a:schemeClr val="dk1"/>
+          </a:fontRef>
+        </p:style>
+        <p:txBody>
+          <a:bodyPr rtlCol="0" anchor="ctr"/>
+          <a:lstStyle/>
+          <a:p>
+            <a:pPr algn="ctr"/>
+            <a:endParaRPr lang="en-US" sz="2400" dirty="0">
+              <a:latin typeface="Century Gothic" panose="020B0502020202020204" pitchFamily="34" charset="0"/>
+            </a:endParaRPr>
+          </a:p>
+        </p:txBody>
+      </p:sp>
+      <p:cxnSp>
+        <p:nvCxnSpPr>
+          <p:cNvPr id="15" name="Straight Connector 14">
+            <a:extLst>
+              <a:ext uri="{FF2B5EF4-FFF2-40B4-BE49-F238E27FC236}">
+                <a16:creationId xmlns:a16="http://schemas.microsoft.com/office/drawing/2014/main" id="{7DB0042D-702A-F952-1ACA-E919339BB5E2}"/>
+              </a:ext>
+            </a:extLst>
+          </p:cNvPr>
+          <p:cNvCxnSpPr>
+            <a:cxnSpLocks/>
+            <a:stCxn id="66" idx="2"/>
+          </p:cNvCxnSpPr>
+          <p:nvPr/>
+        </p:nvCxnSpPr>
+        <p:spPr>
+          <a:xfrm>
+            <a:off x="1344851" y="3844967"/>
+            <a:ext cx="0" cy="415414"/>
+          </a:xfrm>
+          <a:prstGeom prst="line">
+            <a:avLst/>
+          </a:prstGeom>
+          <a:ln w="57150">
+            <a:solidFill>
+              <a:schemeClr val="accent1">
+                <a:lumMod val="50000"/>
+              </a:schemeClr>
+            </a:solidFill>
+          </a:ln>
+        </p:spPr>
+        <p:style>
+          <a:lnRef idx="1">
+            <a:schemeClr val="accent1"/>
+          </a:lnRef>
+          <a:fillRef idx="0">
+            <a:schemeClr val="accent1"/>
+          </a:fillRef>
+          <a:effectRef idx="0">
+            <a:schemeClr val="accent1"/>
+          </a:effectRef>
+          <a:fontRef idx="minor">
+            <a:schemeClr val="tx1"/>
+          </a:fontRef>
+        </p:style>
+      </p:cxnSp>
+      <p:sp>
+        <p:nvSpPr>
+          <p:cNvPr id="17" name="Rectangle 16">
+            <a:extLst>
+              <a:ext uri="{FF2B5EF4-FFF2-40B4-BE49-F238E27FC236}">
+                <a16:creationId xmlns:a16="http://schemas.microsoft.com/office/drawing/2014/main" id="{36722387-9728-CADC-55F2-6E6852806B3A}"/>
+              </a:ext>
+            </a:extLst>
+          </p:cNvPr>
+          <p:cNvSpPr/>
+          <p:nvPr/>
+        </p:nvSpPr>
+        <p:spPr>
+          <a:xfrm>
+            <a:off x="4472777" y="2465057"/>
+            <a:ext cx="2649121" cy="1795324"/>
+          </a:xfrm>
+          <a:prstGeom prst="rect">
+            <a:avLst/>
+          </a:prstGeom>
+          <a:noFill/>
+          <a:ln w="76200">
+            <a:solidFill>
+              <a:schemeClr val="accent1">
+                <a:lumMod val="50000"/>
+              </a:schemeClr>
+            </a:solidFill>
+          </a:ln>
+        </p:spPr>
+        <p:style>
+          <a:lnRef idx="2">
+            <a:schemeClr val="accent6"/>
+          </a:lnRef>
+          <a:fillRef idx="1">
+            <a:schemeClr val="lt1"/>
+          </a:fillRef>
+          <a:effectRef idx="0">
+            <a:schemeClr val="accent6"/>
+          </a:effectRef>
+          <a:fontRef idx="minor">
+            <a:schemeClr val="dk1"/>
+          </a:fontRef>
+        </p:style>
+        <p:txBody>
+          <a:bodyPr rtlCol="0" anchor="ctr"/>
+          <a:lstStyle/>
+          <a:p>
+            <a:pPr algn="ctr"/>
+            <a:endParaRPr lang="en-US" sz="2400" dirty="0">
+              <a:latin typeface="Century Gothic" panose="020B0502020202020204" pitchFamily="34" charset="0"/>
+            </a:endParaRPr>
+          </a:p>
+        </p:txBody>
+      </p:sp>
+      <p:cxnSp>
+        <p:nvCxnSpPr>
+          <p:cNvPr id="9" name="Connector: Elbow 8">
+            <a:extLst>
+              <a:ext uri="{FF2B5EF4-FFF2-40B4-BE49-F238E27FC236}">
+                <a16:creationId xmlns:a16="http://schemas.microsoft.com/office/drawing/2014/main" id="{EDEDDA1D-0963-2063-216D-EE45529B0D6A}"/>
+              </a:ext>
+            </a:extLst>
+          </p:cNvPr>
+          <p:cNvCxnSpPr>
+            <a:cxnSpLocks/>
+            <a:endCxn id="17" idx="3"/>
+          </p:cNvCxnSpPr>
+          <p:nvPr/>
+        </p:nvCxnSpPr>
+        <p:spPr>
+          <a:xfrm rot="5400000">
+            <a:off x="6562601" y="2493971"/>
+            <a:ext cx="1428045" cy="309450"/>
+          </a:xfrm>
+          <a:prstGeom prst="bentConnector2">
+            <a:avLst/>
+          </a:prstGeom>
+          <a:ln w="57150">
+            <a:solidFill>
+              <a:schemeClr val="accent1">
+                <a:lumMod val="50000"/>
+              </a:schemeClr>
+            </a:solidFill>
+            <a:tailEnd type="triangle"/>
+          </a:ln>
+        </p:spPr>
+        <p:style>
+          <a:lnRef idx="1">
+            <a:schemeClr val="accent1"/>
+          </a:lnRef>
+          <a:fillRef idx="0">
+            <a:schemeClr val="accent1"/>
+          </a:fillRef>
+          <a:effectRef idx="0">
+            <a:schemeClr val="accent1"/>
+          </a:effectRef>
+          <a:fontRef idx="minor">
+            <a:schemeClr val="tx1"/>
+          </a:fontRef>
+        </p:style>
+      </p:cxnSp>
+      <p:grpSp>
+        <p:nvGrpSpPr>
+          <p:cNvPr id="10" name="Group 9">
+            <a:extLst>
+              <a:ext uri="{FF2B5EF4-FFF2-40B4-BE49-F238E27FC236}">
+                <a16:creationId xmlns:a16="http://schemas.microsoft.com/office/drawing/2014/main" id="{174F165F-6B74-8B21-D614-F22B8ED93655}"/>
+              </a:ext>
+            </a:extLst>
+          </p:cNvPr>
+          <p:cNvGrpSpPr/>
+          <p:nvPr/>
+        </p:nvGrpSpPr>
+        <p:grpSpPr>
+          <a:xfrm>
+            <a:off x="5800453" y="5040211"/>
+            <a:ext cx="1321445" cy="1562459"/>
+            <a:chOff x="4459057" y="4591624"/>
+            <a:chExt cx="1321445" cy="1562459"/>
+          </a:xfrm>
+        </p:grpSpPr>
+        <p:pic>
+          <p:nvPicPr>
+            <p:cNvPr id="11" name="Picture 10">
+              <a:extLst>
+                <a:ext uri="{FF2B5EF4-FFF2-40B4-BE49-F238E27FC236}">
+                  <a16:creationId xmlns:a16="http://schemas.microsoft.com/office/drawing/2014/main" id="{71B9E08F-D60E-5BD8-ED7B-0A1E07A66B46}"/>
+                </a:ext>
+              </a:extLst>
+            </p:cNvPr>
+            <p:cNvPicPr>
+              <a:picLocks noChangeAspect="1"/>
+            </p:cNvPicPr>
+            <p:nvPr/>
+          </p:nvPicPr>
+          <p:blipFill>
+            <a:blip r:embed="rId3">
+              <a:extLst>
+                <a:ext uri="{28A0092B-C50C-407E-A947-70E740481C1C}">
+                  <a14:useLocalDpi xmlns:a14="http://schemas.microsoft.com/office/drawing/2010/main" val="0"/>
+                </a:ext>
+              </a:extLst>
+            </a:blip>
+            <a:stretch>
+              <a:fillRect/>
+            </a:stretch>
+          </p:blipFill>
+          <p:spPr>
+            <a:xfrm>
+              <a:off x="4459057" y="4591624"/>
+              <a:ext cx="1164942" cy="1562459"/>
+            </a:xfrm>
+            <a:prstGeom prst="rect">
+              <a:avLst/>
+            </a:prstGeom>
+          </p:spPr>
+        </p:pic>
+        <p:pic>
+          <p:nvPicPr>
+            <p:cNvPr id="12" name="Picture 11">
+              <a:extLst>
+                <a:ext uri="{FF2B5EF4-FFF2-40B4-BE49-F238E27FC236}">
+                  <a16:creationId xmlns:a16="http://schemas.microsoft.com/office/drawing/2014/main" id="{5F1DE1BB-412A-72D8-26C3-59AF5A340460}"/>
+                </a:ext>
+              </a:extLst>
+            </p:cNvPr>
+            <p:cNvPicPr>
+              <a:picLocks noChangeAspect="1"/>
+            </p:cNvPicPr>
+            <p:nvPr/>
+          </p:nvPicPr>
+          <p:blipFill>
+            <a:blip r:embed="rId4" cstate="print">
+              <a:extLst>
+                <a:ext uri="{28A0092B-C50C-407E-A947-70E740481C1C}">
+                  <a14:useLocalDpi xmlns:a14="http://schemas.microsoft.com/office/drawing/2010/main" val="0"/>
+                </a:ext>
+              </a:extLst>
+            </a:blip>
+            <a:stretch>
+              <a:fillRect/>
+            </a:stretch>
+          </p:blipFill>
+          <p:spPr>
+            <a:xfrm>
+              <a:off x="4615748" y="4727446"/>
+              <a:ext cx="851560" cy="620342"/>
+            </a:xfrm>
+            <a:prstGeom prst="rect">
+              <a:avLst/>
+            </a:prstGeom>
+          </p:spPr>
+        </p:pic>
+        <p:sp>
+          <p:nvSpPr>
+            <p:cNvPr id="14" name="TextBox 13">
+              <a:extLst>
+                <a:ext uri="{FF2B5EF4-FFF2-40B4-BE49-F238E27FC236}">
+                  <a16:creationId xmlns:a16="http://schemas.microsoft.com/office/drawing/2014/main" id="{50955B2F-E30A-5970-6179-749886A80976}"/>
+                </a:ext>
+              </a:extLst>
+            </p:cNvPr>
+            <p:cNvSpPr txBox="1"/>
+            <p:nvPr/>
+          </p:nvSpPr>
+          <p:spPr>
+            <a:xfrm>
+              <a:off x="4506434" y="5395317"/>
+              <a:ext cx="1274068" cy="584775"/>
+            </a:xfrm>
+            <a:prstGeom prst="rect">
+              <a:avLst/>
+            </a:prstGeom>
+            <a:noFill/>
+          </p:spPr>
+          <p:txBody>
+            <a:bodyPr wrap="square" rtlCol="0">
+              <a:spAutoFit/>
+            </a:bodyPr>
+            <a:lstStyle/>
+            <a:p>
+              <a:r>
+                <a:rPr lang="ru-RU" sz="1600" dirty="0">
+                  <a:latin typeface="Century Gothic" panose="020B0502020202020204" pitchFamily="34" charset="0"/>
+                </a:rPr>
+                <a:t>Драйвер </a:t>
+              </a:r>
+            </a:p>
+            <a:p>
+              <a:r>
+                <a:rPr lang="en-US" sz="1600" dirty="0">
+                  <a:latin typeface="Century Gothic" panose="020B0502020202020204" pitchFamily="34" charset="0"/>
+                </a:rPr>
+                <a:t>MATICA</a:t>
+              </a:r>
+              <a:endParaRPr lang="ru-RU" sz="1600" dirty="0">
                 <a:latin typeface="Century Gothic" panose="020B0502020202020204" pitchFamily="34" charset="0"/>
               </a:endParaRPr>
             </a:p>
           </p:txBody>
         </p:sp>
       </p:grpSp>
+      <p:grpSp>
+        <p:nvGrpSpPr>
+          <p:cNvPr id="16" name="Group 15">
+            <a:extLst>
+              <a:ext uri="{FF2B5EF4-FFF2-40B4-BE49-F238E27FC236}">
+                <a16:creationId xmlns:a16="http://schemas.microsoft.com/office/drawing/2014/main" id="{27F89144-EB42-1748-990D-44167EF13F0F}"/>
+              </a:ext>
+            </a:extLst>
+          </p:cNvPr>
+          <p:cNvGrpSpPr/>
+          <p:nvPr/>
+        </p:nvGrpSpPr>
+        <p:grpSpPr>
+          <a:xfrm>
+            <a:off x="4579783" y="5040211"/>
+            <a:ext cx="1307252" cy="1562459"/>
+            <a:chOff x="2008240" y="4591624"/>
+            <a:chExt cx="1307252" cy="1562459"/>
+          </a:xfrm>
+        </p:grpSpPr>
+        <p:pic>
+          <p:nvPicPr>
+            <p:cNvPr id="18" name="Picture 17">
+              <a:extLst>
+                <a:ext uri="{FF2B5EF4-FFF2-40B4-BE49-F238E27FC236}">
+                  <a16:creationId xmlns:a16="http://schemas.microsoft.com/office/drawing/2014/main" id="{0DCF054F-5FED-5FF2-9FC3-80ADCBAB6A50}"/>
+                </a:ext>
+              </a:extLst>
+            </p:cNvPr>
+            <p:cNvPicPr>
+              <a:picLocks noChangeAspect="1"/>
+            </p:cNvPicPr>
+            <p:nvPr/>
+          </p:nvPicPr>
+          <p:blipFill>
+            <a:blip r:embed="rId3">
+              <a:extLst>
+                <a:ext uri="{28A0092B-C50C-407E-A947-70E740481C1C}">
+                  <a14:useLocalDpi xmlns:a14="http://schemas.microsoft.com/office/drawing/2010/main" val="0"/>
+                </a:ext>
+              </a:extLst>
+            </a:blip>
+            <a:stretch>
+              <a:fillRect/>
+            </a:stretch>
+          </p:blipFill>
+          <p:spPr>
+            <a:xfrm>
+              <a:off x="2008240" y="4591624"/>
+              <a:ext cx="1164942" cy="1562459"/>
+            </a:xfrm>
+            <a:prstGeom prst="rect">
+              <a:avLst/>
+            </a:prstGeom>
+          </p:spPr>
+        </p:pic>
+        <p:sp>
+          <p:nvSpPr>
+            <p:cNvPr id="19" name="TextBox 18">
+              <a:extLst>
+                <a:ext uri="{FF2B5EF4-FFF2-40B4-BE49-F238E27FC236}">
+                  <a16:creationId xmlns:a16="http://schemas.microsoft.com/office/drawing/2014/main" id="{51BD5E7E-628D-04E7-26CF-2E38F606AE1B}"/>
+                </a:ext>
+              </a:extLst>
+            </p:cNvPr>
+            <p:cNvSpPr txBox="1"/>
+            <p:nvPr/>
+          </p:nvSpPr>
+          <p:spPr>
+            <a:xfrm>
+              <a:off x="2041424" y="5278921"/>
+              <a:ext cx="1274068" cy="830997"/>
+            </a:xfrm>
+            <a:prstGeom prst="rect">
+              <a:avLst/>
+            </a:prstGeom>
+            <a:noFill/>
+          </p:spPr>
+          <p:txBody>
+            <a:bodyPr wrap="square" rtlCol="0">
+              <a:spAutoFit/>
+            </a:bodyPr>
+            <a:lstStyle/>
+            <a:p>
+              <a:r>
+                <a:rPr lang="ru-RU" sz="1600" dirty="0">
+                  <a:latin typeface="Century Gothic" panose="020B0502020202020204" pitchFamily="34" charset="0"/>
+                </a:rPr>
+                <a:t>Драйвер записи карты</a:t>
+              </a:r>
+              <a:endParaRPr lang="en-US" sz="1600" dirty="0">
+                <a:latin typeface="Century Gothic" panose="020B0502020202020204" pitchFamily="34" charset="0"/>
+              </a:endParaRPr>
+            </a:p>
+          </p:txBody>
+        </p:sp>
+        <p:pic>
+          <p:nvPicPr>
+            <p:cNvPr id="20" name="Picture 19">
+              <a:extLst>
+                <a:ext uri="{FF2B5EF4-FFF2-40B4-BE49-F238E27FC236}">
+                  <a16:creationId xmlns:a16="http://schemas.microsoft.com/office/drawing/2014/main" id="{F808933B-500A-6B76-F11C-92533EB9C316}"/>
+                </a:ext>
+              </a:extLst>
+            </p:cNvPr>
+            <p:cNvPicPr>
+              <a:picLocks noChangeAspect="1"/>
+            </p:cNvPicPr>
+            <p:nvPr/>
+          </p:nvPicPr>
+          <p:blipFill>
+            <a:blip r:embed="rId5" cstate="print">
+              <a:extLst>
+                <a:ext uri="{28A0092B-C50C-407E-A947-70E740481C1C}">
+                  <a14:useLocalDpi xmlns:a14="http://schemas.microsoft.com/office/drawing/2010/main" val="0"/>
+                </a:ext>
+              </a:extLst>
+            </a:blip>
+            <a:stretch>
+              <a:fillRect/>
+            </a:stretch>
+          </p:blipFill>
+          <p:spPr>
+            <a:xfrm>
+              <a:off x="2162261" y="4863507"/>
+              <a:ext cx="728960" cy="436884"/>
+            </a:xfrm>
+            <a:prstGeom prst="rect">
+              <a:avLst/>
+            </a:prstGeom>
+          </p:spPr>
+        </p:pic>
+      </p:grpSp>
+      <p:sp>
+        <p:nvSpPr>
+          <p:cNvPr id="21" name="Rectangle 20">
+            <a:extLst>
+              <a:ext uri="{FF2B5EF4-FFF2-40B4-BE49-F238E27FC236}">
+                <a16:creationId xmlns:a16="http://schemas.microsoft.com/office/drawing/2014/main" id="{6D882293-6FCE-F183-92DE-29101D12E7E4}"/>
+              </a:ext>
+            </a:extLst>
+          </p:cNvPr>
+          <p:cNvSpPr/>
+          <p:nvPr/>
+        </p:nvSpPr>
+        <p:spPr>
+          <a:xfrm>
+            <a:off x="4472777" y="4931494"/>
+            <a:ext cx="2649121" cy="1795324"/>
+          </a:xfrm>
+          <a:prstGeom prst="rect">
+            <a:avLst/>
+          </a:prstGeom>
+          <a:noFill/>
+          <a:ln w="76200">
+            <a:solidFill>
+              <a:schemeClr val="accent1">
+                <a:lumMod val="50000"/>
+              </a:schemeClr>
+            </a:solidFill>
+          </a:ln>
+        </p:spPr>
+        <p:style>
+          <a:lnRef idx="2">
+            <a:schemeClr val="accent6"/>
+          </a:lnRef>
+          <a:fillRef idx="1">
+            <a:schemeClr val="lt1"/>
+          </a:fillRef>
+          <a:effectRef idx="0">
+            <a:schemeClr val="accent6"/>
+          </a:effectRef>
+          <a:fontRef idx="minor">
+            <a:schemeClr val="dk1"/>
+          </a:fontRef>
+        </p:style>
+        <p:txBody>
+          <a:bodyPr rtlCol="0" anchor="ctr"/>
+          <a:lstStyle/>
+          <a:p>
+            <a:pPr algn="ctr"/>
+            <a:endParaRPr lang="en-US" sz="2400" dirty="0">
+              <a:latin typeface="Century Gothic" panose="020B0502020202020204" pitchFamily="34" charset="0"/>
+            </a:endParaRPr>
+          </a:p>
+        </p:txBody>
+      </p:sp>
+      <p:sp>
+        <p:nvSpPr>
+          <p:cNvPr id="22" name="Rectangle 21">
+            <a:extLst>
+              <a:ext uri="{FF2B5EF4-FFF2-40B4-BE49-F238E27FC236}">
+                <a16:creationId xmlns:a16="http://schemas.microsoft.com/office/drawing/2014/main" id="{61A3D88C-AAF5-1B39-E5CB-E24B2371602F}"/>
+              </a:ext>
+            </a:extLst>
+          </p:cNvPr>
+          <p:cNvSpPr/>
+          <p:nvPr/>
+        </p:nvSpPr>
+        <p:spPr>
+          <a:xfrm>
+            <a:off x="5491003" y="4109966"/>
+            <a:ext cx="612668" cy="707886"/>
+          </a:xfrm>
+          <a:prstGeom prst="rect">
+            <a:avLst/>
+          </a:prstGeom>
+        </p:spPr>
+        <p:txBody>
+          <a:bodyPr wrap="none">
+            <a:spAutoFit/>
+          </a:bodyPr>
+          <a:lstStyle/>
+          <a:p>
+            <a:r>
+              <a:rPr lang="ru-RU" sz="4000" dirty="0">
+                <a:latin typeface="Century Gothic" panose="020B0502020202020204" pitchFamily="34" charset="0"/>
+              </a:rPr>
+              <a:t>...</a:t>
+            </a:r>
+          </a:p>
+        </p:txBody>
+      </p:sp>
+      <p:cxnSp>
+        <p:nvCxnSpPr>
+          <p:cNvPr id="25" name="Connector: Elbow 24">
+            <a:extLst>
+              <a:ext uri="{FF2B5EF4-FFF2-40B4-BE49-F238E27FC236}">
+                <a16:creationId xmlns:a16="http://schemas.microsoft.com/office/drawing/2014/main" id="{AEF1CAC0-5E32-2F9B-6AE1-13A76F01F98A}"/>
+              </a:ext>
+            </a:extLst>
+          </p:cNvPr>
+          <p:cNvCxnSpPr>
+            <a:cxnSpLocks/>
+            <a:endCxn id="21" idx="3"/>
+          </p:cNvCxnSpPr>
+          <p:nvPr/>
+        </p:nvCxnSpPr>
+        <p:spPr>
+          <a:xfrm rot="5400000">
+            <a:off x="5329382" y="3727191"/>
+            <a:ext cx="3894482" cy="309449"/>
+          </a:xfrm>
+          <a:prstGeom prst="bentConnector2">
+            <a:avLst/>
+          </a:prstGeom>
+          <a:ln w="57150">
+            <a:solidFill>
+              <a:schemeClr val="accent1">
+                <a:lumMod val="50000"/>
+              </a:schemeClr>
+            </a:solidFill>
+            <a:tailEnd type="triangle"/>
+          </a:ln>
+        </p:spPr>
+        <p:style>
+          <a:lnRef idx="1">
+            <a:schemeClr val="accent1"/>
+          </a:lnRef>
+          <a:fillRef idx="0">
+            <a:schemeClr val="accent1"/>
+          </a:fillRef>
+          <a:effectRef idx="0">
+            <a:schemeClr val="accent1"/>
+          </a:effectRef>
+          <a:fontRef idx="minor">
+            <a:schemeClr val="tx1"/>
+          </a:fontRef>
+        </p:style>
+      </p:cxnSp>
+      <p:cxnSp>
+        <p:nvCxnSpPr>
+          <p:cNvPr id="30" name="Connector: Elbow 29">
+            <a:extLst>
+              <a:ext uri="{FF2B5EF4-FFF2-40B4-BE49-F238E27FC236}">
+                <a16:creationId xmlns:a16="http://schemas.microsoft.com/office/drawing/2014/main" id="{68A9B33A-2192-5E14-6512-C29A0E594CAD}"/>
+              </a:ext>
+            </a:extLst>
+          </p:cNvPr>
+          <p:cNvCxnSpPr>
+            <a:stCxn id="17" idx="1"/>
+            <a:endCxn id="13" idx="3"/>
+          </p:cNvCxnSpPr>
+          <p:nvPr/>
+        </p:nvCxnSpPr>
+        <p:spPr>
+          <a:xfrm rot="10800000" flipV="1">
+            <a:off x="2396197" y="3362718"/>
+            <a:ext cx="2076580" cy="2112395"/>
+          </a:xfrm>
+          <a:prstGeom prst="bentConnector3">
+            <a:avLst/>
+          </a:prstGeom>
+          <a:ln w="57150">
+            <a:solidFill>
+              <a:schemeClr val="accent1">
+                <a:lumMod val="50000"/>
+              </a:schemeClr>
+            </a:solidFill>
+            <a:tailEnd type="triangle"/>
+          </a:ln>
+        </p:spPr>
+        <p:style>
+          <a:lnRef idx="1">
+            <a:schemeClr val="accent1"/>
+          </a:lnRef>
+          <a:fillRef idx="0">
+            <a:schemeClr val="accent1"/>
+          </a:fillRef>
+          <a:effectRef idx="0">
+            <a:schemeClr val="accent1"/>
+          </a:effectRef>
+          <a:fontRef idx="minor">
+            <a:schemeClr val="tx1"/>
+          </a:fontRef>
+        </p:style>
+      </p:cxnSp>
+      <p:cxnSp>
+        <p:nvCxnSpPr>
+          <p:cNvPr id="32" name="Connector: Elbow 31">
+            <a:extLst>
+              <a:ext uri="{FF2B5EF4-FFF2-40B4-BE49-F238E27FC236}">
+                <a16:creationId xmlns:a16="http://schemas.microsoft.com/office/drawing/2014/main" id="{48E1A3F6-D0BA-DC44-1323-235DBF3A7BE2}"/>
+              </a:ext>
+            </a:extLst>
+          </p:cNvPr>
+          <p:cNvCxnSpPr>
+            <a:stCxn id="21" idx="1"/>
+            <a:endCxn id="13" idx="3"/>
+          </p:cNvCxnSpPr>
+          <p:nvPr/>
+        </p:nvCxnSpPr>
+        <p:spPr>
+          <a:xfrm rot="10800000">
+            <a:off x="2396197" y="5475114"/>
+            <a:ext cx="2076580" cy="354042"/>
+          </a:xfrm>
+          <a:prstGeom prst="bentConnector3">
+            <a:avLst/>
+          </a:prstGeom>
+          <a:ln w="57150">
+            <a:solidFill>
+              <a:schemeClr val="accent1">
+                <a:lumMod val="50000"/>
+              </a:schemeClr>
+            </a:solidFill>
+            <a:tailEnd type="triangle"/>
+          </a:ln>
+        </p:spPr>
+        <p:style>
+          <a:lnRef idx="1">
+            <a:schemeClr val="accent1"/>
+          </a:lnRef>
+          <a:fillRef idx="0">
+            <a:schemeClr val="accent1"/>
+          </a:fillRef>
+          <a:effectRef idx="0">
+            <a:schemeClr val="accent1"/>
+          </a:effectRef>
+          <a:fontRef idx="minor">
+            <a:schemeClr val="tx1"/>
+          </a:fontRef>
+        </p:style>
+      </p:cxnSp>
+      <p:sp>
+        <p:nvSpPr>
+          <p:cNvPr id="33" name="TextBox 32">
+            <a:extLst>
+              <a:ext uri="{FF2B5EF4-FFF2-40B4-BE49-F238E27FC236}">
+                <a16:creationId xmlns:a16="http://schemas.microsoft.com/office/drawing/2014/main" id="{C3B6480B-034D-D956-8753-814124182D19}"/>
+              </a:ext>
+            </a:extLst>
+          </p:cNvPr>
+          <p:cNvSpPr txBox="1"/>
+          <p:nvPr/>
+        </p:nvSpPr>
+        <p:spPr>
+          <a:xfrm>
+            <a:off x="424559" y="4747540"/>
+            <a:ext cx="1915909" cy="1477328"/>
+          </a:xfrm>
+          <a:prstGeom prst="rect">
+            <a:avLst/>
+          </a:prstGeom>
+          <a:noFill/>
+        </p:spPr>
+        <p:txBody>
+          <a:bodyPr wrap="none" rtlCol="0">
+            <a:spAutoFit/>
+          </a:bodyPr>
+          <a:lstStyle/>
+          <a:p>
+            <a:pPr marL="285750" indent="-285750">
+              <a:buFont typeface="Calibri" panose="020F0502020204030204" pitchFamily="34" charset="0"/>
+              <a:buChar char="―"/>
+            </a:pPr>
+            <a:r>
+              <a:rPr lang="ru-RU" dirty="0">
+                <a:latin typeface="Century Gothic" panose="020B0502020202020204" pitchFamily="34" charset="0"/>
+              </a:rPr>
+              <a:t>Инстанция 1</a:t>
+            </a:r>
+          </a:p>
+          <a:p>
+            <a:pPr marL="285750" indent="-285750">
+              <a:buFont typeface="Calibri" panose="020F0502020204030204" pitchFamily="34" charset="0"/>
+              <a:buChar char="―"/>
+            </a:pPr>
+            <a:r>
+              <a:rPr lang="ru-RU" dirty="0">
+                <a:latin typeface="Century Gothic" panose="020B0502020202020204" pitchFamily="34" charset="0"/>
+              </a:rPr>
+              <a:t>Инстанция 2</a:t>
+            </a:r>
+          </a:p>
+          <a:p>
+            <a:pPr marL="285750" indent="-285750">
+              <a:buFont typeface="Calibri" panose="020F0502020204030204" pitchFamily="34" charset="0"/>
+              <a:buChar char="―"/>
+            </a:pPr>
+            <a:r>
+              <a:rPr lang="ru-RU" dirty="0">
+                <a:latin typeface="Century Gothic" panose="020B0502020202020204" pitchFamily="34" charset="0"/>
+              </a:rPr>
+              <a:t>Инстанция 3</a:t>
+            </a:r>
+          </a:p>
+          <a:p>
+            <a:pPr marL="285750" indent="-285750">
+              <a:buFont typeface="Calibri" panose="020F0502020204030204" pitchFamily="34" charset="0"/>
+              <a:buChar char="―"/>
+            </a:pPr>
+            <a:r>
+              <a:rPr lang="ru-RU" dirty="0">
+                <a:latin typeface="Century Gothic" panose="020B0502020202020204" pitchFamily="34" charset="0"/>
+              </a:rPr>
+              <a:t>...</a:t>
+            </a:r>
+          </a:p>
+          <a:p>
+            <a:pPr marL="285750" indent="-285750">
+              <a:buFont typeface="Calibri" panose="020F0502020204030204" pitchFamily="34" charset="0"/>
+              <a:buChar char="―"/>
+            </a:pPr>
+            <a:r>
+              <a:rPr lang="ru-RU" dirty="0">
+                <a:latin typeface="Century Gothic" panose="020B0502020202020204" pitchFamily="34" charset="0"/>
+              </a:rPr>
+              <a:t>Инстанция </a:t>
+            </a:r>
+            <a:r>
+              <a:rPr lang="en-US" dirty="0">
+                <a:latin typeface="Century Gothic" panose="020B0502020202020204" pitchFamily="34" charset="0"/>
+              </a:rPr>
+              <a:t>n</a:t>
+            </a:r>
+            <a:endParaRPr lang="ru-RU" dirty="0">
+              <a:latin typeface="Century Gothic" panose="020B0502020202020204" pitchFamily="34" charset="0"/>
+            </a:endParaRPr>
+          </a:p>
+        </p:txBody>
+      </p:sp>
+      <p:grpSp>
+        <p:nvGrpSpPr>
+          <p:cNvPr id="34" name="Group 33">
+            <a:extLst>
+              <a:ext uri="{FF2B5EF4-FFF2-40B4-BE49-F238E27FC236}">
+                <a16:creationId xmlns:a16="http://schemas.microsoft.com/office/drawing/2014/main" id="{54682A32-A9DD-F967-96B2-62025E3241B4}"/>
+              </a:ext>
+            </a:extLst>
+          </p:cNvPr>
+          <p:cNvGrpSpPr/>
+          <p:nvPr/>
+        </p:nvGrpSpPr>
+        <p:grpSpPr>
+          <a:xfrm>
+            <a:off x="9281465" y="1247377"/>
+            <a:ext cx="1307252" cy="1562459"/>
+            <a:chOff x="2008240" y="4591624"/>
+            <a:chExt cx="1307252" cy="1562459"/>
+          </a:xfrm>
+        </p:grpSpPr>
+        <p:pic>
+          <p:nvPicPr>
+            <p:cNvPr id="35" name="Picture 34">
+              <a:extLst>
+                <a:ext uri="{FF2B5EF4-FFF2-40B4-BE49-F238E27FC236}">
+                  <a16:creationId xmlns:a16="http://schemas.microsoft.com/office/drawing/2014/main" id="{A2624531-C3D4-3784-C8FE-B8ADCEE7E1AC}"/>
+                </a:ext>
+              </a:extLst>
+            </p:cNvPr>
+            <p:cNvPicPr>
+              <a:picLocks noChangeAspect="1"/>
+            </p:cNvPicPr>
+            <p:nvPr/>
+          </p:nvPicPr>
+          <p:blipFill>
+            <a:blip r:embed="rId3">
+              <a:extLst>
+                <a:ext uri="{28A0092B-C50C-407E-A947-70E740481C1C}">
+                  <a14:useLocalDpi xmlns:a14="http://schemas.microsoft.com/office/drawing/2010/main" val="0"/>
+                </a:ext>
+              </a:extLst>
+            </a:blip>
+            <a:stretch>
+              <a:fillRect/>
+            </a:stretch>
+          </p:blipFill>
+          <p:spPr>
+            <a:xfrm>
+              <a:off x="2008240" y="4591624"/>
+              <a:ext cx="1164942" cy="1562459"/>
+            </a:xfrm>
+            <a:prstGeom prst="rect">
+              <a:avLst/>
+            </a:prstGeom>
+          </p:spPr>
+        </p:pic>
+        <p:sp>
+          <p:nvSpPr>
+            <p:cNvPr id="36" name="TextBox 35">
+              <a:extLst>
+                <a:ext uri="{FF2B5EF4-FFF2-40B4-BE49-F238E27FC236}">
+                  <a16:creationId xmlns:a16="http://schemas.microsoft.com/office/drawing/2014/main" id="{F9F92963-8ED0-0319-025E-081848589714}"/>
+                </a:ext>
+              </a:extLst>
+            </p:cNvPr>
+            <p:cNvSpPr txBox="1"/>
+            <p:nvPr/>
+          </p:nvSpPr>
+          <p:spPr>
+            <a:xfrm>
+              <a:off x="2041424" y="5278921"/>
+              <a:ext cx="1274068" cy="830997"/>
+            </a:xfrm>
+            <a:prstGeom prst="rect">
+              <a:avLst/>
+            </a:prstGeom>
+            <a:noFill/>
+          </p:spPr>
+          <p:txBody>
+            <a:bodyPr wrap="square" rtlCol="0">
+              <a:spAutoFit/>
+            </a:bodyPr>
+            <a:lstStyle/>
+            <a:p>
+              <a:r>
+                <a:rPr lang="ru-RU" sz="1600" dirty="0">
+                  <a:latin typeface="Century Gothic" panose="020B0502020202020204" pitchFamily="34" charset="0"/>
+                </a:rPr>
+                <a:t>Драйвер записи карты</a:t>
+              </a:r>
+              <a:endParaRPr lang="en-US" sz="1600" dirty="0">
+                <a:latin typeface="Century Gothic" panose="020B0502020202020204" pitchFamily="34" charset="0"/>
+              </a:endParaRPr>
+            </a:p>
+          </p:txBody>
+        </p:sp>
+        <p:pic>
+          <p:nvPicPr>
+            <p:cNvPr id="37" name="Picture 36">
+              <a:extLst>
+                <a:ext uri="{FF2B5EF4-FFF2-40B4-BE49-F238E27FC236}">
+                  <a16:creationId xmlns:a16="http://schemas.microsoft.com/office/drawing/2014/main" id="{A671E914-72CC-A20D-EF52-E349DA051B9F}"/>
+                </a:ext>
+              </a:extLst>
+            </p:cNvPr>
+            <p:cNvPicPr>
+              <a:picLocks noChangeAspect="1"/>
+            </p:cNvPicPr>
+            <p:nvPr/>
+          </p:nvPicPr>
+          <p:blipFill>
+            <a:blip r:embed="rId5" cstate="print">
+              <a:extLst>
+                <a:ext uri="{28A0092B-C50C-407E-A947-70E740481C1C}">
+                  <a14:useLocalDpi xmlns:a14="http://schemas.microsoft.com/office/drawing/2010/main" val="0"/>
+                </a:ext>
+              </a:extLst>
+            </a:blip>
+            <a:stretch>
+              <a:fillRect/>
+            </a:stretch>
+          </p:blipFill>
+          <p:spPr>
+            <a:xfrm>
+              <a:off x="2162261" y="4863507"/>
+              <a:ext cx="728960" cy="436884"/>
+            </a:xfrm>
+            <a:prstGeom prst="rect">
+              <a:avLst/>
+            </a:prstGeom>
+          </p:spPr>
+        </p:pic>
+      </p:grpSp>
+      <p:cxnSp>
+        <p:nvCxnSpPr>
+          <p:cNvPr id="42" name="Connector: Elbow 41">
+            <a:extLst>
+              <a:ext uri="{FF2B5EF4-FFF2-40B4-BE49-F238E27FC236}">
+                <a16:creationId xmlns:a16="http://schemas.microsoft.com/office/drawing/2014/main" id="{4922687F-90AF-8432-B979-A75D270D25E9}"/>
+              </a:ext>
+            </a:extLst>
+          </p:cNvPr>
+          <p:cNvCxnSpPr>
+            <a:stCxn id="3" idx="3"/>
+            <a:endCxn id="35" idx="1"/>
+          </p:cNvCxnSpPr>
+          <p:nvPr/>
+        </p:nvCxnSpPr>
+        <p:spPr>
+          <a:xfrm>
+            <a:off x="7549285" y="1591026"/>
+            <a:ext cx="1732180" cy="437581"/>
+          </a:xfrm>
+          <a:prstGeom prst="bentConnector3">
+            <a:avLst/>
+          </a:prstGeom>
+          <a:ln w="57150">
+            <a:solidFill>
+              <a:schemeClr val="accent1">
+                <a:lumMod val="50000"/>
+              </a:schemeClr>
+            </a:solidFill>
+            <a:tailEnd type="triangle"/>
+          </a:ln>
+        </p:spPr>
+        <p:style>
+          <a:lnRef idx="1">
+            <a:schemeClr val="accent1"/>
+          </a:lnRef>
+          <a:fillRef idx="0">
+            <a:schemeClr val="accent1"/>
+          </a:fillRef>
+          <a:effectRef idx="0">
+            <a:schemeClr val="accent1"/>
+          </a:effectRef>
+          <a:fontRef idx="minor">
+            <a:schemeClr val="tx1"/>
+          </a:fontRef>
+        </p:style>
+      </p:cxnSp>
+      <p:sp>
+        <p:nvSpPr>
+          <p:cNvPr id="46" name="Rectangle 45">
+            <a:extLst>
+              <a:ext uri="{FF2B5EF4-FFF2-40B4-BE49-F238E27FC236}">
+                <a16:creationId xmlns:a16="http://schemas.microsoft.com/office/drawing/2014/main" id="{E2C17612-BE3E-859B-8189-5BEADD647A94}"/>
+              </a:ext>
+            </a:extLst>
+          </p:cNvPr>
+          <p:cNvSpPr/>
+          <p:nvPr/>
+        </p:nvSpPr>
+        <p:spPr>
+          <a:xfrm>
+            <a:off x="8253446" y="3153485"/>
+            <a:ext cx="3220980" cy="687297"/>
+          </a:xfrm>
+          <a:prstGeom prst="rect">
+            <a:avLst/>
+          </a:prstGeom>
+          <a:noFill/>
+          <a:ln w="76200">
+            <a:solidFill>
+              <a:schemeClr val="accent1">
+                <a:lumMod val="50000"/>
+              </a:schemeClr>
+            </a:solidFill>
+          </a:ln>
+        </p:spPr>
+        <p:style>
+          <a:lnRef idx="2">
+            <a:schemeClr val="accent6"/>
+          </a:lnRef>
+          <a:fillRef idx="1">
+            <a:schemeClr val="lt1"/>
+          </a:fillRef>
+          <a:effectRef idx="0">
+            <a:schemeClr val="accent6"/>
+          </a:effectRef>
+          <a:fontRef idx="minor">
+            <a:schemeClr val="dk1"/>
+          </a:fontRef>
+        </p:style>
+        <p:txBody>
+          <a:bodyPr rtlCol="0" anchor="ctr"/>
+          <a:lstStyle/>
+          <a:p>
+            <a:pPr algn="ctr"/>
+            <a:r>
+              <a:rPr lang="en-US" sz="1600" dirty="0">
+                <a:latin typeface="Century Gothic" panose="020B0502020202020204" pitchFamily="34" charset="0"/>
+              </a:rPr>
+              <a:t>void </a:t>
+            </a:r>
+            <a:r>
+              <a:rPr lang="ru-RU" sz="1600" dirty="0">
+                <a:latin typeface="Century Gothic" panose="020B0502020202020204" pitchFamily="34" charset="0"/>
+              </a:rPr>
+              <a:t>*запуск обработки*</a:t>
+            </a:r>
+            <a:r>
+              <a:rPr lang="en-US" sz="1600" dirty="0">
+                <a:latin typeface="Century Gothic" panose="020B0502020202020204" pitchFamily="34" charset="0"/>
+              </a:rPr>
+              <a:t>()</a:t>
+            </a:r>
+          </a:p>
+        </p:txBody>
+      </p:sp>
+      <p:cxnSp>
+        <p:nvCxnSpPr>
+          <p:cNvPr id="48" name="Straight Arrow Connector 47">
+            <a:extLst>
+              <a:ext uri="{FF2B5EF4-FFF2-40B4-BE49-F238E27FC236}">
+                <a16:creationId xmlns:a16="http://schemas.microsoft.com/office/drawing/2014/main" id="{06CECCF8-17CE-1307-D767-823A1F33A9C0}"/>
+              </a:ext>
+            </a:extLst>
+          </p:cNvPr>
+          <p:cNvCxnSpPr>
+            <a:stCxn id="35" idx="2"/>
+            <a:endCxn id="46" idx="0"/>
+          </p:cNvCxnSpPr>
+          <p:nvPr/>
+        </p:nvCxnSpPr>
+        <p:spPr>
+          <a:xfrm>
+            <a:off x="9863936" y="2809836"/>
+            <a:ext cx="0" cy="343649"/>
+          </a:xfrm>
+          <a:prstGeom prst="straightConnector1">
+            <a:avLst/>
+          </a:prstGeom>
+          <a:ln w="57150">
+            <a:solidFill>
+              <a:schemeClr val="accent1">
+                <a:lumMod val="50000"/>
+              </a:schemeClr>
+            </a:solidFill>
+            <a:tailEnd type="triangle"/>
+          </a:ln>
+        </p:spPr>
+        <p:style>
+          <a:lnRef idx="1">
+            <a:schemeClr val="accent1"/>
+          </a:lnRef>
+          <a:fillRef idx="0">
+            <a:schemeClr val="accent1"/>
+          </a:fillRef>
+          <a:effectRef idx="0">
+            <a:schemeClr val="accent1"/>
+          </a:effectRef>
+          <a:fontRef idx="minor">
+            <a:schemeClr val="tx1"/>
+          </a:fontRef>
+        </p:style>
+      </p:cxnSp>
+      <p:grpSp>
+        <p:nvGrpSpPr>
+          <p:cNvPr id="52" name="Group 51">
+            <a:extLst>
+              <a:ext uri="{FF2B5EF4-FFF2-40B4-BE49-F238E27FC236}">
+                <a16:creationId xmlns:a16="http://schemas.microsoft.com/office/drawing/2014/main" id="{649FA4AF-0F90-C22C-84C5-FCFA2ECFFF93}"/>
+              </a:ext>
+            </a:extLst>
+          </p:cNvPr>
+          <p:cNvGrpSpPr/>
+          <p:nvPr/>
+        </p:nvGrpSpPr>
+        <p:grpSpPr>
+          <a:xfrm rot="16200000">
+            <a:off x="8313903" y="4147410"/>
+            <a:ext cx="1157836" cy="787499"/>
+            <a:chOff x="9590966" y="4185349"/>
+            <a:chExt cx="1157836" cy="787499"/>
+          </a:xfrm>
+        </p:grpSpPr>
+        <p:pic>
+          <p:nvPicPr>
+            <p:cNvPr id="50" name="Picture 49">
+              <a:extLst>
+                <a:ext uri="{FF2B5EF4-FFF2-40B4-BE49-F238E27FC236}">
+                  <a16:creationId xmlns:a16="http://schemas.microsoft.com/office/drawing/2014/main" id="{63FEF118-E6B2-397F-267C-3B4E5050F3AE}"/>
+                </a:ext>
+              </a:extLst>
+            </p:cNvPr>
+            <p:cNvPicPr>
+              <a:picLocks noChangeAspect="1"/>
+            </p:cNvPicPr>
+            <p:nvPr/>
+          </p:nvPicPr>
+          <p:blipFill>
+            <a:blip r:embed="rId6"/>
+            <a:stretch>
+              <a:fillRect/>
+            </a:stretch>
+          </p:blipFill>
+          <p:spPr>
+            <a:xfrm rot="10800000">
+              <a:off x="9590966" y="4185349"/>
+              <a:ext cx="1146960" cy="342224"/>
+            </a:xfrm>
+            <a:prstGeom prst="rect">
+              <a:avLst/>
+            </a:prstGeom>
+          </p:spPr>
+        </p:pic>
+        <p:pic>
+          <p:nvPicPr>
+            <p:cNvPr id="51" name="Picture 50">
+              <a:extLst>
+                <a:ext uri="{FF2B5EF4-FFF2-40B4-BE49-F238E27FC236}">
+                  <a16:creationId xmlns:a16="http://schemas.microsoft.com/office/drawing/2014/main" id="{98D745B3-5879-29AA-C160-DD7A18A8813E}"/>
+                </a:ext>
+              </a:extLst>
+            </p:cNvPr>
+            <p:cNvPicPr>
+              <a:picLocks noChangeAspect="1"/>
+            </p:cNvPicPr>
+            <p:nvPr/>
+          </p:nvPicPr>
+          <p:blipFill>
+            <a:blip r:embed="rId6"/>
+            <a:stretch>
+              <a:fillRect/>
+            </a:stretch>
+          </p:blipFill>
+          <p:spPr>
+            <a:xfrm rot="10800000" flipH="1">
+              <a:off x="9601840" y="4630624"/>
+              <a:ext cx="1146962" cy="342224"/>
+            </a:xfrm>
+            <a:prstGeom prst="rect">
+              <a:avLst/>
+            </a:prstGeom>
+          </p:spPr>
+        </p:pic>
+      </p:grpSp>
+      <p:grpSp>
+        <p:nvGrpSpPr>
+          <p:cNvPr id="57" name="Group 56">
+            <a:extLst>
+              <a:ext uri="{FF2B5EF4-FFF2-40B4-BE49-F238E27FC236}">
+                <a16:creationId xmlns:a16="http://schemas.microsoft.com/office/drawing/2014/main" id="{B90DA8FF-C5E6-20FC-88D2-D9B67F54E9C0}"/>
+              </a:ext>
+            </a:extLst>
+          </p:cNvPr>
+          <p:cNvGrpSpPr/>
+          <p:nvPr/>
+        </p:nvGrpSpPr>
+        <p:grpSpPr>
+          <a:xfrm>
+            <a:off x="10445996" y="5206735"/>
+            <a:ext cx="1321445" cy="1562459"/>
+            <a:chOff x="4459057" y="4591624"/>
+            <a:chExt cx="1321445" cy="1562459"/>
+          </a:xfrm>
+        </p:grpSpPr>
+        <p:pic>
+          <p:nvPicPr>
+            <p:cNvPr id="58" name="Picture 57">
+              <a:extLst>
+                <a:ext uri="{FF2B5EF4-FFF2-40B4-BE49-F238E27FC236}">
+                  <a16:creationId xmlns:a16="http://schemas.microsoft.com/office/drawing/2014/main" id="{19B3A492-36DD-D088-B4B0-7BDCBF47A1BE}"/>
+                </a:ext>
+              </a:extLst>
+            </p:cNvPr>
+            <p:cNvPicPr>
+              <a:picLocks noChangeAspect="1"/>
+            </p:cNvPicPr>
+            <p:nvPr/>
+          </p:nvPicPr>
+          <p:blipFill>
+            <a:blip r:embed="rId3">
+              <a:extLst>
+                <a:ext uri="{28A0092B-C50C-407E-A947-70E740481C1C}">
+                  <a14:useLocalDpi xmlns:a14="http://schemas.microsoft.com/office/drawing/2010/main" val="0"/>
+                </a:ext>
+              </a:extLst>
+            </a:blip>
+            <a:stretch>
+              <a:fillRect/>
+            </a:stretch>
+          </p:blipFill>
+          <p:spPr>
+            <a:xfrm>
+              <a:off x="4459057" y="4591624"/>
+              <a:ext cx="1164942" cy="1562459"/>
+            </a:xfrm>
+            <a:prstGeom prst="rect">
+              <a:avLst/>
+            </a:prstGeom>
+          </p:spPr>
+        </p:pic>
+        <p:pic>
+          <p:nvPicPr>
+            <p:cNvPr id="59" name="Picture 58">
+              <a:extLst>
+                <a:ext uri="{FF2B5EF4-FFF2-40B4-BE49-F238E27FC236}">
+                  <a16:creationId xmlns:a16="http://schemas.microsoft.com/office/drawing/2014/main" id="{B9E3EB73-960C-743D-AB94-13B90E421EB5}"/>
+                </a:ext>
+              </a:extLst>
+            </p:cNvPr>
+            <p:cNvPicPr>
+              <a:picLocks noChangeAspect="1"/>
+            </p:cNvPicPr>
+            <p:nvPr/>
+          </p:nvPicPr>
+          <p:blipFill>
+            <a:blip r:embed="rId4" cstate="print">
+              <a:extLst>
+                <a:ext uri="{28A0092B-C50C-407E-A947-70E740481C1C}">
+                  <a14:useLocalDpi xmlns:a14="http://schemas.microsoft.com/office/drawing/2010/main" val="0"/>
+                </a:ext>
+              </a:extLst>
+            </a:blip>
+            <a:stretch>
+              <a:fillRect/>
+            </a:stretch>
+          </p:blipFill>
+          <p:spPr>
+            <a:xfrm>
+              <a:off x="4615748" y="4727446"/>
+              <a:ext cx="851560" cy="620342"/>
+            </a:xfrm>
+            <a:prstGeom prst="rect">
+              <a:avLst/>
+            </a:prstGeom>
+          </p:spPr>
+        </p:pic>
+        <p:sp>
+          <p:nvSpPr>
+            <p:cNvPr id="60" name="TextBox 59">
+              <a:extLst>
+                <a:ext uri="{FF2B5EF4-FFF2-40B4-BE49-F238E27FC236}">
+                  <a16:creationId xmlns:a16="http://schemas.microsoft.com/office/drawing/2014/main" id="{89C8976F-C4BD-0A23-A44A-BE5D8C0CAF4B}"/>
+                </a:ext>
+              </a:extLst>
+            </p:cNvPr>
+            <p:cNvSpPr txBox="1"/>
+            <p:nvPr/>
+          </p:nvSpPr>
+          <p:spPr>
+            <a:xfrm>
+              <a:off x="4506434" y="5395317"/>
+              <a:ext cx="1274068" cy="584775"/>
+            </a:xfrm>
+            <a:prstGeom prst="rect">
+              <a:avLst/>
+            </a:prstGeom>
+            <a:noFill/>
+          </p:spPr>
+          <p:txBody>
+            <a:bodyPr wrap="square" rtlCol="0">
+              <a:spAutoFit/>
+            </a:bodyPr>
+            <a:lstStyle/>
+            <a:p>
+              <a:r>
+                <a:rPr lang="ru-RU" sz="1600" dirty="0">
+                  <a:latin typeface="Century Gothic" panose="020B0502020202020204" pitchFamily="34" charset="0"/>
+                </a:rPr>
+                <a:t>Драйвер </a:t>
+              </a:r>
+            </a:p>
+            <a:p>
+              <a:r>
+                <a:rPr lang="en-US" sz="1600" dirty="0">
+                  <a:latin typeface="Century Gothic" panose="020B0502020202020204" pitchFamily="34" charset="0"/>
+                </a:rPr>
+                <a:t>MATICA</a:t>
+              </a:r>
+              <a:endParaRPr lang="ru-RU" sz="1600" dirty="0">
+                <a:latin typeface="Century Gothic" panose="020B0502020202020204" pitchFamily="34" charset="0"/>
+              </a:endParaRPr>
+            </a:p>
+          </p:txBody>
+        </p:sp>
+      </p:grpSp>
+      <p:sp>
+        <p:nvSpPr>
+          <p:cNvPr id="69" name="Rectangle 68">
+            <a:extLst>
+              <a:ext uri="{FF2B5EF4-FFF2-40B4-BE49-F238E27FC236}">
+                <a16:creationId xmlns:a16="http://schemas.microsoft.com/office/drawing/2014/main" id="{87103D2C-56FA-FF35-0D49-0261FC1828FE}"/>
+              </a:ext>
+            </a:extLst>
+          </p:cNvPr>
+          <p:cNvSpPr/>
+          <p:nvPr/>
+        </p:nvSpPr>
+        <p:spPr>
+          <a:xfrm>
+            <a:off x="7861714" y="5230663"/>
+            <a:ext cx="2019704" cy="1514605"/>
+          </a:xfrm>
+          <a:prstGeom prst="rect">
+            <a:avLst/>
+          </a:prstGeom>
+          <a:noFill/>
+          <a:ln w="76200">
+            <a:solidFill>
+              <a:schemeClr val="accent1">
+                <a:lumMod val="50000"/>
+              </a:schemeClr>
+            </a:solidFill>
+          </a:ln>
+        </p:spPr>
+        <p:style>
+          <a:lnRef idx="2">
+            <a:schemeClr val="accent6"/>
+          </a:lnRef>
+          <a:fillRef idx="1">
+            <a:schemeClr val="lt1"/>
+          </a:fillRef>
+          <a:effectRef idx="0">
+            <a:schemeClr val="accent6"/>
+          </a:effectRef>
+          <a:fontRef idx="minor">
+            <a:schemeClr val="dk1"/>
+          </a:fontRef>
+        </p:style>
+        <p:txBody>
+          <a:bodyPr rtlCol="0" anchor="ctr"/>
+          <a:lstStyle/>
+          <a:p>
+            <a:pPr algn="ctr"/>
+            <a:endParaRPr lang="en-US" sz="2400" dirty="0">
+              <a:latin typeface="Century Gothic" panose="020B0502020202020204" pitchFamily="34" charset="0"/>
+            </a:endParaRPr>
+          </a:p>
+        </p:txBody>
+      </p:sp>
+      <p:cxnSp>
+        <p:nvCxnSpPr>
+          <p:cNvPr id="71" name="Straight Connector 70">
+            <a:extLst>
+              <a:ext uri="{FF2B5EF4-FFF2-40B4-BE49-F238E27FC236}">
+                <a16:creationId xmlns:a16="http://schemas.microsoft.com/office/drawing/2014/main" id="{4DBC5E99-D2CB-2F7A-BC75-5AE76C9A43D9}"/>
+              </a:ext>
+            </a:extLst>
+          </p:cNvPr>
+          <p:cNvCxnSpPr>
+            <a:stCxn id="58" idx="1"/>
+            <a:endCxn id="69" idx="3"/>
+          </p:cNvCxnSpPr>
+          <p:nvPr/>
+        </p:nvCxnSpPr>
+        <p:spPr>
+          <a:xfrm flipH="1">
+            <a:off x="9881418" y="5987965"/>
+            <a:ext cx="564578" cy="1"/>
+          </a:xfrm>
+          <a:prstGeom prst="line">
+            <a:avLst/>
+          </a:prstGeom>
+          <a:ln w="57150">
+            <a:solidFill>
+              <a:schemeClr val="accent1">
+                <a:lumMod val="50000"/>
+              </a:schemeClr>
+            </a:solidFill>
+          </a:ln>
+        </p:spPr>
+        <p:style>
+          <a:lnRef idx="1">
+            <a:schemeClr val="accent1"/>
+          </a:lnRef>
+          <a:fillRef idx="0">
+            <a:schemeClr val="accent1"/>
+          </a:fillRef>
+          <a:effectRef idx="0">
+            <a:schemeClr val="accent1"/>
+          </a:effectRef>
+          <a:fontRef idx="minor">
+            <a:schemeClr val="tx1"/>
+          </a:fontRef>
+        </p:style>
+      </p:cxnSp>
+      <p:sp>
+        <p:nvSpPr>
+          <p:cNvPr id="72" name="TextBox 71">
+            <a:extLst>
+              <a:ext uri="{FF2B5EF4-FFF2-40B4-BE49-F238E27FC236}">
+                <a16:creationId xmlns:a16="http://schemas.microsoft.com/office/drawing/2014/main" id="{B72CBFD0-9F6F-4FEE-4E59-E31832B8279C}"/>
+              </a:ext>
+            </a:extLst>
+          </p:cNvPr>
+          <p:cNvSpPr txBox="1"/>
+          <p:nvPr/>
+        </p:nvSpPr>
+        <p:spPr>
+          <a:xfrm>
+            <a:off x="7861514" y="5449355"/>
+            <a:ext cx="2020105" cy="1077218"/>
+          </a:xfrm>
+          <a:prstGeom prst="rect">
+            <a:avLst/>
+          </a:prstGeom>
+          <a:noFill/>
+        </p:spPr>
+        <p:txBody>
+          <a:bodyPr wrap="none" rtlCol="0">
+            <a:spAutoFit/>
+          </a:bodyPr>
+          <a:lstStyle/>
+          <a:p>
+            <a:pPr marL="285750" indent="-285750">
+              <a:buFont typeface="Calibri" panose="020F0502020204030204" pitchFamily="34" charset="0"/>
+              <a:buChar char="―"/>
+            </a:pPr>
+            <a:r>
+              <a:rPr lang="en-US" sz="1600" dirty="0">
+                <a:latin typeface="Century Gothic" panose="020B0502020202020204" pitchFamily="34" charset="0"/>
+              </a:rPr>
+              <a:t>Send()</a:t>
+            </a:r>
+            <a:endParaRPr lang="ru-RU" sz="1600" dirty="0">
+              <a:latin typeface="Century Gothic" panose="020B0502020202020204" pitchFamily="34" charset="0"/>
+            </a:endParaRPr>
+          </a:p>
+          <a:p>
+            <a:pPr marL="285750" indent="-285750">
+              <a:buFont typeface="Calibri" panose="020F0502020204030204" pitchFamily="34" charset="0"/>
+              <a:buChar char="―"/>
+            </a:pPr>
+            <a:r>
+              <a:rPr lang="en-US" sz="1600" dirty="0" err="1">
+                <a:latin typeface="Century Gothic" panose="020B0502020202020204" pitchFamily="34" charset="0"/>
+              </a:rPr>
+              <a:t>CardConnect</a:t>
+            </a:r>
+            <a:r>
+              <a:rPr lang="en-US" sz="1600" dirty="0">
+                <a:latin typeface="Century Gothic" panose="020B0502020202020204" pitchFamily="34" charset="0"/>
+              </a:rPr>
+              <a:t>()</a:t>
+            </a:r>
+          </a:p>
+          <a:p>
+            <a:pPr marL="285750" indent="-285750">
+              <a:buFont typeface="Calibri" panose="020F0502020204030204" pitchFamily="34" charset="0"/>
+              <a:buChar char="―"/>
+            </a:pPr>
+            <a:r>
+              <a:rPr lang="en-US" sz="1600" dirty="0" err="1">
+                <a:latin typeface="Century Gothic" panose="020B0502020202020204" pitchFamily="34" charset="0"/>
+              </a:rPr>
+              <a:t>CardClose</a:t>
+            </a:r>
+            <a:r>
+              <a:rPr lang="en-US" sz="1600" dirty="0">
+                <a:latin typeface="Century Gothic" panose="020B0502020202020204" pitchFamily="34" charset="0"/>
+              </a:rPr>
+              <a:t>()</a:t>
+            </a:r>
+            <a:endParaRPr lang="ru-RU" sz="1600" dirty="0">
+              <a:latin typeface="Century Gothic" panose="020B0502020202020204" pitchFamily="34" charset="0"/>
+            </a:endParaRPr>
+          </a:p>
+          <a:p>
+            <a:pPr marL="285750" indent="-285750">
+              <a:buFont typeface="Calibri" panose="020F0502020204030204" pitchFamily="34" charset="0"/>
+              <a:buChar char="―"/>
+            </a:pPr>
+            <a:r>
+              <a:rPr lang="ru-RU" sz="1600" dirty="0">
+                <a:latin typeface="Century Gothic" panose="020B0502020202020204" pitchFamily="34" charset="0"/>
+              </a:rPr>
+              <a:t>...</a:t>
+            </a:r>
+          </a:p>
+        </p:txBody>
+      </p:sp>
     </p:spTree>
     <p:extLst>
       <p:ext uri="{BB962C8B-B14F-4D97-AF65-F5344CB8AC3E}">
@@ -4215,13 +5820,6 @@
   <p:clrMapOvr>
     <a:masterClrMapping/>
   </p:clrMapOvr>
-  <p:timing>
-    <p:tnLst>
-      <p:par>
-        <p:cTn id="1" dur="indefinite" restart="never" nodeType="tmRoot"/>
-      </p:par>
-    </p:tnLst>
-  </p:timing>
 </p:sld>
 </file>
 
@@ -4230,7 +5828,13 @@
   <p:cSld>
     <p:spTree>
       <p:nvGrpSpPr>
-        <p:cNvPr id="1" name=""/>
+        <p:cNvPr id="1" name="">
+          <a:extLst>
+            <a:ext uri="{FF2B5EF4-FFF2-40B4-BE49-F238E27FC236}">
+              <a16:creationId xmlns:a16="http://schemas.microsoft.com/office/drawing/2014/main" id="{0BDD2122-D42B-935E-28E6-4C6CC005CCC8}"/>
+            </a:ext>
+          </a:extLst>
+        </p:cNvPr>
         <p:cNvGrpSpPr/>
         <p:nvPr/>
       </p:nvGrpSpPr>
@@ -4244,7 +5848,13 @@
       </p:grpSpPr>
       <p:pic>
         <p:nvPicPr>
-          <p:cNvPr id="2" name="Picture 2" descr="C:\Users\Андрей\Desktop\1\Безымянный-1.png"/>
+          <p:cNvPr id="2" name="Picture 2" descr="C:\Users\Андрей\Desktop\1\Безымянный-1.png">
+            <a:extLst>
+              <a:ext uri="{FF2B5EF4-FFF2-40B4-BE49-F238E27FC236}">
+                <a16:creationId xmlns:a16="http://schemas.microsoft.com/office/drawing/2014/main" id="{04BE2A33-FFFE-25FD-EEAD-6F1C95FFC843}"/>
+              </a:ext>
+            </a:extLst>
+          </p:cNvPr>
           <p:cNvPicPr>
             <a:picLocks noChangeAspect="1" noChangeArrowheads="1"/>
           </p:cNvPicPr>
@@ -4298,45 +5908,19 @@
       </p:pic>
       <p:sp>
         <p:nvSpPr>
-          <p:cNvPr id="4" name="Прямоугольник 3"/>
-          <p:cNvSpPr/>
+          <p:cNvPr id="5" name="TextBox 4">
+            <a:extLst>
+              <a:ext uri="{FF2B5EF4-FFF2-40B4-BE49-F238E27FC236}">
+                <a16:creationId xmlns:a16="http://schemas.microsoft.com/office/drawing/2014/main" id="{1B8006EA-A848-1E9A-CF42-BD3FF694A29A}"/>
+              </a:ext>
+            </a:extLst>
+          </p:cNvPr>
+          <p:cNvSpPr txBox="1"/>
           <p:nvPr/>
         </p:nvSpPr>
         <p:spPr>
           <a:xfrm>
-            <a:off x="354843" y="1187299"/>
-            <a:ext cx="11600596" cy="495457"/>
-          </a:xfrm>
-          <a:prstGeom prst="rect">
-            <a:avLst/>
-          </a:prstGeom>
-        </p:spPr>
-        <p:txBody>
-          <a:bodyPr wrap="square">
-            <a:spAutoFit/>
-          </a:bodyPr>
-          <a:lstStyle/>
-          <a:p>
-            <a:pPr algn="just">
-              <a:lnSpc>
-                <a:spcPct val="150000"/>
-              </a:lnSpc>
-            </a:pPr>
-            <a:endParaRPr lang="en-US" sz="2000" dirty="0">
-              <a:latin typeface="Century Gothic" panose="020B0502020202020204" pitchFamily="34" charset="0"/>
-            </a:endParaRPr>
-          </a:p>
-        </p:txBody>
-      </p:sp>
-      <p:sp>
-        <p:nvSpPr>
-          <p:cNvPr id="5" name="TextBox 4"/>
-          <p:cNvSpPr txBox="1"/>
-          <p:nvPr/>
-        </p:nvSpPr>
-        <p:spPr>
-          <a:xfrm>
-            <a:off x="3534770" y="450376"/>
+            <a:off x="2906973" y="436728"/>
             <a:ext cx="184731" cy="369332"/>
           </a:xfrm>
           <a:prstGeom prst="rect">
@@ -4356,14 +5940,20 @@
       </p:sp>
       <p:sp>
         <p:nvSpPr>
-          <p:cNvPr id="7" name="TextBox 6"/>
+          <p:cNvPr id="7" name="TextBox 6">
+            <a:extLst>
+              <a:ext uri="{FF2B5EF4-FFF2-40B4-BE49-F238E27FC236}">
+                <a16:creationId xmlns:a16="http://schemas.microsoft.com/office/drawing/2014/main" id="{F6F7F2C8-A6E1-CE8C-6B39-FFD9061FA3CF}"/>
+              </a:ext>
+            </a:extLst>
+          </p:cNvPr>
           <p:cNvSpPr txBox="1"/>
           <p:nvPr/>
         </p:nvSpPr>
         <p:spPr>
           <a:xfrm>
-            <a:off x="2983615" y="82785"/>
-            <a:ext cx="6224781" cy="707886"/>
+            <a:off x="2396197" y="168153"/>
+            <a:ext cx="7508787" cy="646331"/>
           </a:xfrm>
           <a:prstGeom prst="rect">
             <a:avLst/>
@@ -4378,7 +5968,7 @@
           <a:p>
             <a:pPr algn="ctr"/>
             <a:r>
-              <a:rPr lang="ru-RU" sz="4000" dirty="0">
+              <a:rPr lang="ru-RU" sz="3600" dirty="0">
                 <a:solidFill>
                   <a:schemeClr val="bg1">
                     <a:lumMod val="95000"/>
@@ -4393,21 +5983,27 @@
                 </a:effectLst>
                 <a:latin typeface="Century Gothic" panose="020B0502020202020204" pitchFamily="34" charset="0"/>
               </a:rPr>
-              <a:t>Полученные результаты</a:t>
+              <a:t>Проектное решение драйвера</a:t>
             </a:r>
           </a:p>
         </p:txBody>
       </p:sp>
       <p:sp>
         <p:nvSpPr>
-          <p:cNvPr id="6" name="Прямоугольник 5"/>
+          <p:cNvPr id="8" name="Прямоугольник 7">
+            <a:extLst>
+              <a:ext uri="{FF2B5EF4-FFF2-40B4-BE49-F238E27FC236}">
+                <a16:creationId xmlns:a16="http://schemas.microsoft.com/office/drawing/2014/main" id="{D227F79E-6812-A733-0156-6F0C6A0369C6}"/>
+              </a:ext>
+            </a:extLst>
+          </p:cNvPr>
           <p:cNvSpPr/>
           <p:nvPr/>
         </p:nvSpPr>
         <p:spPr>
           <a:xfrm>
-            <a:off x="295702" y="1065424"/>
-            <a:ext cx="11600596" cy="5478423"/>
+            <a:off x="109183" y="1041023"/>
+            <a:ext cx="12082817" cy="586314"/>
           </a:xfrm>
           <a:prstGeom prst="rect">
             <a:avLst/>
@@ -4423,131 +6019,682 @@
               <a:lnSpc>
                 <a:spcPct val="150000"/>
               </a:lnSpc>
-              <a:spcAft>
-                <a:spcPts val="600"/>
-              </a:spcAft>
-              <a:defRPr/>
             </a:pPr>
             <a:r>
-              <a:rPr lang="en-US" altLang="ru-RU" sz="1700" dirty="0">
+              <a:rPr lang="ru-RU" sz="2400" dirty="0"/>
+              <a:t>	</a:t>
+            </a:r>
+            <a:endParaRPr lang="ru-RU" sz="2000" dirty="0">
+              <a:latin typeface="Century Gothic" panose="020B0502020202020204" pitchFamily="34" charset="0"/>
+            </a:endParaRPr>
+          </a:p>
+        </p:txBody>
+      </p:sp>
+      <p:grpSp>
+        <p:nvGrpSpPr>
+          <p:cNvPr id="4" name="Group 3">
+            <a:extLst>
+              <a:ext uri="{FF2B5EF4-FFF2-40B4-BE49-F238E27FC236}">
+                <a16:creationId xmlns:a16="http://schemas.microsoft.com/office/drawing/2014/main" id="{91A31469-7C6A-C3B2-A9E8-75A27693364D}"/>
+              </a:ext>
+            </a:extLst>
+          </p:cNvPr>
+          <p:cNvGrpSpPr/>
+          <p:nvPr/>
+        </p:nvGrpSpPr>
+        <p:grpSpPr>
+          <a:xfrm>
+            <a:off x="651618" y="1720394"/>
+            <a:ext cx="2016952" cy="2384817"/>
+            <a:chOff x="4459057" y="4591624"/>
+            <a:chExt cx="1321445" cy="1562459"/>
+          </a:xfrm>
+        </p:grpSpPr>
+        <p:pic>
+          <p:nvPicPr>
+            <p:cNvPr id="23" name="Picture 22">
+              <a:extLst>
+                <a:ext uri="{FF2B5EF4-FFF2-40B4-BE49-F238E27FC236}">
+                  <a16:creationId xmlns:a16="http://schemas.microsoft.com/office/drawing/2014/main" id="{96BB3AE9-3022-E864-1838-0EC114981CA1}"/>
+                </a:ext>
+              </a:extLst>
+            </p:cNvPr>
+            <p:cNvPicPr>
+              <a:picLocks noChangeAspect="1"/>
+            </p:cNvPicPr>
+            <p:nvPr/>
+          </p:nvPicPr>
+          <p:blipFill>
+            <a:blip r:embed="rId3">
+              <a:extLst>
+                <a:ext uri="{28A0092B-C50C-407E-A947-70E740481C1C}">
+                  <a14:useLocalDpi xmlns:a14="http://schemas.microsoft.com/office/drawing/2010/main" val="0"/>
+                </a:ext>
+              </a:extLst>
+            </a:blip>
+            <a:stretch>
+              <a:fillRect/>
+            </a:stretch>
+          </p:blipFill>
+          <p:spPr>
+            <a:xfrm>
+              <a:off x="4459057" y="4591624"/>
+              <a:ext cx="1164942" cy="1562459"/>
+            </a:xfrm>
+            <a:prstGeom prst="rect">
+              <a:avLst/>
+            </a:prstGeom>
+          </p:spPr>
+        </p:pic>
+        <p:pic>
+          <p:nvPicPr>
+            <p:cNvPr id="24" name="Picture 23">
+              <a:extLst>
+                <a:ext uri="{FF2B5EF4-FFF2-40B4-BE49-F238E27FC236}">
+                  <a16:creationId xmlns:a16="http://schemas.microsoft.com/office/drawing/2014/main" id="{4630ED1A-9E6B-B7A2-34E1-9868D40448B7}"/>
+                </a:ext>
+              </a:extLst>
+            </p:cNvPr>
+            <p:cNvPicPr>
+              <a:picLocks noChangeAspect="1"/>
+            </p:cNvPicPr>
+            <p:nvPr/>
+          </p:nvPicPr>
+          <p:blipFill>
+            <a:blip r:embed="rId4" cstate="print">
+              <a:extLst>
+                <a:ext uri="{28A0092B-C50C-407E-A947-70E740481C1C}">
+                  <a14:useLocalDpi xmlns:a14="http://schemas.microsoft.com/office/drawing/2010/main" val="0"/>
+                </a:ext>
+              </a:extLst>
+            </a:blip>
+            <a:stretch>
+              <a:fillRect/>
+            </a:stretch>
+          </p:blipFill>
+          <p:spPr>
+            <a:xfrm>
+              <a:off x="4615748" y="4727446"/>
+              <a:ext cx="851560" cy="620342"/>
+            </a:xfrm>
+            <a:prstGeom prst="rect">
+              <a:avLst/>
+            </a:prstGeom>
+          </p:spPr>
+        </p:pic>
+        <p:sp>
+          <p:nvSpPr>
+            <p:cNvPr id="26" name="TextBox 25">
+              <a:extLst>
+                <a:ext uri="{FF2B5EF4-FFF2-40B4-BE49-F238E27FC236}">
+                  <a16:creationId xmlns:a16="http://schemas.microsoft.com/office/drawing/2014/main" id="{788C68F7-144C-B6CD-0E3C-ADD78D112B73}"/>
+                </a:ext>
+              </a:extLst>
+            </p:cNvPr>
+            <p:cNvSpPr txBox="1"/>
+            <p:nvPr/>
+          </p:nvSpPr>
+          <p:spPr>
+            <a:xfrm>
+              <a:off x="4506434" y="5395317"/>
+              <a:ext cx="1274068" cy="544444"/>
+            </a:xfrm>
+            <a:prstGeom prst="rect">
+              <a:avLst/>
+            </a:prstGeom>
+            <a:noFill/>
+          </p:spPr>
+          <p:txBody>
+            <a:bodyPr wrap="square" rtlCol="0">
+              <a:spAutoFit/>
+            </a:bodyPr>
+            <a:lstStyle/>
+            <a:p>
+              <a:r>
+                <a:rPr lang="ru-RU" sz="2400" dirty="0">
+                  <a:latin typeface="Century Gothic" panose="020B0502020202020204" pitchFamily="34" charset="0"/>
+                </a:rPr>
+                <a:t>Драйвер </a:t>
+              </a:r>
+            </a:p>
+            <a:p>
+              <a:r>
+                <a:rPr lang="en-US" sz="2400" dirty="0">
+                  <a:latin typeface="Century Gothic" panose="020B0502020202020204" pitchFamily="34" charset="0"/>
+                </a:rPr>
+                <a:t>MATICA</a:t>
+              </a:r>
+              <a:endParaRPr lang="ru-RU" sz="2400" dirty="0">
                 <a:latin typeface="Century Gothic" panose="020B0502020202020204" pitchFamily="34" charset="0"/>
-                <a:ea typeface="Calibri" panose="020F0502020204030204" pitchFamily="34" charset="0"/>
-                <a:cs typeface="Times New Roman" panose="02020603050405020304" pitchFamily="18" charset="0"/>
+              </a:endParaRPr>
+            </a:p>
+          </p:txBody>
+        </p:sp>
+      </p:grpSp>
+      <p:pic>
+        <p:nvPicPr>
+          <p:cNvPr id="27" name="Picture 26">
+            <a:extLst>
+              <a:ext uri="{FF2B5EF4-FFF2-40B4-BE49-F238E27FC236}">
+                <a16:creationId xmlns:a16="http://schemas.microsoft.com/office/drawing/2014/main" id="{2266A12E-A5E0-3C59-89B4-F6D55F8B3642}"/>
+              </a:ext>
+            </a:extLst>
+          </p:cNvPr>
+          <p:cNvPicPr>
+            <a:picLocks noChangeAspect="1"/>
+          </p:cNvPicPr>
+          <p:nvPr/>
+        </p:nvPicPr>
+        <p:blipFill>
+          <a:blip r:embed="rId5">
+            <a:extLst>
+              <a:ext uri="{28A0092B-C50C-407E-A947-70E740481C1C}">
+                <a14:useLocalDpi xmlns:a14="http://schemas.microsoft.com/office/drawing/2010/main" val="0"/>
+              </a:ext>
+            </a:extLst>
+          </a:blip>
+          <a:stretch>
+            <a:fillRect/>
+          </a:stretch>
+        </p:blipFill>
+        <p:spPr>
+          <a:xfrm>
+            <a:off x="8718848" y="1847698"/>
+            <a:ext cx="2611556" cy="1157768"/>
+          </a:xfrm>
+          <a:prstGeom prst="rect">
+            <a:avLst/>
+          </a:prstGeom>
+        </p:spPr>
+      </p:pic>
+      <p:pic>
+        <p:nvPicPr>
+          <p:cNvPr id="28" name="Picture 27">
+            <a:extLst>
+              <a:ext uri="{FF2B5EF4-FFF2-40B4-BE49-F238E27FC236}">
+                <a16:creationId xmlns:a16="http://schemas.microsoft.com/office/drawing/2014/main" id="{8461C0FE-E260-B0B3-5BCB-386BDF127CA8}"/>
+              </a:ext>
+            </a:extLst>
+          </p:cNvPr>
+          <p:cNvPicPr>
+            <a:picLocks noChangeAspect="1"/>
+          </p:cNvPicPr>
+          <p:nvPr/>
+        </p:nvPicPr>
+        <p:blipFill>
+          <a:blip r:embed="rId6" cstate="print">
+            <a:extLst>
+              <a:ext uri="{28A0092B-C50C-407E-A947-70E740481C1C}">
+                <a14:useLocalDpi xmlns:a14="http://schemas.microsoft.com/office/drawing/2010/main" val="0"/>
+              </a:ext>
+            </a:extLst>
+          </a:blip>
+          <a:stretch>
+            <a:fillRect/>
+          </a:stretch>
+        </p:blipFill>
+        <p:spPr>
+          <a:xfrm>
+            <a:off x="10140205" y="2912803"/>
+            <a:ext cx="740455" cy="1473116"/>
+          </a:xfrm>
+          <a:prstGeom prst="rect">
+            <a:avLst/>
+          </a:prstGeom>
+        </p:spPr>
+      </p:pic>
+      <p:sp>
+        <p:nvSpPr>
+          <p:cNvPr id="29" name="TextBox 28">
+            <a:extLst>
+              <a:ext uri="{FF2B5EF4-FFF2-40B4-BE49-F238E27FC236}">
+                <a16:creationId xmlns:a16="http://schemas.microsoft.com/office/drawing/2014/main" id="{AFB8FFEE-F40A-1BCD-1703-038E429C33C3}"/>
+              </a:ext>
+            </a:extLst>
+          </p:cNvPr>
+          <p:cNvSpPr txBox="1"/>
+          <p:nvPr/>
+        </p:nvSpPr>
+        <p:spPr>
+          <a:xfrm>
+            <a:off x="9670298" y="4385919"/>
+            <a:ext cx="1680268" cy="707886"/>
+          </a:xfrm>
+          <a:prstGeom prst="rect">
+            <a:avLst/>
+          </a:prstGeom>
+          <a:noFill/>
+        </p:spPr>
+        <p:txBody>
+          <a:bodyPr wrap="none" rtlCol="0">
+            <a:spAutoFit/>
+          </a:bodyPr>
+          <a:lstStyle/>
+          <a:p>
+            <a:pPr algn="ctr"/>
+            <a:r>
+              <a:rPr lang="ru-RU" sz="2000" dirty="0">
+                <a:latin typeface="Century Gothic" panose="020B0502020202020204" pitchFamily="34" charset="0"/>
               </a:rPr>
-              <a:t>	</a:t>
-            </a:r>
-            <a:r>
-              <a:rPr lang="ru-RU" altLang="ru-RU" sz="2000" dirty="0">
+              <a:t>Ридер 1</a:t>
+            </a:r>
+          </a:p>
+          <a:p>
+            <a:pPr algn="ctr"/>
+            <a:r>
+              <a:rPr lang="ru-RU" sz="2000" dirty="0">
                 <a:latin typeface="Century Gothic" panose="020B0502020202020204" pitchFamily="34" charset="0"/>
-                <a:ea typeface="Calibri" panose="020F0502020204030204" pitchFamily="34" charset="0"/>
-                <a:cs typeface="Times New Roman" panose="02020603050405020304" pitchFamily="18" charset="0"/>
               </a:rPr>
-              <a:t>Использование автоматизированной системы мониторинга и управления технологическим процессом на ЛПЦ-4 ПАО «ММК» даст предприятию такие возможности как: </a:t>
-            </a:r>
-          </a:p>
-          <a:p>
-            <a:pPr marL="342900" indent="-342900" algn="just">
-              <a:lnSpc>
-                <a:spcPct val="150000"/>
-              </a:lnSpc>
-              <a:spcAft>
-                <a:spcPts val="600"/>
-              </a:spcAft>
-              <a:buFont typeface="Arial" panose="020B0604020202020204" pitchFamily="34" charset="0"/>
-              <a:buChar char="•"/>
-              <a:defRPr/>
-            </a:pPr>
-            <a:r>
-              <a:rPr lang="ru-RU" altLang="ru-RU" sz="2000" dirty="0">
+              <a:t>192.168.0.81</a:t>
+            </a:r>
+          </a:p>
+        </p:txBody>
+      </p:sp>
+      <p:grpSp>
+        <p:nvGrpSpPr>
+          <p:cNvPr id="73" name="Group 72">
+            <a:extLst>
+              <a:ext uri="{FF2B5EF4-FFF2-40B4-BE49-F238E27FC236}">
+                <a16:creationId xmlns:a16="http://schemas.microsoft.com/office/drawing/2014/main" id="{C9441E61-29BB-B2E7-CCE1-7AD0E072193F}"/>
+              </a:ext>
+            </a:extLst>
+          </p:cNvPr>
+          <p:cNvGrpSpPr/>
+          <p:nvPr/>
+        </p:nvGrpSpPr>
+        <p:grpSpPr>
+          <a:xfrm>
+            <a:off x="2201645" y="1720394"/>
+            <a:ext cx="6888695" cy="1963640"/>
+            <a:chOff x="2113639" y="1720394"/>
+            <a:chExt cx="7160140" cy="1963640"/>
+          </a:xfrm>
+        </p:grpSpPr>
+        <p:sp>
+          <p:nvSpPr>
+            <p:cNvPr id="41" name="Arc 40">
+              <a:extLst>
+                <a:ext uri="{FF2B5EF4-FFF2-40B4-BE49-F238E27FC236}">
+                  <a16:creationId xmlns:a16="http://schemas.microsoft.com/office/drawing/2014/main" id="{20A16153-A2F1-3267-2DF7-151F950EE1EB}"/>
+                </a:ext>
+              </a:extLst>
+            </p:cNvPr>
+            <p:cNvSpPr/>
+            <p:nvPr/>
+          </p:nvSpPr>
+          <p:spPr>
+            <a:xfrm>
+              <a:off x="2113639" y="1720394"/>
+              <a:ext cx="7160140" cy="1963640"/>
+            </a:xfrm>
+            <a:prstGeom prst="arc">
+              <a:avLst>
+                <a:gd name="adj1" fmla="val 11205116"/>
+                <a:gd name="adj2" fmla="val 20978829"/>
+              </a:avLst>
+            </a:prstGeom>
+            <a:ln w="57150">
+              <a:solidFill>
+                <a:schemeClr val="accent1">
+                  <a:lumMod val="50000"/>
+                </a:schemeClr>
+              </a:solidFill>
+            </a:ln>
+          </p:spPr>
+          <p:style>
+            <a:lnRef idx="1">
+              <a:schemeClr val="accent1"/>
+            </a:lnRef>
+            <a:fillRef idx="0">
+              <a:schemeClr val="accent1"/>
+            </a:fillRef>
+            <a:effectRef idx="0">
+              <a:schemeClr val="accent1"/>
+            </a:effectRef>
+            <a:fontRef idx="minor">
+              <a:schemeClr val="tx1"/>
+            </a:fontRef>
+          </p:style>
+          <p:txBody>
+            <a:bodyPr rtlCol="0" anchor="ctr"/>
+            <a:lstStyle/>
+            <a:p>
+              <a:pPr algn="ctr"/>
+              <a:endParaRPr lang="ru-RU"/>
+            </a:p>
+          </p:txBody>
+        </p:sp>
+        <p:cxnSp>
+          <p:nvCxnSpPr>
+            <p:cNvPr id="44" name="Straight Arrow Connector 43">
+              <a:extLst>
+                <a:ext uri="{FF2B5EF4-FFF2-40B4-BE49-F238E27FC236}">
+                  <a16:creationId xmlns:a16="http://schemas.microsoft.com/office/drawing/2014/main" id="{AD16D57C-FE8A-9CA5-A771-5711982F8E13}"/>
+                </a:ext>
+              </a:extLst>
+            </p:cNvPr>
+            <p:cNvCxnSpPr>
+              <a:cxnSpLocks/>
+            </p:cNvCxnSpPr>
+            <p:nvPr/>
+          </p:nvCxnSpPr>
+          <p:spPr>
+            <a:xfrm>
+              <a:off x="8562340" y="2113280"/>
+              <a:ext cx="312420" cy="124460"/>
+            </a:xfrm>
+            <a:prstGeom prst="straightConnector1">
+              <a:avLst/>
+            </a:prstGeom>
+            <a:ln w="57150">
+              <a:solidFill>
+                <a:schemeClr val="accent1">
+                  <a:lumMod val="50000"/>
+                </a:schemeClr>
+              </a:solidFill>
+              <a:tailEnd type="triangle"/>
+            </a:ln>
+          </p:spPr>
+          <p:style>
+            <a:lnRef idx="1">
+              <a:schemeClr val="accent1"/>
+            </a:lnRef>
+            <a:fillRef idx="0">
+              <a:schemeClr val="accent1"/>
+            </a:fillRef>
+            <a:effectRef idx="0">
+              <a:schemeClr val="accent1"/>
+            </a:effectRef>
+            <a:fontRef idx="minor">
+              <a:schemeClr val="tx1"/>
+            </a:fontRef>
+          </p:style>
+        </p:cxnSp>
+      </p:grpSp>
+      <p:grpSp>
+        <p:nvGrpSpPr>
+          <p:cNvPr id="74" name="Group 73">
+            <a:extLst>
+              <a:ext uri="{FF2B5EF4-FFF2-40B4-BE49-F238E27FC236}">
+                <a16:creationId xmlns:a16="http://schemas.microsoft.com/office/drawing/2014/main" id="{652A0ABA-99AC-F47B-B395-468DBF41813B}"/>
+              </a:ext>
+            </a:extLst>
+          </p:cNvPr>
+          <p:cNvGrpSpPr/>
+          <p:nvPr/>
+        </p:nvGrpSpPr>
+        <p:grpSpPr>
+          <a:xfrm flipH="1" flipV="1">
+            <a:off x="2069026" y="1390486"/>
+            <a:ext cx="6888695" cy="1886512"/>
+            <a:chOff x="2113639" y="1720394"/>
+            <a:chExt cx="7160140" cy="1963640"/>
+          </a:xfrm>
+        </p:grpSpPr>
+        <p:sp>
+          <p:nvSpPr>
+            <p:cNvPr id="75" name="Arc 74">
+              <a:extLst>
+                <a:ext uri="{FF2B5EF4-FFF2-40B4-BE49-F238E27FC236}">
+                  <a16:creationId xmlns:a16="http://schemas.microsoft.com/office/drawing/2014/main" id="{A454F4DC-ADFA-6475-6872-AA286B046549}"/>
+                </a:ext>
+              </a:extLst>
+            </p:cNvPr>
+            <p:cNvSpPr/>
+            <p:nvPr/>
+          </p:nvSpPr>
+          <p:spPr>
+            <a:xfrm>
+              <a:off x="2113639" y="1720394"/>
+              <a:ext cx="7160140" cy="1963640"/>
+            </a:xfrm>
+            <a:prstGeom prst="arc">
+              <a:avLst>
+                <a:gd name="adj1" fmla="val 11205116"/>
+                <a:gd name="adj2" fmla="val 20978829"/>
+              </a:avLst>
+            </a:prstGeom>
+            <a:ln w="57150">
+              <a:solidFill>
+                <a:schemeClr val="accent1">
+                  <a:lumMod val="50000"/>
+                </a:schemeClr>
+              </a:solidFill>
+            </a:ln>
+          </p:spPr>
+          <p:style>
+            <a:lnRef idx="1">
+              <a:schemeClr val="accent1"/>
+            </a:lnRef>
+            <a:fillRef idx="0">
+              <a:schemeClr val="accent1"/>
+            </a:fillRef>
+            <a:effectRef idx="0">
+              <a:schemeClr val="accent1"/>
+            </a:effectRef>
+            <a:fontRef idx="minor">
+              <a:schemeClr val="tx1"/>
+            </a:fontRef>
+          </p:style>
+          <p:txBody>
+            <a:bodyPr rtlCol="0" anchor="ctr"/>
+            <a:lstStyle/>
+            <a:p>
+              <a:pPr algn="ctr"/>
+              <a:endParaRPr lang="ru-RU"/>
+            </a:p>
+          </p:txBody>
+        </p:sp>
+        <p:cxnSp>
+          <p:nvCxnSpPr>
+            <p:cNvPr id="76" name="Straight Arrow Connector 75">
+              <a:extLst>
+                <a:ext uri="{FF2B5EF4-FFF2-40B4-BE49-F238E27FC236}">
+                  <a16:creationId xmlns:a16="http://schemas.microsoft.com/office/drawing/2014/main" id="{399B88BC-69B4-87AF-1229-255F03830269}"/>
+                </a:ext>
+              </a:extLst>
+            </p:cNvPr>
+            <p:cNvCxnSpPr>
+              <a:cxnSpLocks/>
+            </p:cNvCxnSpPr>
+            <p:nvPr/>
+          </p:nvCxnSpPr>
+          <p:spPr>
+            <a:xfrm>
+              <a:off x="8562340" y="2113280"/>
+              <a:ext cx="312420" cy="124460"/>
+            </a:xfrm>
+            <a:prstGeom prst="straightConnector1">
+              <a:avLst/>
+            </a:prstGeom>
+            <a:ln w="57150">
+              <a:solidFill>
+                <a:schemeClr val="accent1">
+                  <a:lumMod val="50000"/>
+                </a:schemeClr>
+              </a:solidFill>
+              <a:tailEnd type="triangle"/>
+            </a:ln>
+          </p:spPr>
+          <p:style>
+            <a:lnRef idx="1">
+              <a:schemeClr val="accent1"/>
+            </a:lnRef>
+            <a:fillRef idx="0">
+              <a:schemeClr val="accent1"/>
+            </a:fillRef>
+            <a:effectRef idx="0">
+              <a:schemeClr val="accent1"/>
+            </a:effectRef>
+            <a:fontRef idx="minor">
+              <a:schemeClr val="tx1"/>
+            </a:fontRef>
+          </p:style>
+        </p:cxnSp>
+      </p:grpSp>
+      <p:sp>
+        <p:nvSpPr>
+          <p:cNvPr id="77" name="TextBox 76">
+            <a:extLst>
+              <a:ext uri="{FF2B5EF4-FFF2-40B4-BE49-F238E27FC236}">
+                <a16:creationId xmlns:a16="http://schemas.microsoft.com/office/drawing/2014/main" id="{B1C6D349-E4D8-4224-7685-748A037D971E}"/>
+              </a:ext>
+            </a:extLst>
+          </p:cNvPr>
+          <p:cNvSpPr txBox="1"/>
+          <p:nvPr/>
+        </p:nvSpPr>
+        <p:spPr>
+          <a:xfrm>
+            <a:off x="4357991" y="1017992"/>
+            <a:ext cx="2091446" cy="646331"/>
+          </a:xfrm>
+          <a:prstGeom prst="rect">
+            <a:avLst/>
+          </a:prstGeom>
+          <a:noFill/>
+        </p:spPr>
+        <p:txBody>
+          <a:bodyPr wrap="square" rtlCol="0">
+            <a:spAutoFit/>
+          </a:bodyPr>
+          <a:lstStyle/>
+          <a:p>
+            <a:r>
+              <a:rPr lang="en-US" dirty="0"/>
+              <a:t>TCP/IP 192.168.0.81</a:t>
+            </a:r>
+          </a:p>
+          <a:p>
+            <a:pPr algn="ctr"/>
+            <a:r>
+              <a:rPr lang="en-US" dirty="0" err="1"/>
+              <a:t>TCPScript</a:t>
+            </a:r>
+            <a:r>
+              <a:rPr lang="en-US" dirty="0"/>
+              <a:t> </a:t>
+            </a:r>
+            <a:r>
+              <a:rPr lang="ru-RU" dirty="0"/>
+              <a:t>строка</a:t>
+            </a:r>
+          </a:p>
+        </p:txBody>
+      </p:sp>
+      <p:sp>
+        <p:nvSpPr>
+          <p:cNvPr id="78" name="TextBox 77">
+            <a:extLst>
+              <a:ext uri="{FF2B5EF4-FFF2-40B4-BE49-F238E27FC236}">
+                <a16:creationId xmlns:a16="http://schemas.microsoft.com/office/drawing/2014/main" id="{557048D3-8958-FB7D-4C49-89469A760528}"/>
+              </a:ext>
+            </a:extLst>
+          </p:cNvPr>
+          <p:cNvSpPr txBox="1"/>
+          <p:nvPr/>
+        </p:nvSpPr>
+        <p:spPr>
+          <a:xfrm>
+            <a:off x="4383962" y="3370055"/>
+            <a:ext cx="2524060" cy="646331"/>
+          </a:xfrm>
+          <a:prstGeom prst="rect">
+            <a:avLst/>
+          </a:prstGeom>
+          <a:noFill/>
+        </p:spPr>
+        <p:txBody>
+          <a:bodyPr wrap="square" rtlCol="0">
+            <a:spAutoFit/>
+          </a:bodyPr>
+          <a:lstStyle/>
+          <a:p>
+            <a:r>
+              <a:rPr lang="ru-RU" dirty="0"/>
+              <a:t>Ответ карты в виде строки(пример </a:t>
+            </a:r>
+            <a:r>
+              <a:rPr lang="en-US" dirty="0"/>
+              <a:t>‘</a:t>
+            </a:r>
+            <a:r>
+              <a:rPr lang="ru-RU" dirty="0"/>
+              <a:t>9000</a:t>
+            </a:r>
+            <a:r>
+              <a:rPr lang="en-US" dirty="0"/>
+              <a:t>’</a:t>
+            </a:r>
+            <a:r>
+              <a:rPr lang="ru-RU" dirty="0"/>
+              <a:t>)</a:t>
+            </a:r>
+          </a:p>
+        </p:txBody>
+      </p:sp>
+      <p:sp>
+        <p:nvSpPr>
+          <p:cNvPr id="79" name="TextBox 78">
+            <a:extLst>
+              <a:ext uri="{FF2B5EF4-FFF2-40B4-BE49-F238E27FC236}">
+                <a16:creationId xmlns:a16="http://schemas.microsoft.com/office/drawing/2014/main" id="{C7FA5F6A-A0D0-BAE4-18B2-3D706FA2991C}"/>
+              </a:ext>
+            </a:extLst>
+          </p:cNvPr>
+          <p:cNvSpPr txBox="1"/>
+          <p:nvPr/>
+        </p:nvSpPr>
+        <p:spPr>
+          <a:xfrm>
+            <a:off x="651618" y="4910729"/>
+            <a:ext cx="4898657" cy="400110"/>
+          </a:xfrm>
+          <a:prstGeom prst="rect">
+            <a:avLst/>
+          </a:prstGeom>
+          <a:noFill/>
+        </p:spPr>
+        <p:txBody>
+          <a:bodyPr wrap="square" rtlCol="0">
+            <a:spAutoFit/>
+          </a:bodyPr>
+          <a:lstStyle/>
+          <a:p>
+            <a:r>
+              <a:rPr lang="ru-RU" sz="2000" dirty="0">
                 <a:latin typeface="Century Gothic" panose="020B0502020202020204" pitchFamily="34" charset="0"/>
-                <a:ea typeface="Calibri" panose="020F0502020204030204" pitchFamily="34" charset="0"/>
-                <a:cs typeface="Times New Roman" panose="02020603050405020304" pitchFamily="18" charset="0"/>
               </a:rPr>
-              <a:t>Обеспечение пользователей непрерывной, актуальной и оперативной информацией о данных технологического процесса производства;</a:t>
-            </a:r>
-          </a:p>
-          <a:p>
-            <a:pPr marL="342900" indent="-342900" algn="just">
-              <a:lnSpc>
-                <a:spcPct val="150000"/>
-              </a:lnSpc>
-              <a:spcAft>
-                <a:spcPts val="600"/>
-              </a:spcAft>
-              <a:buFont typeface="Arial" panose="020B0604020202020204" pitchFamily="34" charset="0"/>
-              <a:buChar char="•"/>
-              <a:defRPr/>
-            </a:pPr>
-            <a:r>
-              <a:rPr lang="ru-RU" altLang="ru-RU" sz="2000" dirty="0">
+              <a:t>Пример скрипта на языке </a:t>
+            </a:r>
+            <a:r>
+              <a:rPr lang="en-US" sz="2000" dirty="0" err="1">
                 <a:latin typeface="Century Gothic" panose="020B0502020202020204" pitchFamily="34" charset="0"/>
-                <a:ea typeface="Calibri" panose="020F0502020204030204" pitchFamily="34" charset="0"/>
-                <a:cs typeface="Times New Roman" panose="02020603050405020304" pitchFamily="18" charset="0"/>
               </a:rPr>
-              <a:t>Возможность ввода и редактирования первичных данных при необходимости;</a:t>
-            </a:r>
-          </a:p>
-          <a:p>
-            <a:pPr marL="342900" indent="-342900" algn="just">
-              <a:lnSpc>
-                <a:spcPct val="150000"/>
-              </a:lnSpc>
-              <a:spcAft>
-                <a:spcPts val="600"/>
-              </a:spcAft>
-              <a:buFont typeface="Arial" panose="020B0604020202020204" pitchFamily="34" charset="0"/>
-              <a:buChar char="•"/>
-              <a:defRPr/>
-            </a:pPr>
-            <a:r>
-              <a:rPr lang="ru-RU" altLang="ru-RU" sz="2000" dirty="0">
+              <a:t>TCPScript</a:t>
+            </a:r>
+            <a:r>
+              <a:rPr lang="en-US" sz="2000" dirty="0">
                 <a:latin typeface="Century Gothic" panose="020B0502020202020204" pitchFamily="34" charset="0"/>
-                <a:ea typeface="Calibri" panose="020F0502020204030204" pitchFamily="34" charset="0"/>
-                <a:cs typeface="Times New Roman" panose="02020603050405020304" pitchFamily="18" charset="0"/>
               </a:rPr>
-              <a:t>Возможность редактирования уставных значение и состояний агрегатов прокатного стана;</a:t>
-            </a:r>
-          </a:p>
-          <a:p>
-            <a:pPr marL="342900" indent="-342900" algn="just">
-              <a:lnSpc>
-                <a:spcPct val="150000"/>
-              </a:lnSpc>
-              <a:spcAft>
-                <a:spcPts val="600"/>
-              </a:spcAft>
-              <a:buFont typeface="Arial" panose="020B0604020202020204" pitchFamily="34" charset="0"/>
-              <a:buChar char="•"/>
-              <a:defRPr/>
-            </a:pPr>
-            <a:r>
-              <a:rPr lang="ru-RU" altLang="ru-RU" sz="2000" dirty="0">
-                <a:latin typeface="Century Gothic" panose="020B0502020202020204" pitchFamily="34" charset="0"/>
-                <a:ea typeface="Calibri" panose="020F0502020204030204" pitchFamily="34" charset="0"/>
-                <a:cs typeface="Times New Roman" panose="02020603050405020304" pitchFamily="18" charset="0"/>
-              </a:rPr>
-              <a:t>Повышение эффективности работы стана за счет контроля перемещения слябов по линиям загрузки, состояния карты печей и связи со всеми системами автоматизации;</a:t>
-            </a:r>
+              <a:t>:</a:t>
+            </a:r>
+            <a:endParaRPr lang="ru-RU" sz="2000" dirty="0">
+              <a:latin typeface="Century Gothic" panose="020B0502020202020204" pitchFamily="34" charset="0"/>
+            </a:endParaRPr>
           </a:p>
         </p:txBody>
       </p:sp>
     </p:spTree>
     <p:extLst>
       <p:ext uri="{BB962C8B-B14F-4D97-AF65-F5344CB8AC3E}">
-        <p14:creationId xmlns:p14="http://schemas.microsoft.com/office/powerpoint/2010/main" val="3299038286"/>
+        <p14:creationId xmlns:p14="http://schemas.microsoft.com/office/powerpoint/2010/main" val="1822024353"/>
       </p:ext>
     </p:extLst>
   </p:cSld>
   <p:clrMapOvr>
     <a:masterClrMapping/>
   </p:clrMapOvr>
-  <p:timing>
-    <p:tnLst>
-      <p:par>
-        <p:cTn id="1" dur="indefinite" restart="never" nodeType="tmRoot"/>
-      </p:par>
-    </p:tnLst>
-  </p:timing>
 </p:sld>
 </file>
 
@@ -4624,6 +6771,325 @@
       </p:pic>
       <p:sp>
         <p:nvSpPr>
+          <p:cNvPr id="4" name="Прямоугольник 3"/>
+          <p:cNvSpPr/>
+          <p:nvPr/>
+        </p:nvSpPr>
+        <p:spPr>
+          <a:xfrm>
+            <a:off x="354843" y="1187299"/>
+            <a:ext cx="11600596" cy="495457"/>
+          </a:xfrm>
+          <a:prstGeom prst="rect">
+            <a:avLst/>
+          </a:prstGeom>
+        </p:spPr>
+        <p:txBody>
+          <a:bodyPr wrap="square">
+            <a:spAutoFit/>
+          </a:bodyPr>
+          <a:lstStyle/>
+          <a:p>
+            <a:pPr algn="just">
+              <a:lnSpc>
+                <a:spcPct val="150000"/>
+              </a:lnSpc>
+            </a:pPr>
+            <a:endParaRPr lang="en-US" sz="2000" dirty="0">
+              <a:latin typeface="Century Gothic" panose="020B0502020202020204" pitchFamily="34" charset="0"/>
+            </a:endParaRPr>
+          </a:p>
+        </p:txBody>
+      </p:sp>
+      <p:sp>
+        <p:nvSpPr>
+          <p:cNvPr id="5" name="TextBox 4"/>
+          <p:cNvSpPr txBox="1"/>
+          <p:nvPr/>
+        </p:nvSpPr>
+        <p:spPr>
+          <a:xfrm>
+            <a:off x="3534770" y="450376"/>
+            <a:ext cx="184731" cy="369332"/>
+          </a:xfrm>
+          <a:prstGeom prst="rect">
+            <a:avLst/>
+          </a:prstGeom>
+          <a:noFill/>
+        </p:spPr>
+        <p:txBody>
+          <a:bodyPr wrap="none" rtlCol="0">
+            <a:spAutoFit/>
+          </a:bodyPr>
+          <a:lstStyle/>
+          <a:p>
+            <a:endParaRPr lang="ru-RU" dirty="0"/>
+          </a:p>
+        </p:txBody>
+      </p:sp>
+      <p:sp>
+        <p:nvSpPr>
+          <p:cNvPr id="7" name="TextBox 6"/>
+          <p:cNvSpPr txBox="1"/>
+          <p:nvPr/>
+        </p:nvSpPr>
+        <p:spPr>
+          <a:xfrm>
+            <a:off x="2983615" y="82785"/>
+            <a:ext cx="6224781" cy="707886"/>
+          </a:xfrm>
+          <a:prstGeom prst="rect">
+            <a:avLst/>
+          </a:prstGeom>
+          <a:noFill/>
+        </p:spPr>
+        <p:txBody>
+          <a:bodyPr wrap="none" rtlCol="0">
+            <a:spAutoFit/>
+          </a:bodyPr>
+          <a:lstStyle/>
+          <a:p>
+            <a:pPr algn="ctr"/>
+            <a:r>
+              <a:rPr lang="ru-RU" sz="4000" dirty="0">
+                <a:solidFill>
+                  <a:schemeClr val="bg1">
+                    <a:lumMod val="95000"/>
+                  </a:schemeClr>
+                </a:solidFill>
+                <a:effectLst>
+                  <a:outerShdw blurRad="38100" dist="38100" dir="2700000" algn="tl">
+                    <a:srgbClr val="000000">
+                      <a:alpha val="43137"/>
+                    </a:srgbClr>
+                  </a:outerShdw>
+                </a:effectLst>
+                <a:latin typeface="Century Gothic" panose="020B0502020202020204" pitchFamily="34" charset="0"/>
+              </a:rPr>
+              <a:t>Полученные результаты</a:t>
+            </a:r>
+          </a:p>
+        </p:txBody>
+      </p:sp>
+      <p:sp>
+        <p:nvSpPr>
+          <p:cNvPr id="6" name="Прямоугольник 5"/>
+          <p:cNvSpPr/>
+          <p:nvPr/>
+        </p:nvSpPr>
+        <p:spPr>
+          <a:xfrm>
+            <a:off x="295702" y="1065424"/>
+            <a:ext cx="11600596" cy="5478423"/>
+          </a:xfrm>
+          <a:prstGeom prst="rect">
+            <a:avLst/>
+          </a:prstGeom>
+        </p:spPr>
+        <p:txBody>
+          <a:bodyPr wrap="square">
+            <a:spAutoFit/>
+          </a:bodyPr>
+          <a:lstStyle/>
+          <a:p>
+            <a:pPr algn="just">
+              <a:lnSpc>
+                <a:spcPct val="150000"/>
+              </a:lnSpc>
+              <a:spcAft>
+                <a:spcPts val="600"/>
+              </a:spcAft>
+              <a:defRPr/>
+            </a:pPr>
+            <a:r>
+              <a:rPr lang="en-US" altLang="ru-RU" sz="1700" dirty="0">
+                <a:latin typeface="Century Gothic" panose="020B0502020202020204" pitchFamily="34" charset="0"/>
+                <a:ea typeface="Calibri" panose="020F0502020204030204" pitchFamily="34" charset="0"/>
+                <a:cs typeface="Times New Roman" panose="02020603050405020304" pitchFamily="18" charset="0"/>
+              </a:rPr>
+              <a:t>	</a:t>
+            </a:r>
+            <a:r>
+              <a:rPr lang="ru-RU" altLang="ru-RU" sz="2000" dirty="0">
+                <a:latin typeface="Century Gothic" panose="020B0502020202020204" pitchFamily="34" charset="0"/>
+                <a:ea typeface="Calibri" panose="020F0502020204030204" pitchFamily="34" charset="0"/>
+                <a:cs typeface="Times New Roman" panose="02020603050405020304" pitchFamily="18" charset="0"/>
+              </a:rPr>
+              <a:t>Использование автоматизированной системы мониторинга и управления технологическим процессом на ЛПЦ-4 ПАО «ММК» даст предприятию такие возможности как: </a:t>
+            </a:r>
+          </a:p>
+          <a:p>
+            <a:pPr marL="342900" indent="-342900" algn="just">
+              <a:lnSpc>
+                <a:spcPct val="150000"/>
+              </a:lnSpc>
+              <a:spcAft>
+                <a:spcPts val="600"/>
+              </a:spcAft>
+              <a:buFont typeface="Arial" panose="020B0604020202020204" pitchFamily="34" charset="0"/>
+              <a:buChar char="•"/>
+              <a:defRPr/>
+            </a:pPr>
+            <a:r>
+              <a:rPr lang="ru-RU" altLang="ru-RU" sz="2000" dirty="0">
+                <a:latin typeface="Century Gothic" panose="020B0502020202020204" pitchFamily="34" charset="0"/>
+                <a:ea typeface="Calibri" panose="020F0502020204030204" pitchFamily="34" charset="0"/>
+                <a:cs typeface="Times New Roman" panose="02020603050405020304" pitchFamily="18" charset="0"/>
+              </a:rPr>
+              <a:t>Обеспечение пользователей непрерывной, актуальной и оперативной информацией о данных технологического процесса производства;</a:t>
+            </a:r>
+          </a:p>
+          <a:p>
+            <a:pPr marL="342900" indent="-342900" algn="just">
+              <a:lnSpc>
+                <a:spcPct val="150000"/>
+              </a:lnSpc>
+              <a:spcAft>
+                <a:spcPts val="600"/>
+              </a:spcAft>
+              <a:buFont typeface="Arial" panose="020B0604020202020204" pitchFamily="34" charset="0"/>
+              <a:buChar char="•"/>
+              <a:defRPr/>
+            </a:pPr>
+            <a:r>
+              <a:rPr lang="ru-RU" altLang="ru-RU" sz="2000" dirty="0">
+                <a:latin typeface="Century Gothic" panose="020B0502020202020204" pitchFamily="34" charset="0"/>
+                <a:ea typeface="Calibri" panose="020F0502020204030204" pitchFamily="34" charset="0"/>
+                <a:cs typeface="Times New Roman" panose="02020603050405020304" pitchFamily="18" charset="0"/>
+              </a:rPr>
+              <a:t>Возможность ввода и редактирования первичных данных при необходимости;</a:t>
+            </a:r>
+          </a:p>
+          <a:p>
+            <a:pPr marL="342900" indent="-342900" algn="just">
+              <a:lnSpc>
+                <a:spcPct val="150000"/>
+              </a:lnSpc>
+              <a:spcAft>
+                <a:spcPts val="600"/>
+              </a:spcAft>
+              <a:buFont typeface="Arial" panose="020B0604020202020204" pitchFamily="34" charset="0"/>
+              <a:buChar char="•"/>
+              <a:defRPr/>
+            </a:pPr>
+            <a:r>
+              <a:rPr lang="ru-RU" altLang="ru-RU" sz="2000" dirty="0">
+                <a:latin typeface="Century Gothic" panose="020B0502020202020204" pitchFamily="34" charset="0"/>
+                <a:ea typeface="Calibri" panose="020F0502020204030204" pitchFamily="34" charset="0"/>
+                <a:cs typeface="Times New Roman" panose="02020603050405020304" pitchFamily="18" charset="0"/>
+              </a:rPr>
+              <a:t>Возможность редактирования уставных значение и состояний агрегатов прокатного стана;</a:t>
+            </a:r>
+          </a:p>
+          <a:p>
+            <a:pPr marL="342900" indent="-342900" algn="just">
+              <a:lnSpc>
+                <a:spcPct val="150000"/>
+              </a:lnSpc>
+              <a:spcAft>
+                <a:spcPts val="600"/>
+              </a:spcAft>
+              <a:buFont typeface="Arial" panose="020B0604020202020204" pitchFamily="34" charset="0"/>
+              <a:buChar char="•"/>
+              <a:defRPr/>
+            </a:pPr>
+            <a:r>
+              <a:rPr lang="ru-RU" altLang="ru-RU" sz="2000" dirty="0">
+                <a:latin typeface="Century Gothic" panose="020B0502020202020204" pitchFamily="34" charset="0"/>
+                <a:ea typeface="Calibri" panose="020F0502020204030204" pitchFamily="34" charset="0"/>
+                <a:cs typeface="Times New Roman" panose="02020603050405020304" pitchFamily="18" charset="0"/>
+              </a:rPr>
+              <a:t>Повышение эффективности работы стана за счет контроля перемещения слябов по линиям загрузки, состояния карты печей и связи со всеми системами автоматизации;</a:t>
+            </a:r>
+          </a:p>
+        </p:txBody>
+      </p:sp>
+    </p:spTree>
+    <p:extLst>
+      <p:ext uri="{BB962C8B-B14F-4D97-AF65-F5344CB8AC3E}">
+        <p14:creationId xmlns:p14="http://schemas.microsoft.com/office/powerpoint/2010/main" val="3299038286"/>
+      </p:ext>
+    </p:extLst>
+  </p:cSld>
+  <p:clrMapOvr>
+    <a:masterClrMapping/>
+  </p:clrMapOvr>
+</p:sld>
+</file>
+
+<file path=ppt/slides/slide13.xml><?xml version="1.0" encoding="utf-8"?>
+<p:sld xmlns:a="http://schemas.openxmlformats.org/drawingml/2006/main" xmlns:r="http://schemas.openxmlformats.org/officeDocument/2006/relationships" xmlns:p="http://schemas.openxmlformats.org/presentationml/2006/main">
+  <p:cSld>
+    <p:spTree>
+      <p:nvGrpSpPr>
+        <p:cNvPr id="1" name=""/>
+        <p:cNvGrpSpPr/>
+        <p:nvPr/>
+      </p:nvGrpSpPr>
+      <p:grpSpPr>
+        <a:xfrm>
+          <a:off x="0" y="0"/>
+          <a:ext cx="0" cy="0"/>
+          <a:chOff x="0" y="0"/>
+          <a:chExt cx="0" cy="0"/>
+        </a:xfrm>
+      </p:grpSpPr>
+      <p:pic>
+        <p:nvPicPr>
+          <p:cNvPr id="2" name="Picture 2" descr="C:\Users\Андрей\Desktop\1\Безымянный-1.png"/>
+          <p:cNvPicPr>
+            <a:picLocks noChangeAspect="1" noChangeArrowheads="1"/>
+          </p:cNvPicPr>
+          <p:nvPr/>
+        </p:nvPicPr>
+        <p:blipFill>
+          <a:blip r:embed="rId2">
+            <a:extLst>
+              <a:ext uri="{28A0092B-C50C-407E-A947-70E740481C1C}">
+                <a14:useLocalDpi xmlns:a14="http://schemas.microsoft.com/office/drawing/2010/main" val="0"/>
+              </a:ext>
+            </a:extLst>
+          </a:blip>
+          <a:srcRect/>
+          <a:stretch>
+            <a:fillRect/>
+          </a:stretch>
+        </p:blipFill>
+        <p:spPr bwMode="auto">
+          <a:xfrm>
+            <a:off x="0" y="0"/>
+            <a:ext cx="12192000" cy="982639"/>
+          </a:xfrm>
+          <a:prstGeom prst="rect">
+            <a:avLst/>
+          </a:prstGeom>
+          <a:noFill/>
+          <a:ln>
+            <a:noFill/>
+          </a:ln>
+          <a:extLst>
+            <a:ext uri="{909E8E84-426E-40DD-AFC4-6F175D3DCCD1}">
+              <a14:hiddenFill xmlns:a14="http://schemas.microsoft.com/office/drawing/2010/main">
+                <a:solidFill>
+                  <a:srgbClr val="FFFFFF"/>
+                </a:solidFill>
+              </a14:hiddenFill>
+            </a:ext>
+            <a:ext uri="{91240B29-F687-4F45-9708-019B960494DF}">
+              <a14:hiddenLine xmlns:a14="http://schemas.microsoft.com/office/drawing/2010/main" w="9525">
+                <a:solidFill>
+                  <a:srgbClr val="000000"/>
+                </a:solidFill>
+                <a:miter lim="800000"/>
+                <a:headEnd/>
+                <a:tailEnd/>
+              </a14:hiddenLine>
+            </a:ext>
+          </a:extLst>
+        </p:spPr>
+      </p:pic>
+      <p:sp>
+        <p:nvSpPr>
           <p:cNvPr id="5" name="TextBox 4"/>
           <p:cNvSpPr txBox="1"/>
           <p:nvPr/>
@@ -4808,7 +7274,7 @@
 </p:sld>
 </file>
 
-<file path=ppt/slides/slide13.xml><?xml version="1.0" encoding="utf-8"?>
+<file path=ppt/slides/slide14.xml><?xml version="1.0" encoding="utf-8"?>
 <p:sld xmlns:a="http://schemas.openxmlformats.org/drawingml/2006/main" xmlns:r="http://schemas.openxmlformats.org/officeDocument/2006/relationships" xmlns:p="http://schemas.openxmlformats.org/presentationml/2006/main">
   <p:cSld>
     <p:spTree>
@@ -5002,8 +7468,8 @@
         </p:nvSpPr>
         <p:spPr>
           <a:xfrm>
-            <a:off x="3460502" y="168153"/>
-            <a:ext cx="5270995" cy="646331"/>
+            <a:off x="3070973" y="168153"/>
+            <a:ext cx="6050054" cy="646331"/>
           </a:xfrm>
           <a:prstGeom prst="rect">
             <a:avLst/>
@@ -5017,7 +7483,7 @@
           <a:lstStyle/>
           <a:p>
             <a:r>
-              <a:rPr lang="ru-RU" sz="3600" dirty="0" smtClean="0">
+              <a:rPr lang="ru-RU" sz="3600" dirty="0">
                 <a:solidFill>
                   <a:schemeClr val="bg1">
                     <a:lumMod val="95000"/>
@@ -5032,23 +7498,8 @@
                 </a:effectLst>
                 <a:latin typeface="Century Gothic" panose="020B0502020202020204" pitchFamily="34" charset="0"/>
               </a:rPr>
-              <a:t>Описние эмбоссера</a:t>
-            </a:r>
-            <a:endParaRPr lang="ru-RU" sz="3600" dirty="0">
-              <a:solidFill>
-                <a:schemeClr val="bg1">
-                  <a:lumMod val="95000"/>
-                </a:schemeClr>
-              </a:solidFill>
-              <a:effectLst>
-                <a:outerShdw blurRad="38100" dist="38100" dir="2700000" algn="tl">
-                  <a:srgbClr val="000000">
-                    <a:alpha val="43137"/>
-                  </a:srgbClr>
-                </a:outerShdw>
-              </a:effectLst>
-              <a:latin typeface="Century Gothic" panose="020B0502020202020204" pitchFamily="34" charset="0"/>
-            </a:endParaRPr>
+              <a:t>Компоненты эмбоссера</a:t>
+            </a:r>
           </a:p>
         </p:txBody>
       </p:sp>
@@ -5192,13 +7643,6 @@
   <p:clrMapOvr>
     <a:masterClrMapping/>
   </p:clrMapOvr>
-  <p:timing>
-    <p:tnLst>
-      <p:par>
-        <p:cTn id="1" dur="indefinite" restart="never" nodeType="tmRoot"/>
-      </p:par>
-    </p:tnLst>
-  </p:timing>
 </p:sld>
 </file>
 
@@ -5347,7 +7791,7 @@
           <a:p>
             <a:pPr algn="ctr"/>
             <a:r>
-              <a:rPr lang="ru-RU" sz="4000" dirty="0" smtClean="0">
+              <a:rPr lang="ru-RU" sz="4000" dirty="0">
                 <a:solidFill>
                   <a:schemeClr val="bg1">
                     <a:lumMod val="95000"/>
@@ -5364,21 +7808,6 @@
               </a:rPr>
               <a:t>Анализ текущих решений</a:t>
             </a:r>
-            <a:endParaRPr lang="ru-RU" sz="4000" dirty="0">
-              <a:solidFill>
-                <a:schemeClr val="bg1">
-                  <a:lumMod val="95000"/>
-                </a:schemeClr>
-              </a:solidFill>
-              <a:effectLst>
-                <a:outerShdw blurRad="38100" dist="38100" dir="2700000" algn="tl">
-                  <a:srgbClr val="000000">
-                    <a:alpha val="43137"/>
-                  </a:srgbClr>
-                </a:outerShdw>
-              </a:effectLst>
-              <a:latin typeface="Century Gothic" panose="020B0502020202020204" pitchFamily="34" charset="0"/>
-            </a:endParaRPr>
           </a:p>
         </p:txBody>
       </p:sp>
@@ -5566,13 +7995,13 @@
             <a:p>
               <a:pPr algn="ctr"/>
               <a:r>
-                <a:rPr lang="ru-RU" sz="2000" dirty="0" smtClean="0">
+                <a:rPr lang="ru-RU" sz="2000" dirty="0">
                   <a:latin typeface="Century Gothic" panose="020B0502020202020204" pitchFamily="34" charset="0"/>
                 </a:rPr>
                 <a:t>Эмбоссер </a:t>
               </a:r>
               <a:r>
-                <a:rPr lang="en-US" sz="2000" dirty="0" err="1" smtClean="0">
+                <a:rPr lang="en-US" sz="2000" dirty="0" err="1">
                   <a:latin typeface="Century Gothic" panose="020B0502020202020204" pitchFamily="34" charset="0"/>
                 </a:rPr>
                 <a:t>SmartWare</a:t>
@@ -5974,14 +8403,11 @@
             <a:p>
               <a:pPr algn="ctr"/>
               <a:r>
-                <a:rPr lang="ru-RU" sz="2000" dirty="0" smtClean="0">
+                <a:rPr lang="ru-RU" sz="2000" dirty="0">
                   <a:latin typeface="Century Gothic" panose="020B0502020202020204" pitchFamily="34" charset="0"/>
                 </a:rPr>
                 <a:t>Кардридер</a:t>
               </a:r>
-              <a:endParaRPr lang="ru-RU" sz="2000" dirty="0">
-                <a:latin typeface="Century Gothic" panose="020B0502020202020204" pitchFamily="34" charset="0"/>
-              </a:endParaRPr>
             </a:p>
           </p:txBody>
         </p:sp>
@@ -6666,34 +9092,10 @@
                 <a:ea typeface="Calibri" panose="020F0502020204030204" pitchFamily="34" charset="0"/>
                 <a:cs typeface="Times New Roman" panose="02020603050405020304" pitchFamily="18" charset="0"/>
               </a:rPr>
-              <a:t>Информационное и программное обеспечение для настройки и хранения карточных продуктов и обработки банковских карт средствами эмбоссеров и </a:t>
-            </a:r>
-            <a:r>
-              <a:rPr lang="ru-RU" altLang="ru-RU" sz="2000" dirty="0" smtClean="0">
-                <a:latin typeface="Century Gothic" panose="020B0502020202020204" pitchFamily="34" charset="0"/>
-                <a:ea typeface="Calibri" panose="020F0502020204030204" pitchFamily="34" charset="0"/>
-                <a:cs typeface="Times New Roman" panose="02020603050405020304" pitchFamily="18" charset="0"/>
-              </a:rPr>
-              <a:t>кардридеров и </a:t>
-            </a:r>
-            <a:r>
-              <a:rPr lang="ru-RU" altLang="ru-RU" sz="2000" dirty="0" smtClean="0">
-                <a:latin typeface="Century Gothic" panose="020B0502020202020204" pitchFamily="34" charset="0"/>
-                <a:ea typeface="Calibri" panose="020F0502020204030204" pitchFamily="34" charset="0"/>
-                <a:cs typeface="Times New Roman" panose="02020603050405020304" pitchFamily="18" charset="0"/>
-              </a:rPr>
-              <a:t>имеющиеся в нем средства </a:t>
-            </a:r>
-            <a:r>
-              <a:rPr lang="ru-RU" altLang="ru-RU" sz="2000" dirty="0" smtClean="0">
-                <a:latin typeface="Century Gothic" panose="020B0502020202020204" pitchFamily="34" charset="0"/>
-                <a:ea typeface="Calibri" panose="020F0502020204030204" pitchFamily="34" charset="0"/>
-                <a:cs typeface="Times New Roman" panose="02020603050405020304" pitchFamily="18" charset="0"/>
-              </a:rPr>
-              <a:t>аппаратного и программного взаимодействия с кардридерным модулем эмбоссера </a:t>
-            </a:r>
-            <a:r>
-              <a:rPr lang="en-US" altLang="ru-RU" sz="2000" dirty="0" smtClean="0">
+              <a:t>Информационное и программное обеспечение для настройки и хранения карточных продуктов и обработки банковских карт средствами эмбоссеров и кардридеров и средства аппаратного и программного взаимодействия с кардридерным модулем эмбоссера </a:t>
+            </a:r>
+            <a:r>
+              <a:rPr lang="en-US" altLang="ru-RU" sz="2000" dirty="0">
                 <a:latin typeface="Century Gothic" panose="020B0502020202020204" pitchFamily="34" charset="0"/>
                 <a:ea typeface="Calibri" panose="020F0502020204030204" pitchFamily="34" charset="0"/>
                 <a:cs typeface="Times New Roman" panose="02020603050405020304" pitchFamily="18" charset="0"/>
@@ -6701,7 +9103,7 @@
               <a:t>MATICA</a:t>
             </a:r>
             <a:r>
-              <a:rPr lang="ru-RU" altLang="ru-RU" sz="2000" dirty="0" smtClean="0">
+              <a:rPr lang="ru-RU" altLang="ru-RU" sz="2000" dirty="0">
                 <a:latin typeface="Century Gothic" panose="020B0502020202020204" pitchFamily="34" charset="0"/>
                 <a:ea typeface="Calibri" panose="020F0502020204030204" pitchFamily="34" charset="0"/>
                 <a:cs typeface="Times New Roman" panose="02020603050405020304" pitchFamily="18" charset="0"/>
@@ -6717,20 +9119,12 @@
               <a:defRPr/>
             </a:pPr>
             <a:r>
-              <a:rPr lang="ru-RU" altLang="ru-RU" sz="2400" b="1" dirty="0" smtClean="0">
-                <a:latin typeface="Century Gothic" panose="020B0502020202020204" pitchFamily="34" charset="0"/>
-                <a:ea typeface="Calibri" panose="020F0502020204030204" pitchFamily="34" charset="0"/>
-                <a:cs typeface="Times New Roman" panose="02020603050405020304" pitchFamily="18" charset="0"/>
-              </a:rPr>
-              <a:t>Цель</a:t>
-            </a:r>
-            <a:r>
               <a:rPr lang="ru-RU" altLang="ru-RU" sz="2400" b="1" dirty="0">
                 <a:latin typeface="Century Gothic" panose="020B0502020202020204" pitchFamily="34" charset="0"/>
                 <a:ea typeface="Calibri" panose="020F0502020204030204" pitchFamily="34" charset="0"/>
                 <a:cs typeface="Times New Roman" panose="02020603050405020304" pitchFamily="18" charset="0"/>
               </a:rPr>
-              <a:t>: </a:t>
+              <a:t>Цель: </a:t>
             </a:r>
           </a:p>
           <a:p>
@@ -6741,20 +9135,12 @@
               <a:defRPr/>
             </a:pPr>
             <a:r>
-              <a:rPr lang="ru-RU" altLang="ru-RU" sz="2000" dirty="0" smtClean="0">
-                <a:latin typeface="Century Gothic" panose="020B0502020202020204" pitchFamily="34" charset="0"/>
-                <a:ea typeface="Calibri" panose="020F0502020204030204" pitchFamily="34" charset="0"/>
-                <a:cs typeface="Times New Roman" panose="02020603050405020304" pitchFamily="18" charset="0"/>
-              </a:rPr>
-              <a:t>Автоматизация работы программного </a:t>
-            </a:r>
-            <a:r>
               <a:rPr lang="ru-RU" altLang="ru-RU" sz="2000" dirty="0">
                 <a:latin typeface="Century Gothic" panose="020B0502020202020204" pitchFamily="34" charset="0"/>
                 <a:ea typeface="Calibri" panose="020F0502020204030204" pitchFamily="34" charset="0"/>
                 <a:cs typeface="Times New Roman" panose="02020603050405020304" pitchFamily="18" charset="0"/>
               </a:rPr>
-              <a:t>продукта </a:t>
+              <a:t>Автоматизация работы программного продукта </a:t>
             </a:r>
             <a:r>
               <a:rPr lang="en-US" altLang="ru-RU" sz="2000" dirty="0" err="1">
@@ -6786,18 +9172,10 @@
                 <a:ea typeface="Calibri" panose="020F0502020204030204" pitchFamily="34" charset="0"/>
                 <a:cs typeface="Times New Roman" panose="02020603050405020304" pitchFamily="18" charset="0"/>
               </a:rPr>
-              <a:t> </a:t>
-            </a:r>
-            <a:r>
-              <a:rPr lang="ru-RU" altLang="ru-RU" sz="2000" dirty="0" smtClean="0">
-                <a:latin typeface="Century Gothic" panose="020B0502020202020204" pitchFamily="34" charset="0"/>
-                <a:ea typeface="Calibri" panose="020F0502020204030204" pitchFamily="34" charset="0"/>
-                <a:cs typeface="Times New Roman" panose="02020603050405020304" pitchFamily="18" charset="0"/>
-              </a:rPr>
-              <a:t>с кардридерным модулем эмбоссера </a:t>
-            </a:r>
-            <a:r>
-              <a:rPr lang="en-US" altLang="ru-RU" sz="2000" dirty="0" smtClean="0">
+              <a:t> с кардридерным модулем эмбоссера </a:t>
+            </a:r>
+            <a:r>
+              <a:rPr lang="en-US" altLang="ru-RU" sz="2000" dirty="0">
                 <a:latin typeface="Century Gothic" panose="020B0502020202020204" pitchFamily="34" charset="0"/>
                 <a:ea typeface="Calibri" panose="020F0502020204030204" pitchFamily="34" charset="0"/>
                 <a:cs typeface="Times New Roman" panose="02020603050405020304" pitchFamily="18" charset="0"/>
@@ -6805,34 +9183,13 @@
               <a:t>MATICA </a:t>
             </a:r>
             <a:r>
-              <a:rPr lang="ru-RU" altLang="ru-RU" sz="2000" dirty="0" smtClean="0">
-                <a:latin typeface="Century Gothic" panose="020B0502020202020204" pitchFamily="34" charset="0"/>
-                <a:ea typeface="Calibri" panose="020F0502020204030204" pitchFamily="34" charset="0"/>
-                <a:cs typeface="Times New Roman" panose="02020603050405020304" pitchFamily="18" charset="0"/>
-              </a:rPr>
-              <a:t>для осуществления </a:t>
-            </a:r>
-            <a:r>
               <a:rPr lang="ru-RU" altLang="ru-RU" sz="2000" dirty="0">
                 <a:latin typeface="Century Gothic" panose="020B0502020202020204" pitchFamily="34" charset="0"/>
                 <a:ea typeface="Calibri" panose="020F0502020204030204" pitchFamily="34" charset="0"/>
                 <a:cs typeface="Times New Roman" panose="02020603050405020304" pitchFamily="18" charset="0"/>
               </a:rPr>
-              <a:t>записи информации о клиенте банка на чип пластиковой </a:t>
-            </a:r>
-            <a:r>
-              <a:rPr lang="ru-RU" altLang="ru-RU" sz="2000" dirty="0" smtClean="0">
-                <a:latin typeface="Century Gothic" panose="020B0502020202020204" pitchFamily="34" charset="0"/>
-                <a:ea typeface="Calibri" panose="020F0502020204030204" pitchFamily="34" charset="0"/>
-                <a:cs typeface="Times New Roman" panose="02020603050405020304" pitchFamily="18" charset="0"/>
-              </a:rPr>
-              <a:t>карты.</a:t>
-            </a:r>
-            <a:endParaRPr lang="ru-RU" altLang="ru-RU" sz="2000" dirty="0">
-              <a:latin typeface="Century Gothic" panose="020B0502020202020204" pitchFamily="34" charset="0"/>
-              <a:ea typeface="Calibri" panose="020F0502020204030204" pitchFamily="34" charset="0"/>
-              <a:cs typeface="Times New Roman" panose="02020603050405020304" pitchFamily="18" charset="0"/>
-            </a:endParaRPr>
+              <a:t>для осуществления записи информации о клиенте банка на чип пластиковой карты.</a:t>
+            </a:r>
           </a:p>
         </p:txBody>
       </p:sp>
@@ -6896,13 +9253,6 @@
   <p:clrMapOvr>
     <a:masterClrMapping/>
   </p:clrMapOvr>
-  <p:timing>
-    <p:tnLst>
-      <p:par>
-        <p:cTn id="1" dur="indefinite" restart="never" nodeType="tmRoot"/>
-      </p:par>
-    </p:tnLst>
-  </p:timing>
 </p:sld>
 </file>
 
@@ -7227,13 +9577,6 @@
   <p:clrMapOvr>
     <a:masterClrMapping/>
   </p:clrMapOvr>
-  <p:timing>
-    <p:tnLst>
-      <p:par>
-        <p:cTn id="1" dur="indefinite" restart="never" nodeType="tmRoot"/>
-      </p:par>
-    </p:tnLst>
-  </p:timing>
 </p:sld>
 </file>
 
@@ -7461,7 +9804,7 @@
         </p:nvSpPr>
         <p:spPr>
           <a:xfrm>
-            <a:off x="1011051" y="4544498"/>
+            <a:off x="1011049" y="4612473"/>
             <a:ext cx="1494291" cy="400110"/>
           </a:xfrm>
           <a:prstGeom prst="rect">
@@ -7907,7 +10250,7 @@
         </p:blipFill>
         <p:spPr>
           <a:xfrm>
-            <a:off x="8690656" y="4648430"/>
+            <a:off x="8701120" y="4648430"/>
             <a:ext cx="1058228" cy="1058228"/>
           </a:xfrm>
           <a:prstGeom prst="rect">
@@ -8023,14 +10366,11 @@
           <a:p>
             <a:pPr algn="ctr"/>
             <a:r>
-              <a:rPr lang="ru-RU" sz="2000" dirty="0" smtClean="0">
+              <a:rPr lang="ru-RU" sz="2000" dirty="0">
                 <a:latin typeface="Century Gothic" panose="020B0502020202020204" pitchFamily="34" charset="0"/>
               </a:rPr>
               <a:t>Приложение</a:t>
             </a:r>
-            <a:endParaRPr lang="ru-RU" sz="2000" dirty="0">
-              <a:latin typeface="Century Gothic" panose="020B0502020202020204" pitchFamily="34" charset="0"/>
-            </a:endParaRPr>
           </a:p>
         </p:txBody>
       </p:sp>
@@ -8126,7 +10466,7 @@
         <p:spPr>
           <a:xfrm>
             <a:off x="7673720" y="5174723"/>
-            <a:ext cx="1016936" cy="2821"/>
+            <a:ext cx="1027400" cy="2821"/>
           </a:xfrm>
           <a:prstGeom prst="line">
             <a:avLst/>
@@ -8244,13 +10584,6 @@
   <p:clrMapOvr>
     <a:masterClrMapping/>
   </p:clrMapOvr>
-  <p:timing>
-    <p:tnLst>
-      <p:par>
-        <p:cTn id="1" dur="indefinite" restart="never" nodeType="tmRoot"/>
-      </p:par>
-    </p:tnLst>
-  </p:timing>
 </p:sld>
 </file>
 
@@ -8709,14 +11042,11 @@
             <a:p>
               <a:pPr algn="ctr"/>
               <a:r>
-                <a:rPr lang="ru-RU" sz="2000" dirty="0" smtClean="0">
+                <a:rPr lang="ru-RU" sz="2000" dirty="0">
                   <a:latin typeface="Century Gothic" panose="020B0502020202020204" pitchFamily="34" charset="0"/>
                 </a:rPr>
                 <a:t>Карточные продукты</a:t>
               </a:r>
-              <a:endParaRPr lang="ru-RU" sz="2000" dirty="0">
-                <a:latin typeface="Century Gothic" panose="020B0502020202020204" pitchFamily="34" charset="0"/>
-              </a:endParaRPr>
             </a:p>
           </p:txBody>
         </p:sp>
@@ -8840,7 +11170,7 @@
               <a:buChar char="―"/>
             </a:pPr>
             <a:r>
-              <a:rPr lang="ru-RU" sz="2800" dirty="0" smtClean="0">
+              <a:rPr lang="ru-RU" sz="2800" dirty="0">
                 <a:latin typeface="Century Gothic" panose="020B0502020202020204" pitchFamily="34" charset="0"/>
               </a:rPr>
               <a:t>Модуль 1</a:t>
@@ -8863,7 +11193,7 @@
               </a:rPr>
               <a:t>2</a:t>
             </a:r>
-            <a:endParaRPr lang="ru-RU" sz="2800" dirty="0" smtClean="0">
+            <a:endParaRPr lang="ru-RU" sz="2800" dirty="0">
               <a:latin typeface="Century Gothic" panose="020B0502020202020204" pitchFamily="34" charset="0"/>
             </a:endParaRPr>
           </a:p>
@@ -8884,7 +11214,7 @@
               </a:rPr>
               <a:t>3</a:t>
             </a:r>
-            <a:endParaRPr lang="ru-RU" sz="2800" dirty="0" smtClean="0">
+            <a:endParaRPr lang="ru-RU" sz="2800" dirty="0">
               <a:latin typeface="Century Gothic" panose="020B0502020202020204" pitchFamily="34" charset="0"/>
             </a:endParaRPr>
           </a:p>
@@ -8900,12 +11230,12 @@
               <a:t>Модуль </a:t>
             </a:r>
             <a:r>
-              <a:rPr lang="en-US" sz="2800" dirty="0" smtClean="0">
+              <a:rPr lang="en-US" sz="2800" dirty="0">
                 <a:latin typeface="Century Gothic" panose="020B0502020202020204" pitchFamily="34" charset="0"/>
               </a:rPr>
               <a:t>4</a:t>
             </a:r>
-            <a:endParaRPr lang="ru-RU" sz="2800" dirty="0" smtClean="0">
+            <a:endParaRPr lang="ru-RU" sz="2800" dirty="0">
               <a:latin typeface="Century Gothic" panose="020B0502020202020204" pitchFamily="34" charset="0"/>
             </a:endParaRPr>
           </a:p>
@@ -8915,7 +11245,7 @@
               <a:buChar char="―"/>
             </a:pPr>
             <a:r>
-              <a:rPr lang="ru-RU" sz="2800" dirty="0" smtClean="0">
+              <a:rPr lang="ru-RU" sz="2800" dirty="0">
                 <a:latin typeface="Century Gothic" panose="020B0502020202020204" pitchFamily="34" charset="0"/>
               </a:rPr>
               <a:t>...</a:t>
@@ -8933,14 +11263,11 @@
               <a:t>Модуль </a:t>
             </a:r>
             <a:r>
-              <a:rPr lang="en-US" sz="2800" dirty="0" smtClean="0">
+              <a:rPr lang="en-US" sz="2800" dirty="0">
                 <a:latin typeface="Century Gothic" panose="020B0502020202020204" pitchFamily="34" charset="0"/>
               </a:rPr>
               <a:t>n</a:t>
             </a:r>
-            <a:endParaRPr lang="en-US" sz="2800" dirty="0">
-              <a:latin typeface="Century Gothic" panose="020B0502020202020204" pitchFamily="34" charset="0"/>
-            </a:endParaRPr>
           </a:p>
         </p:txBody>
       </p:sp>
@@ -9064,7 +11391,7 @@
             <a:p>
               <a:pPr algn="ctr"/>
               <a:r>
-                <a:rPr lang="ru-RU" sz="1600" dirty="0" smtClean="0">
+                <a:rPr lang="ru-RU" sz="1600" dirty="0">
                   <a:latin typeface="Century Gothic" panose="020B0502020202020204" pitchFamily="34" charset="0"/>
                 </a:rPr>
                 <a:t>Модуль </a:t>
@@ -9076,19 +11403,7 @@
                 <a:rPr lang="ru-RU" sz="1600" dirty="0">
                   <a:latin typeface="Century Gothic" panose="020B0502020202020204" pitchFamily="34" charset="0"/>
                 </a:rPr>
-                <a:t>н</a:t>
-              </a:r>
-              <a:r>
-                <a:rPr lang="ru-RU" sz="1600" dirty="0" smtClean="0">
-                  <a:latin typeface="Century Gothic" panose="020B0502020202020204" pitchFamily="34" charset="0"/>
-                </a:rPr>
-                <a:t>астроек </a:t>
-              </a:r>
-              <a:r>
-                <a:rPr lang="ru-RU" sz="1600" dirty="0">
-                  <a:latin typeface="Century Gothic" panose="020B0502020202020204" pitchFamily="34" charset="0"/>
-                </a:rPr>
-                <a:t>2</a:t>
+                <a:t>настроек 2</a:t>
               </a:r>
               <a:endParaRPr lang="en-US" sz="1600" dirty="0">
                 <a:latin typeface="Century Gothic" panose="020B0502020202020204" pitchFamily="34" charset="0"/>
@@ -9177,7 +11492,7 @@
             <a:p>
               <a:pPr algn="ctr"/>
               <a:r>
-                <a:rPr lang="ru-RU" sz="1600" dirty="0" smtClean="0">
+                <a:rPr lang="ru-RU" sz="1600" dirty="0">
                   <a:latin typeface="Century Gothic" panose="020B0502020202020204" pitchFamily="34" charset="0"/>
                 </a:rPr>
                 <a:t>Модуль </a:t>
@@ -9189,23 +11504,14 @@
                 <a:rPr lang="ru-RU" sz="1600" dirty="0">
                   <a:latin typeface="Century Gothic" panose="020B0502020202020204" pitchFamily="34" charset="0"/>
                 </a:rPr>
-                <a:t>н</a:t>
+                <a:t>настроек </a:t>
               </a:r>
               <a:r>
-                <a:rPr lang="ru-RU" sz="1600" dirty="0" smtClean="0">
-                  <a:latin typeface="Century Gothic" panose="020B0502020202020204" pitchFamily="34" charset="0"/>
-                </a:rPr>
-                <a:t>астроек </a:t>
-              </a:r>
-              <a:r>
-                <a:rPr lang="en-US" sz="1600" dirty="0" smtClean="0">
+                <a:rPr lang="en-US" sz="1600" dirty="0">
                   <a:latin typeface="Century Gothic" panose="020B0502020202020204" pitchFamily="34" charset="0"/>
                 </a:rPr>
                 <a:t>n</a:t>
               </a:r>
-              <a:endParaRPr lang="en-US" sz="1600" dirty="0">
-                <a:latin typeface="Century Gothic" panose="020B0502020202020204" pitchFamily="34" charset="0"/>
-              </a:endParaRPr>
             </a:p>
           </p:txBody>
         </p:sp>
@@ -9285,7 +11591,7 @@
           <p:nvPr/>
         </p:nvPicPr>
         <p:blipFill>
-          <a:blip r:embed="rId5" cstate="print">
+          <a:blip r:embed="rId7" cstate="print">
             <a:extLst>
               <a:ext uri="{28A0092B-C50C-407E-A947-70E740481C1C}">
                 <a14:useLocalDpi xmlns:a14="http://schemas.microsoft.com/office/drawing/2010/main" val="0"/>
@@ -9321,7 +11627,7 @@
           <p:nvPr/>
         </p:nvPicPr>
         <p:blipFill>
-          <a:blip r:embed="rId7">
+          <a:blip r:embed="rId8">
             <a:extLst>
               <a:ext uri="{28A0092B-C50C-407E-A947-70E740481C1C}">
                 <a14:useLocalDpi xmlns:a14="http://schemas.microsoft.com/office/drawing/2010/main" val="0"/>
@@ -9549,7 +11855,7 @@
             <p:nvPr/>
           </p:nvPicPr>
           <p:blipFill>
-            <a:blip r:embed="rId8" cstate="print">
+            <a:blip r:embed="rId9" cstate="print">
               <a:extLst>
                 <a:ext uri="{28A0092B-C50C-407E-A947-70E740481C1C}">
                   <a14:useLocalDpi xmlns:a14="http://schemas.microsoft.com/office/drawing/2010/main" val="0"/>
@@ -9600,7 +11906,7 @@
             <a:p>
               <a:pPr algn="ctr"/>
               <a:r>
-                <a:rPr lang="ru-RU" sz="1400" dirty="0" smtClean="0">
+                <a:rPr lang="ru-RU" sz="1400" dirty="0">
                   <a:latin typeface="Century Gothic" panose="020B0502020202020204" pitchFamily="34" charset="0"/>
                 </a:rPr>
                 <a:t>Модуль </a:t>
@@ -9612,19 +11918,7 @@
                 <a:rPr lang="ru-RU" sz="1400" dirty="0">
                   <a:latin typeface="Century Gothic" panose="020B0502020202020204" pitchFamily="34" charset="0"/>
                 </a:rPr>
-                <a:t>о</a:t>
-              </a:r>
-              <a:r>
-                <a:rPr lang="ru-RU" sz="1400" dirty="0" smtClean="0">
-                  <a:latin typeface="Century Gothic" panose="020B0502020202020204" pitchFamily="34" charset="0"/>
-                </a:rPr>
-                <a:t>бработки </a:t>
-              </a:r>
-              <a:r>
-                <a:rPr lang="ru-RU" sz="1400" dirty="0" smtClean="0">
-                  <a:latin typeface="Century Gothic" panose="020B0502020202020204" pitchFamily="34" charset="0"/>
-                </a:rPr>
-                <a:t>1</a:t>
+                <a:t>обработки 1</a:t>
               </a:r>
               <a:endParaRPr lang="en-US" sz="1400" dirty="0">
                 <a:latin typeface="Century Gothic" panose="020B0502020202020204" pitchFamily="34" charset="0"/>
@@ -9698,7 +11992,7 @@
             <p:nvPr/>
           </p:nvPicPr>
           <p:blipFill>
-            <a:blip r:embed="rId8" cstate="print">
+            <a:blip r:embed="rId9" cstate="print">
               <a:extLst>
                 <a:ext uri="{28A0092B-C50C-407E-A947-70E740481C1C}">
                   <a14:useLocalDpi xmlns:a14="http://schemas.microsoft.com/office/drawing/2010/main" val="0"/>
@@ -9749,7 +12043,7 @@
             <a:p>
               <a:pPr algn="ctr"/>
               <a:r>
-                <a:rPr lang="ru-RU" sz="1400" dirty="0" smtClean="0">
+                <a:rPr lang="ru-RU" sz="1400" dirty="0">
                   <a:latin typeface="Century Gothic" panose="020B0502020202020204" pitchFamily="34" charset="0"/>
                 </a:rPr>
                 <a:t>Модуль </a:t>
@@ -9761,19 +12055,7 @@
                 <a:rPr lang="ru-RU" sz="1400" dirty="0">
                   <a:latin typeface="Century Gothic" panose="020B0502020202020204" pitchFamily="34" charset="0"/>
                 </a:rPr>
-                <a:t>о</a:t>
-              </a:r>
-              <a:r>
-                <a:rPr lang="ru-RU" sz="1400" dirty="0" smtClean="0">
-                  <a:latin typeface="Century Gothic" panose="020B0502020202020204" pitchFamily="34" charset="0"/>
-                </a:rPr>
-                <a:t>бработки </a:t>
-              </a:r>
-              <a:r>
-                <a:rPr lang="ru-RU" sz="1400" dirty="0">
-                  <a:latin typeface="Century Gothic" panose="020B0502020202020204" pitchFamily="34" charset="0"/>
-                </a:rPr>
-                <a:t>2</a:t>
+                <a:t>обработки 2</a:t>
               </a:r>
               <a:endParaRPr lang="en-US" sz="1400" dirty="0">
                 <a:latin typeface="Century Gothic" panose="020B0502020202020204" pitchFamily="34" charset="0"/>
@@ -9847,7 +12129,7 @@
             <p:nvPr/>
           </p:nvPicPr>
           <p:blipFill>
-            <a:blip r:embed="rId8" cstate="print">
+            <a:blip r:embed="rId9" cstate="print">
               <a:extLst>
                 <a:ext uri="{28A0092B-C50C-407E-A947-70E740481C1C}">
                   <a14:useLocalDpi xmlns:a14="http://schemas.microsoft.com/office/drawing/2010/main" val="0"/>
@@ -9898,7 +12180,7 @@
             <a:p>
               <a:pPr algn="ctr"/>
               <a:r>
-                <a:rPr lang="ru-RU" sz="1400" dirty="0" smtClean="0">
+                <a:rPr lang="ru-RU" sz="1400" dirty="0">
                   <a:latin typeface="Century Gothic" panose="020B0502020202020204" pitchFamily="34" charset="0"/>
                 </a:rPr>
                 <a:t>Модуль </a:t>
@@ -9910,13 +12192,7 @@
                 <a:rPr lang="ru-RU" sz="1400" dirty="0">
                   <a:latin typeface="Century Gothic" panose="020B0502020202020204" pitchFamily="34" charset="0"/>
                 </a:rPr>
-                <a:t>о</a:t>
-              </a:r>
-              <a:r>
-                <a:rPr lang="ru-RU" sz="1400" dirty="0" smtClean="0">
-                  <a:latin typeface="Century Gothic" panose="020B0502020202020204" pitchFamily="34" charset="0"/>
-                </a:rPr>
-                <a:t>бработки </a:t>
+                <a:t>обработки </a:t>
               </a:r>
               <a:r>
                 <a:rPr lang="en-US" sz="1400" dirty="0">
@@ -9924,9 +12200,6 @@
                 </a:rPr>
                 <a:t>n</a:t>
               </a:r>
-              <a:endParaRPr lang="en-US" sz="1400" dirty="0">
-                <a:latin typeface="Century Gothic" panose="020B0502020202020204" pitchFamily="34" charset="0"/>
-              </a:endParaRPr>
             </a:p>
           </p:txBody>
         </p:sp>
@@ -10167,7 +12440,7 @@
             <a:p>
               <a:pPr algn="ctr"/>
               <a:r>
-                <a:rPr lang="ru-RU" sz="1600" dirty="0" smtClean="0">
+                <a:rPr lang="ru-RU" sz="1600" dirty="0">
                   <a:latin typeface="Century Gothic" panose="020B0502020202020204" pitchFamily="34" charset="0"/>
                 </a:rPr>
                 <a:t>Модуль </a:t>
@@ -10179,19 +12452,7 @@
                 <a:rPr lang="ru-RU" sz="1600" dirty="0">
                   <a:latin typeface="Century Gothic" panose="020B0502020202020204" pitchFamily="34" charset="0"/>
                 </a:rPr>
-                <a:t>н</a:t>
-              </a:r>
-              <a:r>
-                <a:rPr lang="ru-RU" sz="1600" dirty="0" smtClean="0">
-                  <a:latin typeface="Century Gothic" panose="020B0502020202020204" pitchFamily="34" charset="0"/>
-                </a:rPr>
-                <a:t>астроек </a:t>
-              </a:r>
-              <a:r>
-                <a:rPr lang="ru-RU" sz="1600" dirty="0" smtClean="0">
-                  <a:latin typeface="Century Gothic" panose="020B0502020202020204" pitchFamily="34" charset="0"/>
-                </a:rPr>
-                <a:t>1</a:t>
+                <a:t>настроек 1</a:t>
               </a:r>
               <a:endParaRPr lang="en-US" sz="1600" dirty="0">
                 <a:latin typeface="Century Gothic" panose="020B0502020202020204" pitchFamily="34" charset="0"/>
@@ -10208,7 +12469,7 @@
             <p:nvPr/>
           </p:nvPicPr>
           <p:blipFill>
-            <a:blip r:embed="rId9"/>
+            <a:blip r:embed="rId10"/>
             <a:stretch>
               <a:fillRect/>
             </a:stretch>
@@ -10233,7 +12494,7 @@
           <p:nvPr/>
         </p:nvPicPr>
         <p:blipFill>
-          <a:blip r:embed="rId9"/>
+          <a:blip r:embed="rId10"/>
           <a:stretch>
             <a:fillRect/>
           </a:stretch>
@@ -10257,7 +12518,7 @@
           <p:nvPr/>
         </p:nvPicPr>
         <p:blipFill>
-          <a:blip r:embed="rId9"/>
+          <a:blip r:embed="rId10"/>
           <a:stretch>
             <a:fillRect/>
           </a:stretch>
@@ -11736,13 +13997,6 @@
   <p:clrMapOvr>
     <a:masterClrMapping/>
   </p:clrMapOvr>
-  <p:timing>
-    <p:tnLst>
-      <p:par>
-        <p:cTn id="1" dur="indefinite" restart="never" nodeType="tmRoot"/>
-      </p:par>
-    </p:tnLst>
-  </p:timing>
 </p:sld>
 </file>
 
@@ -11967,8 +14221,8 @@
         </p:nvSpPr>
         <p:spPr>
           <a:xfrm>
-            <a:off x="180302" y="3719437"/>
-            <a:ext cx="3227900" cy="369332"/>
+            <a:off x="399164" y="3719491"/>
+            <a:ext cx="2806089" cy="369332"/>
           </a:xfrm>
           <a:prstGeom prst="rect">
             <a:avLst/>
@@ -11982,11 +14236,26 @@
           <a:lstStyle/>
           <a:p>
             <a:r>
-              <a:rPr lang="ru-RU" dirty="0">
+              <a:rPr lang="en-US" dirty="0" err="1">
                 <a:latin typeface="Century Gothic" panose="020B0502020202020204" pitchFamily="34" charset="0"/>
               </a:rPr>
-              <a:t>Вызывающее приложение </a:t>
-            </a:r>
+              <a:t>TranzWare</a:t>
+            </a:r>
+            <a:r>
+              <a:rPr lang="en-US" dirty="0">
+                <a:latin typeface="Century Gothic" panose="020B0502020202020204" pitchFamily="34" charset="0"/>
+              </a:rPr>
+              <a:t> </a:t>
+            </a:r>
+            <a:r>
+              <a:rPr lang="en-US" dirty="0" err="1">
+                <a:latin typeface="Century Gothic" panose="020B0502020202020204" pitchFamily="34" charset="0"/>
+              </a:rPr>
+              <a:t>CardFactory</a:t>
+            </a:r>
+            <a:endParaRPr lang="ru-RU" dirty="0">
+              <a:latin typeface="Century Gothic" panose="020B0502020202020204" pitchFamily="34" charset="0"/>
+            </a:endParaRPr>
           </a:p>
         </p:txBody>
       </p:sp>
@@ -12640,66 +14909,6 @@
           </p:txBody>
         </p:sp>
       </p:grpSp>
-      <p:pic>
-        <p:nvPicPr>
-          <p:cNvPr id="38" name="Picture 37">
-            <a:extLst>
-              <a:ext uri="{FF2B5EF4-FFF2-40B4-BE49-F238E27FC236}">
-                <a16:creationId xmlns:a16="http://schemas.microsoft.com/office/drawing/2014/main" id="{5CF948E3-F603-3BD2-4FE5-C6E744E14E68}"/>
-              </a:ext>
-            </a:extLst>
-          </p:cNvPr>
-          <p:cNvPicPr>
-            <a:picLocks noChangeAspect="1"/>
-          </p:cNvPicPr>
-          <p:nvPr/>
-        </p:nvPicPr>
-        <p:blipFill>
-          <a:blip r:embed="rId5"/>
-          <a:stretch>
-            <a:fillRect/>
-          </a:stretch>
-        </p:blipFill>
-        <p:spPr>
-          <a:xfrm rot="10800000">
-            <a:off x="3220559" y="4956284"/>
-            <a:ext cx="1164943" cy="440190"/>
-          </a:xfrm>
-          <a:prstGeom prst="rect">
-            <a:avLst/>
-          </a:prstGeom>
-        </p:spPr>
-      </p:pic>
-      <p:pic>
-        <p:nvPicPr>
-          <p:cNvPr id="39" name="Picture 38">
-            <a:extLst>
-              <a:ext uri="{FF2B5EF4-FFF2-40B4-BE49-F238E27FC236}">
-                <a16:creationId xmlns:a16="http://schemas.microsoft.com/office/drawing/2014/main" id="{AF237C14-B49F-7065-4724-1010BDCA965B}"/>
-              </a:ext>
-            </a:extLst>
-          </p:cNvPr>
-          <p:cNvPicPr>
-            <a:picLocks noChangeAspect="1"/>
-          </p:cNvPicPr>
-          <p:nvPr/>
-        </p:nvPicPr>
-        <p:blipFill>
-          <a:blip r:embed="rId5"/>
-          <a:stretch>
-            <a:fillRect/>
-          </a:stretch>
-        </p:blipFill>
-        <p:spPr>
-          <a:xfrm rot="10800000" flipH="1">
-            <a:off x="3231432" y="5401559"/>
-            <a:ext cx="1164943" cy="440190"/>
-          </a:xfrm>
-          <a:prstGeom prst="rect">
-            <a:avLst/>
-          </a:prstGeom>
-        </p:spPr>
-      </p:pic>
       <p:grpSp>
         <p:nvGrpSpPr>
           <p:cNvPr id="48" name="Group 47"/>
@@ -12775,66 +14984,6 @@
           </p:spPr>
         </p:pic>
       </p:grpSp>
-      <p:pic>
-        <p:nvPicPr>
-          <p:cNvPr id="41" name="Picture 40">
-            <a:extLst>
-              <a:ext uri="{FF2B5EF4-FFF2-40B4-BE49-F238E27FC236}">
-                <a16:creationId xmlns:a16="http://schemas.microsoft.com/office/drawing/2014/main" id="{B0FA053D-C9B4-8788-553B-6FA475531D1E}"/>
-              </a:ext>
-            </a:extLst>
-          </p:cNvPr>
-          <p:cNvPicPr>
-            <a:picLocks noChangeAspect="1"/>
-          </p:cNvPicPr>
-          <p:nvPr/>
-        </p:nvPicPr>
-        <p:blipFill>
-          <a:blip r:embed="rId5"/>
-          <a:stretch>
-            <a:fillRect/>
-          </a:stretch>
-        </p:blipFill>
-        <p:spPr>
-          <a:xfrm rot="10800000">
-            <a:off x="5693714" y="4956284"/>
-            <a:ext cx="1164943" cy="440190"/>
-          </a:xfrm>
-          <a:prstGeom prst="rect">
-            <a:avLst/>
-          </a:prstGeom>
-        </p:spPr>
-      </p:pic>
-      <p:pic>
-        <p:nvPicPr>
-          <p:cNvPr id="42" name="Picture 41">
-            <a:extLst>
-              <a:ext uri="{FF2B5EF4-FFF2-40B4-BE49-F238E27FC236}">
-                <a16:creationId xmlns:a16="http://schemas.microsoft.com/office/drawing/2014/main" id="{B4763D50-8704-0C2E-88D6-6B0174AEF085}"/>
-              </a:ext>
-            </a:extLst>
-          </p:cNvPr>
-          <p:cNvPicPr>
-            <a:picLocks noChangeAspect="1"/>
-          </p:cNvPicPr>
-          <p:nvPr/>
-        </p:nvPicPr>
-        <p:blipFill>
-          <a:blip r:embed="rId5"/>
-          <a:stretch>
-            <a:fillRect/>
-          </a:stretch>
-        </p:blipFill>
-        <p:spPr>
-          <a:xfrm rot="10800000" flipH="1">
-            <a:off x="5704587" y="5401559"/>
-            <a:ext cx="1164943" cy="440190"/>
-          </a:xfrm>
-          <a:prstGeom prst="rect">
-            <a:avLst/>
-          </a:prstGeom>
-        </p:spPr>
-      </p:pic>
       <p:pic>
         <p:nvPicPr>
           <p:cNvPr id="43" name="Picture 42">
@@ -13245,6 +15394,162 @@
           </a:p>
         </p:txBody>
       </p:sp>
+      <p:pic>
+        <p:nvPicPr>
+          <p:cNvPr id="6" name="Picture 5">
+            <a:extLst>
+              <a:ext uri="{FF2B5EF4-FFF2-40B4-BE49-F238E27FC236}">
+                <a16:creationId xmlns:a16="http://schemas.microsoft.com/office/drawing/2014/main" id="{4C2BB202-4FCA-1003-4FD8-D73EBB1B2F16}"/>
+              </a:ext>
+            </a:extLst>
+          </p:cNvPr>
+          <p:cNvPicPr>
+            <a:picLocks noChangeAspect="1"/>
+          </p:cNvPicPr>
+          <p:nvPr/>
+        </p:nvPicPr>
+        <p:blipFill>
+          <a:blip r:embed="rId10" cstate="print">
+            <a:extLst>
+              <a:ext uri="{28A0092B-C50C-407E-A947-70E740481C1C}">
+                <a14:useLocalDpi xmlns:a14="http://schemas.microsoft.com/office/drawing/2010/main" val="0"/>
+              </a:ext>
+            </a:extLst>
+          </a:blip>
+          <a:stretch>
+            <a:fillRect/>
+          </a:stretch>
+        </p:blipFill>
+        <p:spPr>
+          <a:xfrm>
+            <a:off x="10045170" y="4948001"/>
+            <a:ext cx="1591093" cy="953582"/>
+          </a:xfrm>
+          <a:prstGeom prst="rect">
+            <a:avLst/>
+          </a:prstGeom>
+        </p:spPr>
+      </p:pic>
+      <p:pic>
+        <p:nvPicPr>
+          <p:cNvPr id="16" name="Picture 15">
+            <a:extLst>
+              <a:ext uri="{FF2B5EF4-FFF2-40B4-BE49-F238E27FC236}">
+                <a16:creationId xmlns:a16="http://schemas.microsoft.com/office/drawing/2014/main" id="{CEC84ECF-E301-9167-7DE1-79EDE2277973}"/>
+              </a:ext>
+            </a:extLst>
+          </p:cNvPr>
+          <p:cNvPicPr>
+            <a:picLocks noChangeAspect="1"/>
+          </p:cNvPicPr>
+          <p:nvPr/>
+        </p:nvPicPr>
+        <p:blipFill>
+          <a:blip r:embed="rId5"/>
+          <a:stretch>
+            <a:fillRect/>
+          </a:stretch>
+        </p:blipFill>
+        <p:spPr>
+          <a:xfrm rot="10800000">
+            <a:off x="5722721" y="5018774"/>
+            <a:ext cx="1146960" cy="342224"/>
+          </a:xfrm>
+          <a:prstGeom prst="rect">
+            <a:avLst/>
+          </a:prstGeom>
+        </p:spPr>
+      </p:pic>
+      <p:pic>
+        <p:nvPicPr>
+          <p:cNvPr id="18" name="Picture 17">
+            <a:extLst>
+              <a:ext uri="{FF2B5EF4-FFF2-40B4-BE49-F238E27FC236}">
+                <a16:creationId xmlns:a16="http://schemas.microsoft.com/office/drawing/2014/main" id="{1D4A90F9-D5E2-0950-1E01-BB7CF9A1D4B6}"/>
+              </a:ext>
+            </a:extLst>
+          </p:cNvPr>
+          <p:cNvPicPr>
+            <a:picLocks noChangeAspect="1"/>
+          </p:cNvPicPr>
+          <p:nvPr/>
+        </p:nvPicPr>
+        <p:blipFill>
+          <a:blip r:embed="rId5"/>
+          <a:stretch>
+            <a:fillRect/>
+          </a:stretch>
+        </p:blipFill>
+        <p:spPr>
+          <a:xfrm rot="10800000" flipH="1">
+            <a:off x="5733595" y="5464049"/>
+            <a:ext cx="1146962" cy="342224"/>
+          </a:xfrm>
+          <a:prstGeom prst="rect">
+            <a:avLst/>
+          </a:prstGeom>
+        </p:spPr>
+      </p:pic>
+      <p:pic>
+        <p:nvPicPr>
+          <p:cNvPr id="21" name="Picture 20">
+            <a:extLst>
+              <a:ext uri="{FF2B5EF4-FFF2-40B4-BE49-F238E27FC236}">
+                <a16:creationId xmlns:a16="http://schemas.microsoft.com/office/drawing/2014/main" id="{46673D39-38B0-2E2F-8A17-75DD311248B5}"/>
+              </a:ext>
+            </a:extLst>
+          </p:cNvPr>
+          <p:cNvPicPr>
+            <a:picLocks noChangeAspect="1"/>
+          </p:cNvPicPr>
+          <p:nvPr/>
+        </p:nvPicPr>
+        <p:blipFill>
+          <a:blip r:embed="rId5"/>
+          <a:stretch>
+            <a:fillRect/>
+          </a:stretch>
+        </p:blipFill>
+        <p:spPr>
+          <a:xfrm rot="10800000">
+            <a:off x="3243250" y="5007056"/>
+            <a:ext cx="1146960" cy="342224"/>
+          </a:xfrm>
+          <a:prstGeom prst="rect">
+            <a:avLst/>
+          </a:prstGeom>
+        </p:spPr>
+      </p:pic>
+      <p:pic>
+        <p:nvPicPr>
+          <p:cNvPr id="25" name="Picture 24">
+            <a:extLst>
+              <a:ext uri="{FF2B5EF4-FFF2-40B4-BE49-F238E27FC236}">
+                <a16:creationId xmlns:a16="http://schemas.microsoft.com/office/drawing/2014/main" id="{DF88766D-1513-B9DF-5308-B9E4B3A67B4F}"/>
+              </a:ext>
+            </a:extLst>
+          </p:cNvPr>
+          <p:cNvPicPr>
+            <a:picLocks noChangeAspect="1"/>
+          </p:cNvPicPr>
+          <p:nvPr/>
+        </p:nvPicPr>
+        <p:blipFill>
+          <a:blip r:embed="rId5"/>
+          <a:stretch>
+            <a:fillRect/>
+          </a:stretch>
+        </p:blipFill>
+        <p:spPr>
+          <a:xfrm rot="10800000" flipH="1">
+            <a:off x="3254124" y="5452331"/>
+            <a:ext cx="1146962" cy="342224"/>
+          </a:xfrm>
+          <a:prstGeom prst="rect">
+            <a:avLst/>
+          </a:prstGeom>
+        </p:spPr>
+      </p:pic>
     </p:spTree>
     <p:extLst>
       <p:ext uri="{BB962C8B-B14F-4D97-AF65-F5344CB8AC3E}">
@@ -13469,7 +15774,7 @@
                                           </p:stCondLst>
                                         </p:cTn>
                                         <p:tgtEl>
-                                          <p:spTgt spid="38"/>
+                                          <p:spTgt spid="46"/>
                                         </p:tgtEl>
                                         <p:attrNameLst>
                                           <p:attrName>style.visibility</p:attrName>
@@ -13514,7 +15819,7 @@
                                           </p:stCondLst>
                                         </p:cTn>
                                         <p:tgtEl>
-                                          <p:spTgt spid="39"/>
+                                          <p:spTgt spid="47"/>
                                         </p:tgtEl>
                                         <p:attrNameLst>
                                           <p:attrName>style.visibility</p:attrName>
@@ -13559,7 +15864,7 @@
                                           </p:stCondLst>
                                         </p:cTn>
                                         <p:tgtEl>
-                                          <p:spTgt spid="41"/>
+                                          <p:spTgt spid="50"/>
                                         </p:tgtEl>
                                         <p:attrNameLst>
                                           <p:attrName>style.visibility</p:attrName>
@@ -13604,7 +15909,7 @@
                                           </p:stCondLst>
                                         </p:cTn>
                                         <p:tgtEl>
-                                          <p:spTgt spid="42"/>
+                                          <p:spTgt spid="51"/>
                                         </p:tgtEl>
                                         <p:attrNameLst>
                                           <p:attrName>style.visibility</p:attrName>
@@ -13649,7 +15954,7 @@
                                           </p:stCondLst>
                                         </p:cTn>
                                         <p:tgtEl>
-                                          <p:spTgt spid="46"/>
+                                          <p:spTgt spid="16"/>
                                         </p:tgtEl>
                                         <p:attrNameLst>
                                           <p:attrName>style.visibility</p:attrName>
@@ -13694,7 +15999,7 @@
                                           </p:stCondLst>
                                         </p:cTn>
                                         <p:tgtEl>
-                                          <p:spTgt spid="47"/>
+                                          <p:spTgt spid="18"/>
                                         </p:tgtEl>
                                         <p:attrNameLst>
                                           <p:attrName>style.visibility</p:attrName>
@@ -13739,7 +16044,7 @@
                                           </p:stCondLst>
                                         </p:cTn>
                                         <p:tgtEl>
-                                          <p:spTgt spid="50"/>
+                                          <p:spTgt spid="21"/>
                                         </p:tgtEl>
                                         <p:attrNameLst>
                                           <p:attrName>style.visibility</p:attrName>
@@ -13784,7 +16089,7 @@
                                           </p:stCondLst>
                                         </p:cTn>
                                         <p:tgtEl>
-                                          <p:spTgt spid="51"/>
+                                          <p:spTgt spid="25"/>
                                         </p:tgtEl>
                                         <p:attrNameLst>
                                           <p:attrName>style.visibility</p:attrName>

</xml_diff>

<commit_message>
Almost completed presentation. Add TCPScript scripts.
</commit_message>
<xml_diff>
--- a/Presentation/NMSTU_Presentation.pptx
+++ b/Presentation/NMSTU_Presentation.pptx
@@ -16,9 +16,8 @@
     <p:sldId id="261" r:id="rId10"/>
     <p:sldId id="270" r:id="rId11"/>
     <p:sldId id="271" r:id="rId12"/>
-    <p:sldId id="266" r:id="rId13"/>
-    <p:sldId id="264" r:id="rId14"/>
-    <p:sldId id="265" r:id="rId15"/>
+    <p:sldId id="272" r:id="rId13"/>
+    <p:sldId id="265" r:id="rId14"/>
   </p:sldIdLst>
   <p:sldSz cx="12192000" cy="6858000"/>
   <p:notesSz cx="6888163" cy="10020300"/>
@@ -254,7 +253,7 @@
           <a:p>
             <a:fld id="{1F6E986D-4B21-4B91-B1D2-5CFC0D3D8AEF}" type="datetimeFigureOut">
               <a:rPr lang="ru-RU" smtClean="0"/>
-              <a:t>22.05.2025</a:t>
+              <a:t>23.05.2025</a:t>
             </a:fld>
             <a:endParaRPr lang="ru-RU"/>
           </a:p>
@@ -422,7 +421,7 @@
           <a:p>
             <a:fld id="{1F6E986D-4B21-4B91-B1D2-5CFC0D3D8AEF}" type="datetimeFigureOut">
               <a:rPr lang="ru-RU" smtClean="0"/>
-              <a:t>22.05.2025</a:t>
+              <a:t>23.05.2025</a:t>
             </a:fld>
             <a:endParaRPr lang="ru-RU"/>
           </a:p>
@@ -600,7 +599,7 @@
           <a:p>
             <a:fld id="{1F6E986D-4B21-4B91-B1D2-5CFC0D3D8AEF}" type="datetimeFigureOut">
               <a:rPr lang="ru-RU" smtClean="0"/>
-              <a:t>22.05.2025</a:t>
+              <a:t>23.05.2025</a:t>
             </a:fld>
             <a:endParaRPr lang="ru-RU"/>
           </a:p>
@@ -768,7 +767,7 @@
           <a:p>
             <a:fld id="{1F6E986D-4B21-4B91-B1D2-5CFC0D3D8AEF}" type="datetimeFigureOut">
               <a:rPr lang="ru-RU" smtClean="0"/>
-              <a:t>22.05.2025</a:t>
+              <a:t>23.05.2025</a:t>
             </a:fld>
             <a:endParaRPr lang="ru-RU"/>
           </a:p>
@@ -1013,7 +1012,7 @@
           <a:p>
             <a:fld id="{1F6E986D-4B21-4B91-B1D2-5CFC0D3D8AEF}" type="datetimeFigureOut">
               <a:rPr lang="ru-RU" smtClean="0"/>
-              <a:t>22.05.2025</a:t>
+              <a:t>23.05.2025</a:t>
             </a:fld>
             <a:endParaRPr lang="ru-RU"/>
           </a:p>
@@ -1242,7 +1241,7 @@
           <a:p>
             <a:fld id="{1F6E986D-4B21-4B91-B1D2-5CFC0D3D8AEF}" type="datetimeFigureOut">
               <a:rPr lang="ru-RU" smtClean="0"/>
-              <a:t>22.05.2025</a:t>
+              <a:t>23.05.2025</a:t>
             </a:fld>
             <a:endParaRPr lang="ru-RU"/>
           </a:p>
@@ -1606,7 +1605,7 @@
           <a:p>
             <a:fld id="{1F6E986D-4B21-4B91-B1D2-5CFC0D3D8AEF}" type="datetimeFigureOut">
               <a:rPr lang="ru-RU" smtClean="0"/>
-              <a:t>22.05.2025</a:t>
+              <a:t>23.05.2025</a:t>
             </a:fld>
             <a:endParaRPr lang="ru-RU"/>
           </a:p>
@@ -1723,7 +1722,7 @@
           <a:p>
             <a:fld id="{1F6E986D-4B21-4B91-B1D2-5CFC0D3D8AEF}" type="datetimeFigureOut">
               <a:rPr lang="ru-RU" smtClean="0"/>
-              <a:t>22.05.2025</a:t>
+              <a:t>23.05.2025</a:t>
             </a:fld>
             <a:endParaRPr lang="ru-RU"/>
           </a:p>
@@ -1818,7 +1817,7 @@
           <a:p>
             <a:fld id="{1F6E986D-4B21-4B91-B1D2-5CFC0D3D8AEF}" type="datetimeFigureOut">
               <a:rPr lang="ru-RU" smtClean="0"/>
-              <a:t>22.05.2025</a:t>
+              <a:t>23.05.2025</a:t>
             </a:fld>
             <a:endParaRPr lang="ru-RU"/>
           </a:p>
@@ -2093,7 +2092,7 @@
           <a:p>
             <a:fld id="{1F6E986D-4B21-4B91-B1D2-5CFC0D3D8AEF}" type="datetimeFigureOut">
               <a:rPr lang="ru-RU" smtClean="0"/>
-              <a:t>22.05.2025</a:t>
+              <a:t>23.05.2025</a:t>
             </a:fld>
             <a:endParaRPr lang="ru-RU"/>
           </a:p>
@@ -2345,7 +2344,7 @@
           <a:p>
             <a:fld id="{1F6E986D-4B21-4B91-B1D2-5CFC0D3D8AEF}" type="datetimeFigureOut">
               <a:rPr lang="ru-RU" smtClean="0"/>
-              <a:t>22.05.2025</a:t>
+              <a:t>23.05.2025</a:t>
             </a:fld>
             <a:endParaRPr lang="ru-RU"/>
           </a:p>
@@ -2556,7 +2555,7 @@
           <a:p>
             <a:fld id="{1F6E986D-4B21-4B91-B1D2-5CFC0D3D8AEF}" type="datetimeFigureOut">
               <a:rPr lang="ru-RU" smtClean="0"/>
-              <a:t>22.05.2025</a:t>
+              <a:t>23.05.2025</a:t>
             </a:fld>
             <a:endParaRPr lang="ru-RU"/>
           </a:p>
@@ -3785,268 +3784,6 @@
       </p:sp>
       <p:grpSp>
         <p:nvGrpSpPr>
-          <p:cNvPr id="53" name="Group 52"/>
-          <p:cNvGrpSpPr/>
-          <p:nvPr/>
-        </p:nvGrpSpPr>
-        <p:grpSpPr>
-          <a:xfrm>
-            <a:off x="5800453" y="2573774"/>
-            <a:ext cx="1321445" cy="1562459"/>
-            <a:chOff x="4459057" y="4591624"/>
-            <a:chExt cx="1321445" cy="1562459"/>
-          </a:xfrm>
-        </p:grpSpPr>
-        <p:pic>
-          <p:nvPicPr>
-            <p:cNvPr id="54" name="Picture 53">
-              <a:extLst>
-                <a:ext uri="{FF2B5EF4-FFF2-40B4-BE49-F238E27FC236}">
-                  <a16:creationId xmlns:a16="http://schemas.microsoft.com/office/drawing/2014/main" id="{9794B69E-09D4-23A3-CDBB-6C6AFAD7B7B0}"/>
-                </a:ext>
-              </a:extLst>
-            </p:cNvPr>
-            <p:cNvPicPr>
-              <a:picLocks noChangeAspect="1"/>
-            </p:cNvPicPr>
-            <p:nvPr/>
-          </p:nvPicPr>
-          <p:blipFill>
-            <a:blip r:embed="rId3">
-              <a:extLst>
-                <a:ext uri="{28A0092B-C50C-407E-A947-70E740481C1C}">
-                  <a14:useLocalDpi xmlns:a14="http://schemas.microsoft.com/office/drawing/2010/main" val="0"/>
-                </a:ext>
-              </a:extLst>
-            </a:blip>
-            <a:stretch>
-              <a:fillRect/>
-            </a:stretch>
-          </p:blipFill>
-          <p:spPr>
-            <a:xfrm>
-              <a:off x="4459057" y="4591624"/>
-              <a:ext cx="1164942" cy="1562459"/>
-            </a:xfrm>
-            <a:prstGeom prst="rect">
-              <a:avLst/>
-            </a:prstGeom>
-          </p:spPr>
-        </p:pic>
-        <p:pic>
-          <p:nvPicPr>
-            <p:cNvPr id="55" name="Picture 54">
-              <a:extLst>
-                <a:ext uri="{FF2B5EF4-FFF2-40B4-BE49-F238E27FC236}">
-                  <a16:creationId xmlns:a16="http://schemas.microsoft.com/office/drawing/2014/main" id="{54FD0773-E414-71C1-CD4F-11915174B592}"/>
-                </a:ext>
-              </a:extLst>
-            </p:cNvPr>
-            <p:cNvPicPr>
-              <a:picLocks noChangeAspect="1"/>
-            </p:cNvPicPr>
-            <p:nvPr/>
-          </p:nvPicPr>
-          <p:blipFill>
-            <a:blip r:embed="rId4" cstate="print">
-              <a:extLst>
-                <a:ext uri="{28A0092B-C50C-407E-A947-70E740481C1C}">
-                  <a14:useLocalDpi xmlns:a14="http://schemas.microsoft.com/office/drawing/2010/main" val="0"/>
-                </a:ext>
-              </a:extLst>
-            </a:blip>
-            <a:stretch>
-              <a:fillRect/>
-            </a:stretch>
-          </p:blipFill>
-          <p:spPr>
-            <a:xfrm>
-              <a:off x="4615748" y="4727446"/>
-              <a:ext cx="851560" cy="620342"/>
-            </a:xfrm>
-            <a:prstGeom prst="rect">
-              <a:avLst/>
-            </a:prstGeom>
-          </p:spPr>
-        </p:pic>
-        <p:sp>
-          <p:nvSpPr>
-            <p:cNvPr id="56" name="TextBox 55">
-              <a:extLst>
-                <a:ext uri="{FF2B5EF4-FFF2-40B4-BE49-F238E27FC236}">
-                  <a16:creationId xmlns:a16="http://schemas.microsoft.com/office/drawing/2014/main" id="{40814F84-C5CB-7495-FDB8-4594AD13574B}"/>
-                </a:ext>
-              </a:extLst>
-            </p:cNvPr>
-            <p:cNvSpPr txBox="1"/>
-            <p:nvPr/>
-          </p:nvSpPr>
-          <p:spPr>
-            <a:xfrm>
-              <a:off x="4506434" y="5395317"/>
-              <a:ext cx="1274068" cy="584775"/>
-            </a:xfrm>
-            <a:prstGeom prst="rect">
-              <a:avLst/>
-            </a:prstGeom>
-            <a:noFill/>
-          </p:spPr>
-          <p:txBody>
-            <a:bodyPr wrap="square" rtlCol="0">
-              <a:spAutoFit/>
-            </a:bodyPr>
-            <a:lstStyle/>
-            <a:p>
-              <a:r>
-                <a:rPr lang="ru-RU" sz="1600" dirty="0">
-                  <a:latin typeface="Century Gothic" panose="020B0502020202020204" pitchFamily="34" charset="0"/>
-                </a:rPr>
-                <a:t>Драйвер </a:t>
-              </a:r>
-            </a:p>
-            <a:p>
-              <a:r>
-                <a:rPr lang="en-US" sz="1600" dirty="0">
-                  <a:latin typeface="Century Gothic" panose="020B0502020202020204" pitchFamily="34" charset="0"/>
-                </a:rPr>
-                <a:t>MATICA</a:t>
-              </a:r>
-              <a:endParaRPr lang="ru-RU" sz="1600" dirty="0">
-                <a:latin typeface="Century Gothic" panose="020B0502020202020204" pitchFamily="34" charset="0"/>
-              </a:endParaRPr>
-            </a:p>
-          </p:txBody>
-        </p:sp>
-      </p:grpSp>
-      <p:grpSp>
-        <p:nvGrpSpPr>
-          <p:cNvPr id="61" name="Group 60"/>
-          <p:cNvGrpSpPr/>
-          <p:nvPr/>
-        </p:nvGrpSpPr>
-        <p:grpSpPr>
-          <a:xfrm>
-            <a:off x="4579783" y="2580432"/>
-            <a:ext cx="1307252" cy="1562459"/>
-            <a:chOff x="2008240" y="4591624"/>
-            <a:chExt cx="1307252" cy="1562459"/>
-          </a:xfrm>
-        </p:grpSpPr>
-        <p:pic>
-          <p:nvPicPr>
-            <p:cNvPr id="62" name="Picture 61">
-              <a:extLst>
-                <a:ext uri="{FF2B5EF4-FFF2-40B4-BE49-F238E27FC236}">
-                  <a16:creationId xmlns:a16="http://schemas.microsoft.com/office/drawing/2014/main" id="{8F54CE67-D52E-7E47-20F6-FEA4C453374D}"/>
-                </a:ext>
-              </a:extLst>
-            </p:cNvPr>
-            <p:cNvPicPr>
-              <a:picLocks noChangeAspect="1"/>
-            </p:cNvPicPr>
-            <p:nvPr/>
-          </p:nvPicPr>
-          <p:blipFill>
-            <a:blip r:embed="rId3">
-              <a:extLst>
-                <a:ext uri="{28A0092B-C50C-407E-A947-70E740481C1C}">
-                  <a14:useLocalDpi xmlns:a14="http://schemas.microsoft.com/office/drawing/2010/main" val="0"/>
-                </a:ext>
-              </a:extLst>
-            </a:blip>
-            <a:stretch>
-              <a:fillRect/>
-            </a:stretch>
-          </p:blipFill>
-          <p:spPr>
-            <a:xfrm>
-              <a:off x="2008240" y="4591624"/>
-              <a:ext cx="1164942" cy="1562459"/>
-            </a:xfrm>
-            <a:prstGeom prst="rect">
-              <a:avLst/>
-            </a:prstGeom>
-          </p:spPr>
-        </p:pic>
-        <p:sp>
-          <p:nvSpPr>
-            <p:cNvPr id="63" name="TextBox 62">
-              <a:extLst>
-                <a:ext uri="{FF2B5EF4-FFF2-40B4-BE49-F238E27FC236}">
-                  <a16:creationId xmlns:a16="http://schemas.microsoft.com/office/drawing/2014/main" id="{358BBECC-6C15-992F-2037-2C2455C6AF93}"/>
-                </a:ext>
-              </a:extLst>
-            </p:cNvPr>
-            <p:cNvSpPr txBox="1"/>
-            <p:nvPr/>
-          </p:nvSpPr>
-          <p:spPr>
-            <a:xfrm>
-              <a:off x="2041424" y="5278921"/>
-              <a:ext cx="1274068" cy="830997"/>
-            </a:xfrm>
-            <a:prstGeom prst="rect">
-              <a:avLst/>
-            </a:prstGeom>
-            <a:noFill/>
-          </p:spPr>
-          <p:txBody>
-            <a:bodyPr wrap="square" rtlCol="0">
-              <a:spAutoFit/>
-            </a:bodyPr>
-            <a:lstStyle/>
-            <a:p>
-              <a:r>
-                <a:rPr lang="ru-RU" sz="1600" dirty="0">
-                  <a:latin typeface="Century Gothic" panose="020B0502020202020204" pitchFamily="34" charset="0"/>
-                </a:rPr>
-                <a:t>Драйвер записи карты</a:t>
-              </a:r>
-              <a:endParaRPr lang="en-US" sz="1600" dirty="0">
-                <a:latin typeface="Century Gothic" panose="020B0502020202020204" pitchFamily="34" charset="0"/>
-              </a:endParaRPr>
-            </a:p>
-          </p:txBody>
-        </p:sp>
-        <p:pic>
-          <p:nvPicPr>
-            <p:cNvPr id="64" name="Picture 63">
-              <a:extLst>
-                <a:ext uri="{FF2B5EF4-FFF2-40B4-BE49-F238E27FC236}">
-                  <a16:creationId xmlns:a16="http://schemas.microsoft.com/office/drawing/2014/main" id="{872B8CBA-1FE8-450E-1183-4DF1802B2AF2}"/>
-                </a:ext>
-              </a:extLst>
-            </p:cNvPr>
-            <p:cNvPicPr>
-              <a:picLocks noChangeAspect="1"/>
-            </p:cNvPicPr>
-            <p:nvPr/>
-          </p:nvPicPr>
-          <p:blipFill>
-            <a:blip r:embed="rId5" cstate="print">
-              <a:extLst>
-                <a:ext uri="{28A0092B-C50C-407E-A947-70E740481C1C}">
-                  <a14:useLocalDpi xmlns:a14="http://schemas.microsoft.com/office/drawing/2010/main" val="0"/>
-                </a:ext>
-              </a:extLst>
-            </a:blip>
-            <a:stretch>
-              <a:fillRect/>
-            </a:stretch>
-          </p:blipFill>
-          <p:spPr>
-            <a:xfrm>
-              <a:off x="2162261" y="4863507"/>
-              <a:ext cx="728960" cy="436884"/>
-            </a:xfrm>
-            <a:prstGeom prst="rect">
-              <a:avLst/>
-            </a:prstGeom>
-          </p:spPr>
-        </p:pic>
-      </p:grpSp>
-      <p:grpSp>
-        <p:nvGrpSpPr>
           <p:cNvPr id="65" name="Group 64"/>
           <p:cNvGrpSpPr/>
           <p:nvPr/>
@@ -4202,8 +3939,8 @@
         </p:nvSpPr>
         <p:spPr>
           <a:xfrm>
-            <a:off x="4472777" y="1247377"/>
-            <a:ext cx="3076508" cy="687297"/>
+            <a:off x="4445407" y="1043329"/>
+            <a:ext cx="2804845" cy="626607"/>
           </a:xfrm>
           <a:prstGeom prst="rect">
             <a:avLst/>
@@ -4240,7 +3977,19 @@
               <a:rPr lang="en-US" sz="2400" dirty="0">
                 <a:latin typeface="Century Gothic" panose="020B0502020202020204" pitchFamily="34" charset="0"/>
               </a:rPr>
-              <a:t>void start()</a:t>
+              <a:t>void </a:t>
+            </a:r>
+            <a:r>
+              <a:rPr lang="en-US" sz="2400" dirty="0" smtClean="0">
+                <a:latin typeface="Century Gothic" panose="020B0502020202020204" pitchFamily="34" charset="0"/>
+              </a:rPr>
+              <a:t>Start</a:t>
+            </a:r>
+            <a:r>
+              <a:rPr lang="en-US" sz="2400" dirty="0">
+                <a:latin typeface="Century Gothic" panose="020B0502020202020204" pitchFamily="34" charset="0"/>
+              </a:rPr>
+              <a:t>()</a:t>
             </a:r>
           </a:p>
         </p:txBody>
@@ -4263,8 +4012,8 @@
         </p:nvCxnSpPr>
         <p:spPr>
           <a:xfrm flipV="1">
-            <a:off x="2313210" y="1591026"/>
-            <a:ext cx="2159567" cy="955146"/>
+            <a:off x="2313210" y="1356633"/>
+            <a:ext cx="2132197" cy="1189539"/>
           </a:xfrm>
           <a:prstGeom prst="bentConnector3">
             <a:avLst/>
@@ -4393,60 +4142,337 @@
           </a:fontRef>
         </p:style>
       </p:cxnSp>
-      <p:sp>
-        <p:nvSpPr>
-          <p:cNvPr id="17" name="Rectangle 16">
-            <a:extLst>
-              <a:ext uri="{FF2B5EF4-FFF2-40B4-BE49-F238E27FC236}">
-                <a16:creationId xmlns:a16="http://schemas.microsoft.com/office/drawing/2014/main" id="{36722387-9728-CADC-55F2-6E6852806B3A}"/>
-              </a:ext>
-            </a:extLst>
-          </p:cNvPr>
-          <p:cNvSpPr/>
-          <p:nvPr/>
-        </p:nvSpPr>
-        <p:spPr>
-          <a:xfrm>
-            <a:off x="4472777" y="2465057"/>
+      <p:grpSp>
+        <p:nvGrpSpPr>
+          <p:cNvPr id="31" name="Group 30"/>
+          <p:cNvGrpSpPr/>
+          <p:nvPr/>
+        </p:nvGrpSpPr>
+        <p:grpSpPr>
+          <a:xfrm>
+            <a:off x="4472777" y="2737527"/>
             <a:ext cx="2649121" cy="1795324"/>
-          </a:xfrm>
-          <a:prstGeom prst="rect">
-            <a:avLst/>
-          </a:prstGeom>
-          <a:noFill/>
-          <a:ln w="76200">
-            <a:solidFill>
-              <a:schemeClr val="accent1">
-                <a:lumMod val="50000"/>
-              </a:schemeClr>
-            </a:solidFill>
-          </a:ln>
-        </p:spPr>
-        <p:style>
-          <a:lnRef idx="2">
-            <a:schemeClr val="accent6"/>
-          </a:lnRef>
-          <a:fillRef idx="1">
-            <a:schemeClr val="lt1"/>
-          </a:fillRef>
-          <a:effectRef idx="0">
-            <a:schemeClr val="accent6"/>
-          </a:effectRef>
-          <a:fontRef idx="minor">
-            <a:schemeClr val="dk1"/>
-          </a:fontRef>
-        </p:style>
-        <p:txBody>
-          <a:bodyPr rtlCol="0" anchor="ctr"/>
-          <a:lstStyle/>
-          <a:p>
-            <a:pPr algn="ctr"/>
-            <a:endParaRPr lang="en-US" sz="2400" dirty="0">
-              <a:latin typeface="Century Gothic" panose="020B0502020202020204" pitchFamily="34" charset="0"/>
-            </a:endParaRPr>
-          </a:p>
-        </p:txBody>
-      </p:sp>
+            <a:chOff x="4472777" y="2465057"/>
+            <a:chExt cx="2649121" cy="1795324"/>
+          </a:xfrm>
+        </p:grpSpPr>
+        <p:grpSp>
+          <p:nvGrpSpPr>
+            <p:cNvPr id="53" name="Group 52"/>
+            <p:cNvGrpSpPr/>
+            <p:nvPr/>
+          </p:nvGrpSpPr>
+          <p:grpSpPr>
+            <a:xfrm>
+              <a:off x="5800453" y="2573774"/>
+              <a:ext cx="1321445" cy="1562459"/>
+              <a:chOff x="4459057" y="4591624"/>
+              <a:chExt cx="1321445" cy="1562459"/>
+            </a:xfrm>
+          </p:grpSpPr>
+          <p:pic>
+            <p:nvPicPr>
+              <p:cNvPr id="54" name="Picture 53">
+                <a:extLst>
+                  <a:ext uri="{FF2B5EF4-FFF2-40B4-BE49-F238E27FC236}">
+                    <a16:creationId xmlns:a16="http://schemas.microsoft.com/office/drawing/2014/main" id="{9794B69E-09D4-23A3-CDBB-6C6AFAD7B7B0}"/>
+                  </a:ext>
+                </a:extLst>
+              </p:cNvPr>
+              <p:cNvPicPr>
+                <a:picLocks noChangeAspect="1"/>
+              </p:cNvPicPr>
+              <p:nvPr/>
+            </p:nvPicPr>
+            <p:blipFill>
+              <a:blip r:embed="rId3">
+                <a:extLst>
+                  <a:ext uri="{28A0092B-C50C-407E-A947-70E740481C1C}">
+                    <a14:useLocalDpi xmlns:a14="http://schemas.microsoft.com/office/drawing/2010/main" val="0"/>
+                  </a:ext>
+                </a:extLst>
+              </a:blip>
+              <a:stretch>
+                <a:fillRect/>
+              </a:stretch>
+            </p:blipFill>
+            <p:spPr>
+              <a:xfrm>
+                <a:off x="4459057" y="4591624"/>
+                <a:ext cx="1164942" cy="1562459"/>
+              </a:xfrm>
+              <a:prstGeom prst="rect">
+                <a:avLst/>
+              </a:prstGeom>
+            </p:spPr>
+          </p:pic>
+          <p:pic>
+            <p:nvPicPr>
+              <p:cNvPr id="55" name="Picture 54">
+                <a:extLst>
+                  <a:ext uri="{FF2B5EF4-FFF2-40B4-BE49-F238E27FC236}">
+                    <a16:creationId xmlns:a16="http://schemas.microsoft.com/office/drawing/2014/main" id="{54FD0773-E414-71C1-CD4F-11915174B592}"/>
+                  </a:ext>
+                </a:extLst>
+              </p:cNvPr>
+              <p:cNvPicPr>
+                <a:picLocks noChangeAspect="1"/>
+              </p:cNvPicPr>
+              <p:nvPr/>
+            </p:nvPicPr>
+            <p:blipFill>
+              <a:blip r:embed="rId4" cstate="print">
+                <a:extLst>
+                  <a:ext uri="{28A0092B-C50C-407E-A947-70E740481C1C}">
+                    <a14:useLocalDpi xmlns:a14="http://schemas.microsoft.com/office/drawing/2010/main" val="0"/>
+                  </a:ext>
+                </a:extLst>
+              </a:blip>
+              <a:stretch>
+                <a:fillRect/>
+              </a:stretch>
+            </p:blipFill>
+            <p:spPr>
+              <a:xfrm>
+                <a:off x="4615748" y="4727446"/>
+                <a:ext cx="851560" cy="620342"/>
+              </a:xfrm>
+              <a:prstGeom prst="rect">
+                <a:avLst/>
+              </a:prstGeom>
+            </p:spPr>
+          </p:pic>
+          <p:sp>
+            <p:nvSpPr>
+              <p:cNvPr id="56" name="TextBox 55">
+                <a:extLst>
+                  <a:ext uri="{FF2B5EF4-FFF2-40B4-BE49-F238E27FC236}">
+                    <a16:creationId xmlns:a16="http://schemas.microsoft.com/office/drawing/2014/main" id="{40814F84-C5CB-7495-FDB8-4594AD13574B}"/>
+                  </a:ext>
+                </a:extLst>
+              </p:cNvPr>
+              <p:cNvSpPr txBox="1"/>
+              <p:nvPr/>
+            </p:nvSpPr>
+            <p:spPr>
+              <a:xfrm>
+                <a:off x="4506434" y="5395317"/>
+                <a:ext cx="1274068" cy="584775"/>
+              </a:xfrm>
+              <a:prstGeom prst="rect">
+                <a:avLst/>
+              </a:prstGeom>
+              <a:noFill/>
+            </p:spPr>
+            <p:txBody>
+              <a:bodyPr wrap="square" rtlCol="0">
+                <a:spAutoFit/>
+              </a:bodyPr>
+              <a:lstStyle/>
+              <a:p>
+                <a:r>
+                  <a:rPr lang="ru-RU" sz="1600" dirty="0">
+                    <a:latin typeface="Century Gothic" panose="020B0502020202020204" pitchFamily="34" charset="0"/>
+                  </a:rPr>
+                  <a:t>Драйвер </a:t>
+                </a:r>
+              </a:p>
+              <a:p>
+                <a:r>
+                  <a:rPr lang="en-US" sz="1600" dirty="0">
+                    <a:latin typeface="Century Gothic" panose="020B0502020202020204" pitchFamily="34" charset="0"/>
+                  </a:rPr>
+                  <a:t>MATICA</a:t>
+                </a:r>
+                <a:endParaRPr lang="ru-RU" sz="1600" dirty="0">
+                  <a:latin typeface="Century Gothic" panose="020B0502020202020204" pitchFamily="34" charset="0"/>
+                </a:endParaRPr>
+              </a:p>
+            </p:txBody>
+          </p:sp>
+        </p:grpSp>
+        <p:grpSp>
+          <p:nvGrpSpPr>
+            <p:cNvPr id="61" name="Group 60"/>
+            <p:cNvGrpSpPr/>
+            <p:nvPr/>
+          </p:nvGrpSpPr>
+          <p:grpSpPr>
+            <a:xfrm>
+              <a:off x="4579783" y="2580432"/>
+              <a:ext cx="1307252" cy="1562459"/>
+              <a:chOff x="2008240" y="4591624"/>
+              <a:chExt cx="1307252" cy="1562459"/>
+            </a:xfrm>
+          </p:grpSpPr>
+          <p:pic>
+            <p:nvPicPr>
+              <p:cNvPr id="62" name="Picture 61">
+                <a:extLst>
+                  <a:ext uri="{FF2B5EF4-FFF2-40B4-BE49-F238E27FC236}">
+                    <a16:creationId xmlns:a16="http://schemas.microsoft.com/office/drawing/2014/main" id="{8F54CE67-D52E-7E47-20F6-FEA4C453374D}"/>
+                  </a:ext>
+                </a:extLst>
+              </p:cNvPr>
+              <p:cNvPicPr>
+                <a:picLocks noChangeAspect="1"/>
+              </p:cNvPicPr>
+              <p:nvPr/>
+            </p:nvPicPr>
+            <p:blipFill>
+              <a:blip r:embed="rId3">
+                <a:extLst>
+                  <a:ext uri="{28A0092B-C50C-407E-A947-70E740481C1C}">
+                    <a14:useLocalDpi xmlns:a14="http://schemas.microsoft.com/office/drawing/2010/main" val="0"/>
+                  </a:ext>
+                </a:extLst>
+              </a:blip>
+              <a:stretch>
+                <a:fillRect/>
+              </a:stretch>
+            </p:blipFill>
+            <p:spPr>
+              <a:xfrm>
+                <a:off x="2008240" y="4591624"/>
+                <a:ext cx="1164942" cy="1562459"/>
+              </a:xfrm>
+              <a:prstGeom prst="rect">
+                <a:avLst/>
+              </a:prstGeom>
+            </p:spPr>
+          </p:pic>
+          <p:sp>
+            <p:nvSpPr>
+              <p:cNvPr id="63" name="TextBox 62">
+                <a:extLst>
+                  <a:ext uri="{FF2B5EF4-FFF2-40B4-BE49-F238E27FC236}">
+                    <a16:creationId xmlns:a16="http://schemas.microsoft.com/office/drawing/2014/main" id="{358BBECC-6C15-992F-2037-2C2455C6AF93}"/>
+                  </a:ext>
+                </a:extLst>
+              </p:cNvPr>
+              <p:cNvSpPr txBox="1"/>
+              <p:nvPr/>
+            </p:nvSpPr>
+            <p:spPr>
+              <a:xfrm>
+                <a:off x="2041424" y="5278921"/>
+                <a:ext cx="1274068" cy="830997"/>
+              </a:xfrm>
+              <a:prstGeom prst="rect">
+                <a:avLst/>
+              </a:prstGeom>
+              <a:noFill/>
+            </p:spPr>
+            <p:txBody>
+              <a:bodyPr wrap="square" rtlCol="0">
+                <a:spAutoFit/>
+              </a:bodyPr>
+              <a:lstStyle/>
+              <a:p>
+                <a:r>
+                  <a:rPr lang="ru-RU" sz="1600" dirty="0">
+                    <a:latin typeface="Century Gothic" panose="020B0502020202020204" pitchFamily="34" charset="0"/>
+                  </a:rPr>
+                  <a:t>Драйвер записи карты</a:t>
+                </a:r>
+                <a:endParaRPr lang="en-US" sz="1600" dirty="0">
+                  <a:latin typeface="Century Gothic" panose="020B0502020202020204" pitchFamily="34" charset="0"/>
+                </a:endParaRPr>
+              </a:p>
+            </p:txBody>
+          </p:sp>
+          <p:pic>
+            <p:nvPicPr>
+              <p:cNvPr id="64" name="Picture 63">
+                <a:extLst>
+                  <a:ext uri="{FF2B5EF4-FFF2-40B4-BE49-F238E27FC236}">
+                    <a16:creationId xmlns:a16="http://schemas.microsoft.com/office/drawing/2014/main" id="{872B8CBA-1FE8-450E-1183-4DF1802B2AF2}"/>
+                  </a:ext>
+                </a:extLst>
+              </p:cNvPr>
+              <p:cNvPicPr>
+                <a:picLocks noChangeAspect="1"/>
+              </p:cNvPicPr>
+              <p:nvPr/>
+            </p:nvPicPr>
+            <p:blipFill>
+              <a:blip r:embed="rId5" cstate="print">
+                <a:extLst>
+                  <a:ext uri="{28A0092B-C50C-407E-A947-70E740481C1C}">
+                    <a14:useLocalDpi xmlns:a14="http://schemas.microsoft.com/office/drawing/2010/main" val="0"/>
+                  </a:ext>
+                </a:extLst>
+              </a:blip>
+              <a:stretch>
+                <a:fillRect/>
+              </a:stretch>
+            </p:blipFill>
+            <p:spPr>
+              <a:xfrm>
+                <a:off x="2162261" y="4863507"/>
+                <a:ext cx="728960" cy="436884"/>
+              </a:xfrm>
+              <a:prstGeom prst="rect">
+                <a:avLst/>
+              </a:prstGeom>
+            </p:spPr>
+          </p:pic>
+        </p:grpSp>
+        <p:sp>
+          <p:nvSpPr>
+            <p:cNvPr id="17" name="Rectangle 16">
+              <a:extLst>
+                <a:ext uri="{FF2B5EF4-FFF2-40B4-BE49-F238E27FC236}">
+                  <a16:creationId xmlns:a16="http://schemas.microsoft.com/office/drawing/2014/main" id="{36722387-9728-CADC-55F2-6E6852806B3A}"/>
+                </a:ext>
+              </a:extLst>
+            </p:cNvPr>
+            <p:cNvSpPr/>
+            <p:nvPr/>
+          </p:nvSpPr>
+          <p:spPr>
+            <a:xfrm>
+              <a:off x="4472777" y="2465057"/>
+              <a:ext cx="2649121" cy="1795324"/>
+            </a:xfrm>
+            <a:prstGeom prst="rect">
+              <a:avLst/>
+            </a:prstGeom>
+            <a:noFill/>
+            <a:ln w="76200">
+              <a:solidFill>
+                <a:schemeClr val="accent1">
+                  <a:lumMod val="50000"/>
+                </a:schemeClr>
+              </a:solidFill>
+            </a:ln>
+          </p:spPr>
+          <p:style>
+            <a:lnRef idx="2">
+              <a:schemeClr val="accent6"/>
+            </a:lnRef>
+            <a:fillRef idx="1">
+              <a:schemeClr val="lt1"/>
+            </a:fillRef>
+            <a:effectRef idx="0">
+              <a:schemeClr val="accent6"/>
+            </a:effectRef>
+            <a:fontRef idx="minor">
+              <a:schemeClr val="dk1"/>
+            </a:fontRef>
+          </p:style>
+          <p:txBody>
+            <a:bodyPr rtlCol="0" anchor="ctr"/>
+            <a:lstStyle/>
+            <a:p>
+              <a:pPr algn="ctr"/>
+              <a:endParaRPr lang="en-US" sz="2400" dirty="0">
+                <a:latin typeface="Century Gothic" panose="020B0502020202020204" pitchFamily="34" charset="0"/>
+              </a:endParaRPr>
+            </a:p>
+          </p:txBody>
+        </p:sp>
+      </p:grpSp>
       <p:cxnSp>
         <p:nvCxnSpPr>
           <p:cNvPr id="9" name="Connector: Elbow 8">
@@ -4458,17 +4484,20 @@
           </p:cNvPr>
           <p:cNvCxnSpPr>
             <a:cxnSpLocks/>
+            <a:stCxn id="70" idx="3"/>
             <a:endCxn id="17" idx="3"/>
           </p:cNvCxnSpPr>
           <p:nvPr/>
         </p:nvCxnSpPr>
         <p:spPr>
-          <a:xfrm rot="5400000">
-            <a:off x="6562601" y="2493971"/>
-            <a:ext cx="1428045" cy="309450"/>
-          </a:xfrm>
-          <a:prstGeom prst="bentConnector2">
-            <a:avLst/>
+          <a:xfrm flipH="1">
+            <a:off x="7121898" y="2301101"/>
+            <a:ext cx="128354" cy="1334088"/>
+          </a:xfrm>
+          <a:prstGeom prst="bentConnector3">
+            <a:avLst>
+              <a:gd name="adj1" fmla="val -178101"/>
+            </a:avLst>
           </a:prstGeom>
           <a:ln w="57150">
             <a:solidFill>
@@ -4836,7 +4865,7 @@
         </p:nvSpPr>
         <p:spPr>
           <a:xfrm>
-            <a:off x="5491003" y="4109966"/>
+            <a:off x="5491003" y="4272055"/>
             <a:ext cx="612668" cy="707886"/>
           </a:xfrm>
           <a:prstGeom prst="rect">
@@ -4869,17 +4898,20 @@
           </p:cNvPr>
           <p:cNvCxnSpPr>
             <a:cxnSpLocks/>
+            <a:stCxn id="70" idx="3"/>
             <a:endCxn id="21" idx="3"/>
           </p:cNvCxnSpPr>
           <p:nvPr/>
         </p:nvCxnSpPr>
         <p:spPr>
-          <a:xfrm rot="5400000">
-            <a:off x="5329382" y="3727191"/>
-            <a:ext cx="3894482" cy="309449"/>
-          </a:xfrm>
-          <a:prstGeom prst="bentConnector2">
-            <a:avLst/>
+          <a:xfrm flipH="1">
+            <a:off x="7121898" y="2301101"/>
+            <a:ext cx="128354" cy="3528055"/>
+          </a:xfrm>
+          <a:prstGeom prst="bentConnector3">
+            <a:avLst>
+              <a:gd name="adj1" fmla="val -178101"/>
+            </a:avLst>
           </a:prstGeom>
           <a:ln w="57150">
             <a:solidFill>
@@ -4922,8 +4954,8 @@
         </p:nvCxnSpPr>
         <p:spPr>
           <a:xfrm rot="10800000" flipV="1">
-            <a:off x="2396197" y="3362718"/>
-            <a:ext cx="2076580" cy="2112395"/>
+            <a:off x="2396197" y="3635188"/>
+            <a:ext cx="2076580" cy="1839925"/>
           </a:xfrm>
           <a:prstGeom prst="bentConnector3">
             <a:avLst/>
@@ -5111,7 +5143,7 @@
         </p:nvGrpSpPr>
         <p:grpSpPr>
           <a:xfrm>
-            <a:off x="9281465" y="1247377"/>
+            <a:off x="8043819" y="1985101"/>
             <a:ext cx="1307252" cy="1562459"/>
             <a:chOff x="2008240" y="4591624"/>
             <a:chExt cx="1307252" cy="1562459"/>
@@ -5230,53 +5262,6 @@
           </p:spPr>
         </p:pic>
       </p:grpSp>
-      <p:cxnSp>
-        <p:nvCxnSpPr>
-          <p:cNvPr id="42" name="Connector: Elbow 41">
-            <a:extLst>
-              <a:ext uri="{FF2B5EF4-FFF2-40B4-BE49-F238E27FC236}">
-                <a16:creationId xmlns:a16="http://schemas.microsoft.com/office/drawing/2014/main" id="{4922687F-90AF-8432-B979-A75D270D25E9}"/>
-              </a:ext>
-            </a:extLst>
-          </p:cNvPr>
-          <p:cNvCxnSpPr>
-            <a:stCxn id="3" idx="3"/>
-            <a:endCxn id="35" idx="1"/>
-          </p:cNvCxnSpPr>
-          <p:nvPr/>
-        </p:nvCxnSpPr>
-        <p:spPr>
-          <a:xfrm>
-            <a:off x="7549285" y="1591026"/>
-            <a:ext cx="1732180" cy="437581"/>
-          </a:xfrm>
-          <a:prstGeom prst="bentConnector3">
-            <a:avLst/>
-          </a:prstGeom>
-          <a:ln w="57150">
-            <a:solidFill>
-              <a:schemeClr val="accent1">
-                <a:lumMod val="50000"/>
-              </a:schemeClr>
-            </a:solidFill>
-            <a:tailEnd type="triangle"/>
-          </a:ln>
-        </p:spPr>
-        <p:style>
-          <a:lnRef idx="1">
-            <a:schemeClr val="accent1"/>
-          </a:lnRef>
-          <a:fillRef idx="0">
-            <a:schemeClr val="accent1"/>
-          </a:fillRef>
-          <a:effectRef idx="0">
-            <a:schemeClr val="accent1"/>
-          </a:effectRef>
-          <a:fontRef idx="minor">
-            <a:schemeClr val="tx1"/>
-          </a:fontRef>
-        </p:style>
-      </p:cxnSp>
       <p:sp>
         <p:nvSpPr>
           <p:cNvPr id="46" name="Rectangle 45">
@@ -5291,8 +5276,8 @@
         </p:nvSpPr>
         <p:spPr>
           <a:xfrm>
-            <a:off x="8253446" y="3153485"/>
-            <a:ext cx="3220980" cy="687297"/>
+            <a:off x="10121092" y="2033393"/>
+            <a:ext cx="1928597" cy="687297"/>
           </a:xfrm>
           <a:prstGeom prst="rect">
             <a:avLst/>
@@ -5326,73 +5311,23 @@
           <a:p>
             <a:pPr algn="ctr"/>
             <a:r>
-              <a:rPr lang="en-US" sz="1600" dirty="0">
+              <a:rPr lang="en-US" sz="2400" dirty="0">
                 <a:latin typeface="Century Gothic" panose="020B0502020202020204" pitchFamily="34" charset="0"/>
               </a:rPr>
               <a:t>void </a:t>
             </a:r>
             <a:r>
-              <a:rPr lang="ru-RU" sz="1600" dirty="0">
+              <a:rPr lang="en-US" sz="2400" dirty="0" smtClean="0">
                 <a:latin typeface="Century Gothic" panose="020B0502020202020204" pitchFamily="34" charset="0"/>
               </a:rPr>
-              <a:t>*запуск обработки*</a:t>
-            </a:r>
-            <a:r>
-              <a:rPr lang="en-US" sz="1600" dirty="0">
-                <a:latin typeface="Century Gothic" panose="020B0502020202020204" pitchFamily="34" charset="0"/>
-              </a:rPr>
-              <a:t>()</a:t>
-            </a:r>
+              <a:t>Start()</a:t>
+            </a:r>
+            <a:endParaRPr lang="en-US" sz="2400" dirty="0">
+              <a:latin typeface="Century Gothic" panose="020B0502020202020204" pitchFamily="34" charset="0"/>
+            </a:endParaRPr>
           </a:p>
         </p:txBody>
       </p:sp>
-      <p:cxnSp>
-        <p:nvCxnSpPr>
-          <p:cNvPr id="48" name="Straight Arrow Connector 47">
-            <a:extLst>
-              <a:ext uri="{FF2B5EF4-FFF2-40B4-BE49-F238E27FC236}">
-                <a16:creationId xmlns:a16="http://schemas.microsoft.com/office/drawing/2014/main" id="{06CECCF8-17CE-1307-D767-823A1F33A9C0}"/>
-              </a:ext>
-            </a:extLst>
-          </p:cNvPr>
-          <p:cNvCxnSpPr>
-            <a:stCxn id="35" idx="2"/>
-            <a:endCxn id="46" idx="0"/>
-          </p:cNvCxnSpPr>
-          <p:nvPr/>
-        </p:nvCxnSpPr>
-        <p:spPr>
-          <a:xfrm>
-            <a:off x="9863936" y="2809836"/>
-            <a:ext cx="0" cy="343649"/>
-          </a:xfrm>
-          <a:prstGeom prst="straightConnector1">
-            <a:avLst/>
-          </a:prstGeom>
-          <a:ln w="57150">
-            <a:solidFill>
-              <a:schemeClr val="accent1">
-                <a:lumMod val="50000"/>
-              </a:schemeClr>
-            </a:solidFill>
-            <a:tailEnd type="triangle"/>
-          </a:ln>
-        </p:spPr>
-        <p:style>
-          <a:lnRef idx="1">
-            <a:schemeClr val="accent1"/>
-          </a:lnRef>
-          <a:fillRef idx="0">
-            <a:schemeClr val="accent1"/>
-          </a:fillRef>
-          <a:effectRef idx="0">
-            <a:schemeClr val="accent1"/>
-          </a:effectRef>
-          <a:fontRef idx="minor">
-            <a:schemeClr val="tx1"/>
-          </a:fontRef>
-        </p:style>
-      </p:cxnSp>
       <p:grpSp>
         <p:nvGrpSpPr>
           <p:cNvPr id="52" name="Group 51">
@@ -5407,8 +5342,8 @@
         </p:nvGrpSpPr>
         <p:grpSpPr>
           <a:xfrm rot="16200000">
-            <a:off x="8313903" y="4147410"/>
-            <a:ext cx="1157836" cy="787499"/>
+            <a:off x="10288403" y="4520399"/>
+            <a:ext cx="818802" cy="556906"/>
             <a:chOff x="9590966" y="4185349"/>
             <a:chExt cx="1157836" cy="787499"/>
           </a:xfrm>
@@ -5488,7 +5423,7 @@
         </p:nvGrpSpPr>
         <p:grpSpPr>
           <a:xfrm>
-            <a:off x="10445996" y="5206735"/>
+            <a:off x="8081449" y="5232775"/>
             <a:ext cx="1321445" cy="1562459"/>
             <a:chOff x="4459057" y="4591624"/>
             <a:chExt cx="1321445" cy="1562459"/>
@@ -5615,12 +5550,176 @@
           </p:txBody>
         </p:sp>
       </p:grpSp>
+      <p:grpSp>
+        <p:nvGrpSpPr>
+          <p:cNvPr id="97" name="Group 96"/>
+          <p:cNvGrpSpPr/>
+          <p:nvPr/>
+        </p:nvGrpSpPr>
+        <p:grpSpPr>
+          <a:xfrm>
+            <a:off x="9687751" y="5256704"/>
+            <a:ext cx="2020105" cy="1514605"/>
+            <a:chOff x="7861514" y="5230663"/>
+            <a:chExt cx="2020105" cy="1514605"/>
+          </a:xfrm>
+        </p:grpSpPr>
+        <p:sp>
+          <p:nvSpPr>
+            <p:cNvPr id="69" name="Rectangle 68">
+              <a:extLst>
+                <a:ext uri="{FF2B5EF4-FFF2-40B4-BE49-F238E27FC236}">
+                  <a16:creationId xmlns:a16="http://schemas.microsoft.com/office/drawing/2014/main" id="{87103D2C-56FA-FF35-0D49-0261FC1828FE}"/>
+                </a:ext>
+              </a:extLst>
+            </p:cNvPr>
+            <p:cNvSpPr/>
+            <p:nvPr/>
+          </p:nvSpPr>
+          <p:spPr>
+            <a:xfrm>
+              <a:off x="7861714" y="5230663"/>
+              <a:ext cx="2019704" cy="1514605"/>
+            </a:xfrm>
+            <a:prstGeom prst="rect">
+              <a:avLst/>
+            </a:prstGeom>
+            <a:noFill/>
+            <a:ln w="76200">
+              <a:solidFill>
+                <a:schemeClr val="accent1">
+                  <a:lumMod val="50000"/>
+                </a:schemeClr>
+              </a:solidFill>
+            </a:ln>
+          </p:spPr>
+          <p:style>
+            <a:lnRef idx="2">
+              <a:schemeClr val="accent6"/>
+            </a:lnRef>
+            <a:fillRef idx="1">
+              <a:schemeClr val="lt1"/>
+            </a:fillRef>
+            <a:effectRef idx="0">
+              <a:schemeClr val="accent6"/>
+            </a:effectRef>
+            <a:fontRef idx="minor">
+              <a:schemeClr val="dk1"/>
+            </a:fontRef>
+          </p:style>
+          <p:txBody>
+            <a:bodyPr rtlCol="0" anchor="ctr"/>
+            <a:lstStyle/>
+            <a:p>
+              <a:pPr algn="ctr"/>
+              <a:endParaRPr lang="en-US" sz="2400" dirty="0">
+                <a:latin typeface="Century Gothic" panose="020B0502020202020204" pitchFamily="34" charset="0"/>
+              </a:endParaRPr>
+            </a:p>
+          </p:txBody>
+        </p:sp>
+        <p:sp>
+          <p:nvSpPr>
+            <p:cNvPr id="72" name="TextBox 71">
+              <a:extLst>
+                <a:ext uri="{FF2B5EF4-FFF2-40B4-BE49-F238E27FC236}">
+                  <a16:creationId xmlns:a16="http://schemas.microsoft.com/office/drawing/2014/main" id="{B72CBFD0-9F6F-4FEE-4E59-E31832B8279C}"/>
+                </a:ext>
+              </a:extLst>
+            </p:cNvPr>
+            <p:cNvSpPr txBox="1"/>
+            <p:nvPr/>
+          </p:nvSpPr>
+          <p:spPr>
+            <a:xfrm>
+              <a:off x="7861514" y="5449355"/>
+              <a:ext cx="2020105" cy="1077218"/>
+            </a:xfrm>
+            <a:prstGeom prst="rect">
+              <a:avLst/>
+            </a:prstGeom>
+            <a:noFill/>
+          </p:spPr>
+          <p:txBody>
+            <a:bodyPr wrap="none" rtlCol="0">
+              <a:spAutoFit/>
+            </a:bodyPr>
+            <a:lstStyle/>
+            <a:p>
+              <a:pPr marL="285750" indent="-285750">
+                <a:buFont typeface="Calibri" panose="020F0502020204030204" pitchFamily="34" charset="0"/>
+                <a:buChar char="―"/>
+              </a:pPr>
+              <a:r>
+                <a:rPr lang="en-US" sz="1600" dirty="0">
+                  <a:latin typeface="Century Gothic" panose="020B0502020202020204" pitchFamily="34" charset="0"/>
+                </a:rPr>
+                <a:t>Send()</a:t>
+              </a:r>
+              <a:endParaRPr lang="ru-RU" sz="1600" dirty="0">
+                <a:latin typeface="Century Gothic" panose="020B0502020202020204" pitchFamily="34" charset="0"/>
+              </a:endParaRPr>
+            </a:p>
+            <a:p>
+              <a:pPr marL="285750" indent="-285750">
+                <a:buFont typeface="Calibri" panose="020F0502020204030204" pitchFamily="34" charset="0"/>
+                <a:buChar char="―"/>
+              </a:pPr>
+              <a:r>
+                <a:rPr lang="en-US" sz="1600" dirty="0" err="1">
+                  <a:latin typeface="Century Gothic" panose="020B0502020202020204" pitchFamily="34" charset="0"/>
+                </a:rPr>
+                <a:t>CardConnect</a:t>
+              </a:r>
+              <a:r>
+                <a:rPr lang="en-US" sz="1600" dirty="0">
+                  <a:latin typeface="Century Gothic" panose="020B0502020202020204" pitchFamily="34" charset="0"/>
+                </a:rPr>
+                <a:t>()</a:t>
+              </a:r>
+            </a:p>
+            <a:p>
+              <a:pPr marL="285750" indent="-285750">
+                <a:buFont typeface="Calibri" panose="020F0502020204030204" pitchFamily="34" charset="0"/>
+                <a:buChar char="―"/>
+              </a:pPr>
+              <a:r>
+                <a:rPr lang="en-US" sz="1600" dirty="0" err="1">
+                  <a:latin typeface="Century Gothic" panose="020B0502020202020204" pitchFamily="34" charset="0"/>
+                </a:rPr>
+                <a:t>CardClose</a:t>
+              </a:r>
+              <a:r>
+                <a:rPr lang="en-US" sz="1600" dirty="0">
+                  <a:latin typeface="Century Gothic" panose="020B0502020202020204" pitchFamily="34" charset="0"/>
+                </a:rPr>
+                <a:t>()</a:t>
+              </a:r>
+              <a:endParaRPr lang="ru-RU" sz="1600" dirty="0">
+                <a:latin typeface="Century Gothic" panose="020B0502020202020204" pitchFamily="34" charset="0"/>
+              </a:endParaRPr>
+            </a:p>
+            <a:p>
+              <a:pPr marL="285750" indent="-285750">
+                <a:buFont typeface="Calibri" panose="020F0502020204030204" pitchFamily="34" charset="0"/>
+                <a:buChar char="―"/>
+              </a:pPr>
+              <a:r>
+                <a:rPr lang="ru-RU" sz="1600" dirty="0">
+                  <a:latin typeface="Century Gothic" panose="020B0502020202020204" pitchFamily="34" charset="0"/>
+                </a:rPr>
+                <a:t>...</a:t>
+              </a:r>
+            </a:p>
+          </p:txBody>
+        </p:sp>
+      </p:grpSp>
       <p:sp>
         <p:nvSpPr>
-          <p:cNvPr id="69" name="Rectangle 68">
+          <p:cNvPr id="70" name="Rectangle 69">
             <a:extLst>
               <a:ext uri="{FF2B5EF4-FFF2-40B4-BE49-F238E27FC236}">
-                <a16:creationId xmlns:a16="http://schemas.microsoft.com/office/drawing/2014/main" id="{87103D2C-56FA-FF35-0D49-0261FC1828FE}"/>
+                <a16:creationId xmlns:a16="http://schemas.microsoft.com/office/drawing/2014/main" id="{D2DBB5B7-CC96-A62C-2CDE-A7BB0954FCD9}"/>
               </a:ext>
             </a:extLst>
           </p:cNvPr>
@@ -5629,8 +5728,8 @@
         </p:nvSpPr>
         <p:spPr>
           <a:xfrm>
-            <a:off x="7861714" y="5230663"/>
-            <a:ext cx="2019704" cy="1514605"/>
+            <a:off x="3663013" y="1987797"/>
+            <a:ext cx="3587239" cy="626607"/>
           </a:xfrm>
           <a:prstGeom prst="rect">
             <a:avLst/>
@@ -5663,7 +5762,31 @@
           <a:lstStyle/>
           <a:p>
             <a:pPr algn="ctr"/>
-            <a:endParaRPr lang="en-US" sz="2400" dirty="0">
+            <a:r>
+              <a:rPr lang="en-US" dirty="0">
+                <a:latin typeface="Century Gothic" panose="020B0502020202020204" pitchFamily="34" charset="0"/>
+              </a:rPr>
+              <a:t>void </a:t>
+            </a:r>
+            <a:r>
+              <a:rPr lang="en-US" dirty="0" err="1" smtClean="0">
+                <a:latin typeface="Century Gothic" panose="020B0502020202020204" pitchFamily="34" charset="0"/>
+              </a:rPr>
+              <a:t>S</a:t>
+            </a:r>
+            <a:r>
+              <a:rPr lang="en-US" dirty="0" err="1" smtClean="0">
+                <a:latin typeface="Century Gothic" panose="020B0502020202020204" pitchFamily="34" charset="0"/>
+              </a:rPr>
+              <a:t>tartReaderInterfaces</a:t>
+            </a:r>
+            <a:r>
+              <a:rPr lang="en-US" dirty="0" smtClean="0">
+                <a:latin typeface="Century Gothic" panose="020B0502020202020204" pitchFamily="34" charset="0"/>
+              </a:rPr>
+              <a:t>()</a:t>
+            </a:r>
+            <a:endParaRPr lang="en-US" dirty="0">
               <a:latin typeface="Century Gothic" panose="020B0502020202020204" pitchFamily="34" charset="0"/>
             </a:endParaRPr>
           </a:p>
@@ -5671,25 +5794,18 @@
       </p:sp>
       <p:cxnSp>
         <p:nvCxnSpPr>
-          <p:cNvPr id="71" name="Straight Connector 70">
-            <a:extLst>
-              <a:ext uri="{FF2B5EF4-FFF2-40B4-BE49-F238E27FC236}">
-                <a16:creationId xmlns:a16="http://schemas.microsoft.com/office/drawing/2014/main" id="{4DBC5E99-D2CB-2F7A-BC75-5AE76C9A43D9}"/>
-              </a:ext>
-            </a:extLst>
-          </p:cNvPr>
+          <p:cNvPr id="44" name="Straight Arrow Connector 43"/>
           <p:cNvCxnSpPr>
-            <a:stCxn id="58" idx="1"/>
-            <a:endCxn id="69" idx="3"/>
+            <a:stCxn id="3" idx="2"/>
           </p:cNvCxnSpPr>
           <p:nvPr/>
         </p:nvCxnSpPr>
         <p:spPr>
           <a:xfrm flipH="1">
-            <a:off x="9881418" y="5987965"/>
-            <a:ext cx="564578" cy="1"/>
-          </a:xfrm>
-          <a:prstGeom prst="line">
+            <a:off x="5847829" y="1669936"/>
+            <a:ext cx="1" cy="281466"/>
+          </a:xfrm>
+          <a:prstGeom prst="straightConnector1">
             <a:avLst/>
           </a:prstGeom>
           <a:ln w="57150">
@@ -5698,6 +5814,7 @@
                 <a:lumMod val="50000"/>
               </a:schemeClr>
             </a:solidFill>
+            <a:tailEnd type="triangle"/>
           </a:ln>
         </p:spPr>
         <p:style>
@@ -5717,99 +5834,336 @@
       </p:cxnSp>
       <p:sp>
         <p:nvSpPr>
-          <p:cNvPr id="72" name="TextBox 71">
+          <p:cNvPr id="80" name="Rectangle 79">
             <a:extLst>
               <a:ext uri="{FF2B5EF4-FFF2-40B4-BE49-F238E27FC236}">
-                <a16:creationId xmlns:a16="http://schemas.microsoft.com/office/drawing/2014/main" id="{B72CBFD0-9F6F-4FEE-4E59-E31832B8279C}"/>
+                <a16:creationId xmlns:a16="http://schemas.microsoft.com/office/drawing/2014/main" id="{E2C17612-BE3E-859B-8189-5BEADD647A94}"/>
               </a:ext>
             </a:extLst>
           </p:cNvPr>
-          <p:cNvSpPr txBox="1"/>
+          <p:cNvSpPr/>
           <p:nvPr/>
         </p:nvSpPr>
         <p:spPr>
           <a:xfrm>
-            <a:off x="7861514" y="5449355"/>
-            <a:ext cx="2020105" cy="1077218"/>
+            <a:off x="8272207" y="1088319"/>
+            <a:ext cx="3777482" cy="687297"/>
           </a:xfrm>
           <a:prstGeom prst="rect">
             <a:avLst/>
           </a:prstGeom>
           <a:noFill/>
-        </p:spPr>
+          <a:ln w="76200">
+            <a:solidFill>
+              <a:schemeClr val="accent1">
+                <a:lumMod val="50000"/>
+              </a:schemeClr>
+            </a:solidFill>
+          </a:ln>
+        </p:spPr>
+        <p:style>
+          <a:lnRef idx="2">
+            <a:schemeClr val="accent6"/>
+          </a:lnRef>
+          <a:fillRef idx="1">
+            <a:schemeClr val="lt1"/>
+          </a:fillRef>
+          <a:effectRef idx="0">
+            <a:schemeClr val="accent6"/>
+          </a:effectRef>
+          <a:fontRef idx="minor">
+            <a:schemeClr val="dk1"/>
+          </a:fontRef>
+        </p:style>
         <p:txBody>
-          <a:bodyPr wrap="none" rtlCol="0">
-            <a:spAutoFit/>
-          </a:bodyPr>
+          <a:bodyPr rtlCol="0" anchor="ctr"/>
           <a:lstStyle/>
           <a:p>
-            <a:pPr marL="285750" indent="-285750">
-              <a:buFont typeface="Calibri" panose="020F0502020204030204" pitchFamily="34" charset="0"/>
-              <a:buChar char="―"/>
-            </a:pPr>
-            <a:r>
-              <a:rPr lang="en-US" sz="1600" dirty="0">
+            <a:pPr algn="ctr"/>
+            <a:r>
+              <a:rPr lang="ru-RU" sz="2400" dirty="0" smtClean="0">
                 <a:latin typeface="Century Gothic" panose="020B0502020202020204" pitchFamily="34" charset="0"/>
               </a:rPr>
-              <a:t>Send()</a:t>
-            </a:r>
-            <a:endParaRPr lang="ru-RU" sz="1600" dirty="0">
+              <a:t>Инстанция</a:t>
+            </a:r>
+            <a:endParaRPr lang="en-US" sz="2400" dirty="0">
               <a:latin typeface="Century Gothic" panose="020B0502020202020204" pitchFamily="34" charset="0"/>
             </a:endParaRPr>
           </a:p>
-          <a:p>
-            <a:pPr marL="285750" indent="-285750">
-              <a:buFont typeface="Calibri" panose="020F0502020204030204" pitchFamily="34" charset="0"/>
-              <a:buChar char="―"/>
-            </a:pPr>
-            <a:r>
-              <a:rPr lang="en-US" sz="1600" dirty="0" err="1">
+        </p:txBody>
+      </p:sp>
+      <p:cxnSp>
+        <p:nvCxnSpPr>
+          <p:cNvPr id="81" name="Straight Arrow Connector 80"/>
+          <p:cNvCxnSpPr/>
+          <p:nvPr/>
+        </p:nvCxnSpPr>
+        <p:spPr>
+          <a:xfrm flipH="1">
+            <a:off x="11749669" y="1760166"/>
+            <a:ext cx="1" cy="281466"/>
+          </a:xfrm>
+          <a:prstGeom prst="straightConnector1">
+            <a:avLst/>
+          </a:prstGeom>
+          <a:ln w="57150">
+            <a:solidFill>
+              <a:schemeClr val="accent1">
+                <a:lumMod val="50000"/>
+              </a:schemeClr>
+            </a:solidFill>
+            <a:tailEnd type="triangle"/>
+          </a:ln>
+        </p:spPr>
+        <p:style>
+          <a:lnRef idx="1">
+            <a:schemeClr val="accent1"/>
+          </a:lnRef>
+          <a:fillRef idx="0">
+            <a:schemeClr val="accent1"/>
+          </a:fillRef>
+          <a:effectRef idx="0">
+            <a:schemeClr val="accent1"/>
+          </a:effectRef>
+          <a:fontRef idx="minor">
+            <a:schemeClr val="tx1"/>
+          </a:fontRef>
+        </p:style>
+      </p:cxnSp>
+      <p:cxnSp>
+        <p:nvCxnSpPr>
+          <p:cNvPr id="83" name="Elbow Connector 82"/>
+          <p:cNvCxnSpPr>
+            <a:endCxn id="80" idx="1"/>
+          </p:cNvCxnSpPr>
+          <p:nvPr/>
+        </p:nvCxnSpPr>
+        <p:spPr>
+          <a:xfrm flipV="1">
+            <a:off x="7272414" y="1431968"/>
+            <a:ext cx="999793" cy="622604"/>
+          </a:xfrm>
+          <a:prstGeom prst="bentConnector3">
+            <a:avLst>
+              <a:gd name="adj1" fmla="val 50000"/>
+            </a:avLst>
+          </a:prstGeom>
+          <a:ln w="57150">
+            <a:solidFill>
+              <a:schemeClr val="accent1">
+                <a:lumMod val="50000"/>
+              </a:schemeClr>
+            </a:solidFill>
+            <a:tailEnd type="triangle"/>
+          </a:ln>
+        </p:spPr>
+        <p:style>
+          <a:lnRef idx="1">
+            <a:schemeClr val="accent1"/>
+          </a:lnRef>
+          <a:fillRef idx="0">
+            <a:schemeClr val="accent1"/>
+          </a:fillRef>
+          <a:effectRef idx="0">
+            <a:schemeClr val="accent1"/>
+          </a:effectRef>
+          <a:fontRef idx="minor">
+            <a:schemeClr val="tx1"/>
+          </a:fontRef>
+        </p:style>
+      </p:cxnSp>
+      <p:cxnSp>
+        <p:nvCxnSpPr>
+          <p:cNvPr id="89" name="Straight Arrow Connector 88"/>
+          <p:cNvCxnSpPr>
+            <a:stCxn id="46" idx="1"/>
+          </p:cNvCxnSpPr>
+          <p:nvPr/>
+        </p:nvCxnSpPr>
+        <p:spPr>
+          <a:xfrm flipH="1" flipV="1">
+            <a:off x="9208761" y="2377041"/>
+            <a:ext cx="912331" cy="1"/>
+          </a:xfrm>
+          <a:prstGeom prst="straightConnector1">
+            <a:avLst/>
+          </a:prstGeom>
+          <a:ln w="57150">
+            <a:solidFill>
+              <a:schemeClr val="accent1">
+                <a:lumMod val="50000"/>
+              </a:schemeClr>
+            </a:solidFill>
+            <a:tailEnd type="triangle"/>
+          </a:ln>
+        </p:spPr>
+        <p:style>
+          <a:lnRef idx="1">
+            <a:schemeClr val="accent1"/>
+          </a:lnRef>
+          <a:fillRef idx="0">
+            <a:schemeClr val="accent1"/>
+          </a:fillRef>
+          <a:effectRef idx="0">
+            <a:schemeClr val="accent1"/>
+          </a:effectRef>
+          <a:fontRef idx="minor">
+            <a:schemeClr val="tx1"/>
+          </a:fontRef>
+        </p:style>
+      </p:cxnSp>
+      <p:sp>
+        <p:nvSpPr>
+          <p:cNvPr id="91" name="Rectangle 90">
+            <a:extLst>
+              <a:ext uri="{FF2B5EF4-FFF2-40B4-BE49-F238E27FC236}">
+                <a16:creationId xmlns:a16="http://schemas.microsoft.com/office/drawing/2014/main" id="{E2C17612-BE3E-859B-8189-5BEADD647A94}"/>
+              </a:ext>
+            </a:extLst>
+          </p:cNvPr>
+          <p:cNvSpPr/>
+          <p:nvPr/>
+        </p:nvSpPr>
+        <p:spPr>
+          <a:xfrm>
+            <a:off x="9345920" y="3627473"/>
+            <a:ext cx="2703769" cy="687297"/>
+          </a:xfrm>
+          <a:prstGeom prst="rect">
+            <a:avLst/>
+          </a:prstGeom>
+          <a:noFill/>
+          <a:ln w="76200">
+            <a:solidFill>
+              <a:schemeClr val="accent1">
+                <a:lumMod val="50000"/>
+              </a:schemeClr>
+            </a:solidFill>
+          </a:ln>
+        </p:spPr>
+        <p:style>
+          <a:lnRef idx="2">
+            <a:schemeClr val="accent6"/>
+          </a:lnRef>
+          <a:fillRef idx="1">
+            <a:schemeClr val="lt1"/>
+          </a:fillRef>
+          <a:effectRef idx="0">
+            <a:schemeClr val="accent6"/>
+          </a:effectRef>
+          <a:fontRef idx="minor">
+            <a:schemeClr val="dk1"/>
+          </a:fontRef>
+        </p:style>
+        <p:txBody>
+          <a:bodyPr rtlCol="0" anchor="ctr"/>
+          <a:lstStyle/>
+          <a:p>
+            <a:pPr algn="ctr"/>
+            <a:r>
+              <a:rPr lang="en-US" dirty="0">
                 <a:latin typeface="Century Gothic" panose="020B0502020202020204" pitchFamily="34" charset="0"/>
               </a:rPr>
-              <a:t>CardConnect</a:t>
-            </a:r>
-            <a:r>
-              <a:rPr lang="en-US" sz="1600" dirty="0">
+              <a:t>void </a:t>
+            </a:r>
+            <a:r>
+              <a:rPr lang="en-US" dirty="0" smtClean="0">
+                <a:latin typeface="Century Gothic" panose="020B0502020202020204" pitchFamily="34" charset="0"/>
+              </a:rPr>
+              <a:t>Personalization</a:t>
+            </a:r>
+            <a:r>
+              <a:rPr lang="en-US" dirty="0" smtClean="0">
                 <a:latin typeface="Century Gothic" panose="020B0502020202020204" pitchFamily="34" charset="0"/>
               </a:rPr>
               <a:t>()</a:t>
             </a:r>
-          </a:p>
-          <a:p>
-            <a:pPr marL="285750" indent="-285750">
-              <a:buFont typeface="Calibri" panose="020F0502020204030204" pitchFamily="34" charset="0"/>
-              <a:buChar char="―"/>
-            </a:pPr>
-            <a:r>
-              <a:rPr lang="en-US" sz="1600" dirty="0" err="1">
-                <a:latin typeface="Century Gothic" panose="020B0502020202020204" pitchFamily="34" charset="0"/>
-              </a:rPr>
-              <a:t>CardClose</a:t>
-            </a:r>
-            <a:r>
-              <a:rPr lang="en-US" sz="1600" dirty="0">
-                <a:latin typeface="Century Gothic" panose="020B0502020202020204" pitchFamily="34" charset="0"/>
-              </a:rPr>
-              <a:t>()</a:t>
-            </a:r>
-            <a:endParaRPr lang="ru-RU" sz="1600" dirty="0">
+            <a:endParaRPr lang="en-US" dirty="0">
               <a:latin typeface="Century Gothic" panose="020B0502020202020204" pitchFamily="34" charset="0"/>
             </a:endParaRPr>
           </a:p>
-          <a:p>
-            <a:pPr marL="285750" indent="-285750">
-              <a:buFont typeface="Calibri" panose="020F0502020204030204" pitchFamily="34" charset="0"/>
-              <a:buChar char="―"/>
-            </a:pPr>
-            <a:r>
-              <a:rPr lang="ru-RU" sz="1600" dirty="0">
-                <a:latin typeface="Century Gothic" panose="020B0502020202020204" pitchFamily="34" charset="0"/>
-              </a:rPr>
-              <a:t>...</a:t>
-            </a:r>
-          </a:p>
         </p:txBody>
       </p:sp>
+      <p:cxnSp>
+        <p:nvCxnSpPr>
+          <p:cNvPr id="93" name="Elbow Connector 92"/>
+          <p:cNvCxnSpPr>
+            <a:endCxn id="91" idx="0"/>
+          </p:cNvCxnSpPr>
+          <p:nvPr/>
+        </p:nvCxnSpPr>
+        <p:spPr>
+          <a:xfrm>
+            <a:off x="9198478" y="3124785"/>
+            <a:ext cx="1499327" cy="502688"/>
+          </a:xfrm>
+          <a:prstGeom prst="bentConnector2">
+            <a:avLst/>
+          </a:prstGeom>
+          <a:ln w="57150">
+            <a:solidFill>
+              <a:schemeClr val="accent1">
+                <a:lumMod val="50000"/>
+              </a:schemeClr>
+            </a:solidFill>
+            <a:tailEnd type="triangle"/>
+          </a:ln>
+        </p:spPr>
+        <p:style>
+          <a:lnRef idx="1">
+            <a:schemeClr val="accent1"/>
+          </a:lnRef>
+          <a:fillRef idx="0">
+            <a:schemeClr val="accent1"/>
+          </a:fillRef>
+          <a:effectRef idx="0">
+            <a:schemeClr val="accent1"/>
+          </a:effectRef>
+          <a:fontRef idx="minor">
+            <a:schemeClr val="tx1"/>
+          </a:fontRef>
+        </p:style>
+      </p:cxnSp>
+      <p:cxnSp>
+        <p:nvCxnSpPr>
+          <p:cNvPr id="99" name="Straight Connector 98"/>
+          <p:cNvCxnSpPr>
+            <a:stCxn id="58" idx="3"/>
+            <a:endCxn id="72" idx="1"/>
+          </p:cNvCxnSpPr>
+          <p:nvPr/>
+        </p:nvCxnSpPr>
+        <p:spPr>
+          <a:xfrm>
+            <a:off x="9246391" y="6014005"/>
+            <a:ext cx="441360" cy="0"/>
+          </a:xfrm>
+          <a:prstGeom prst="line">
+            <a:avLst/>
+          </a:prstGeom>
+          <a:ln w="57150">
+            <a:solidFill>
+              <a:schemeClr val="accent1">
+                <a:lumMod val="50000"/>
+              </a:schemeClr>
+            </a:solidFill>
+          </a:ln>
+        </p:spPr>
+        <p:style>
+          <a:lnRef idx="1">
+            <a:schemeClr val="accent1"/>
+          </a:lnRef>
+          <a:fillRef idx="0">
+            <a:schemeClr val="accent1"/>
+          </a:fillRef>
+          <a:effectRef idx="0">
+            <a:schemeClr val="accent1"/>
+          </a:effectRef>
+          <a:fontRef idx="minor">
+            <a:schemeClr val="tx1"/>
+          </a:fontRef>
+        </p:style>
+      </p:cxnSp>
     </p:spTree>
     <p:extLst>
       <p:ext uri="{BB962C8B-B14F-4D97-AF65-F5344CB8AC3E}">
@@ -6647,7 +7001,7 @@
         </p:nvSpPr>
         <p:spPr>
           <a:xfrm>
-            <a:off x="651618" y="4910729"/>
+            <a:off x="651618" y="4604671"/>
             <a:ext cx="4898657" cy="400110"/>
           </a:xfrm>
           <a:prstGeom prst="rect">
@@ -6703,7 +7057,13 @@
   <p:cSld>
     <p:spTree>
       <p:nvGrpSpPr>
-        <p:cNvPr id="1" name=""/>
+        <p:cNvPr id="1" name="">
+          <a:extLst>
+            <a:ext uri="{FF2B5EF4-FFF2-40B4-BE49-F238E27FC236}">
+              <a16:creationId xmlns:a16="http://schemas.microsoft.com/office/drawing/2014/main" id="{0BDD2122-D42B-935E-28E6-4C6CC005CCC8}"/>
+            </a:ext>
+          </a:extLst>
+        </p:cNvPr>
         <p:cNvGrpSpPr/>
         <p:nvPr/>
       </p:nvGrpSpPr>
@@ -6717,7 +7077,13 @@
       </p:grpSpPr>
       <p:pic>
         <p:nvPicPr>
-          <p:cNvPr id="2" name="Picture 2" descr="C:\Users\Андрей\Desktop\1\Безымянный-1.png"/>
+          <p:cNvPr id="2" name="Picture 2" descr="C:\Users\Андрей\Desktop\1\Безымянный-1.png">
+            <a:extLst>
+              <a:ext uri="{FF2B5EF4-FFF2-40B4-BE49-F238E27FC236}">
+                <a16:creationId xmlns:a16="http://schemas.microsoft.com/office/drawing/2014/main" id="{04BE2A33-FFFE-25FD-EEAD-6F1C95FFC843}"/>
+              </a:ext>
+            </a:extLst>
+          </p:cNvPr>
           <p:cNvPicPr>
             <a:picLocks noChangeAspect="1" noChangeArrowheads="1"/>
           </p:cNvPicPr>
@@ -6771,45 +7137,19 @@
       </p:pic>
       <p:sp>
         <p:nvSpPr>
-          <p:cNvPr id="4" name="Прямоугольник 3"/>
-          <p:cNvSpPr/>
+          <p:cNvPr id="5" name="TextBox 4">
+            <a:extLst>
+              <a:ext uri="{FF2B5EF4-FFF2-40B4-BE49-F238E27FC236}">
+                <a16:creationId xmlns:a16="http://schemas.microsoft.com/office/drawing/2014/main" id="{1B8006EA-A848-1E9A-CF42-BD3FF694A29A}"/>
+              </a:ext>
+            </a:extLst>
+          </p:cNvPr>
+          <p:cNvSpPr txBox="1"/>
           <p:nvPr/>
         </p:nvSpPr>
         <p:spPr>
           <a:xfrm>
-            <a:off x="354843" y="1187299"/>
-            <a:ext cx="11600596" cy="495457"/>
-          </a:xfrm>
-          <a:prstGeom prst="rect">
-            <a:avLst/>
-          </a:prstGeom>
-        </p:spPr>
-        <p:txBody>
-          <a:bodyPr wrap="square">
-            <a:spAutoFit/>
-          </a:bodyPr>
-          <a:lstStyle/>
-          <a:p>
-            <a:pPr algn="just">
-              <a:lnSpc>
-                <a:spcPct val="150000"/>
-              </a:lnSpc>
-            </a:pPr>
-            <a:endParaRPr lang="en-US" sz="2000" dirty="0">
-              <a:latin typeface="Century Gothic" panose="020B0502020202020204" pitchFamily="34" charset="0"/>
-            </a:endParaRPr>
-          </a:p>
-        </p:txBody>
-      </p:sp>
-      <p:sp>
-        <p:nvSpPr>
-          <p:cNvPr id="5" name="TextBox 4"/>
-          <p:cNvSpPr txBox="1"/>
-          <p:nvPr/>
-        </p:nvSpPr>
-        <p:spPr>
-          <a:xfrm>
-            <a:off x="3534770" y="450376"/>
+            <a:off x="2906973" y="436728"/>
             <a:ext cx="184731" cy="369332"/>
           </a:xfrm>
           <a:prstGeom prst="rect">
@@ -6829,14 +7169,20 @@
       </p:sp>
       <p:sp>
         <p:nvSpPr>
-          <p:cNvPr id="7" name="TextBox 6"/>
+          <p:cNvPr id="7" name="TextBox 6">
+            <a:extLst>
+              <a:ext uri="{FF2B5EF4-FFF2-40B4-BE49-F238E27FC236}">
+                <a16:creationId xmlns:a16="http://schemas.microsoft.com/office/drawing/2014/main" id="{F6F7F2C8-A6E1-CE8C-6B39-FFD9061FA3CF}"/>
+              </a:ext>
+            </a:extLst>
+          </p:cNvPr>
           <p:cNvSpPr txBox="1"/>
           <p:nvPr/>
         </p:nvSpPr>
         <p:spPr>
           <a:xfrm>
-            <a:off x="2983615" y="82785"/>
-            <a:ext cx="6224781" cy="707886"/>
+            <a:off x="3288180" y="168153"/>
+            <a:ext cx="5615640" cy="646331"/>
           </a:xfrm>
           <a:prstGeom prst="rect">
             <a:avLst/>
@@ -6851,7 +7197,7 @@
           <a:p>
             <a:pPr algn="ctr"/>
             <a:r>
-              <a:rPr lang="ru-RU" sz="4000" dirty="0">
+              <a:rPr lang="ru-RU" sz="3600" dirty="0" smtClean="0">
                 <a:solidFill>
                   <a:schemeClr val="bg1">
                     <a:lumMod val="95000"/>
@@ -6868,19 +7214,76 @@
               </a:rPr>
               <a:t>Полученные результаты</a:t>
             </a:r>
+            <a:endParaRPr lang="ru-RU" sz="3600" dirty="0">
+              <a:solidFill>
+                <a:schemeClr val="bg1">
+                  <a:lumMod val="95000"/>
+                </a:schemeClr>
+              </a:solidFill>
+              <a:effectLst>
+                <a:outerShdw blurRad="38100" dist="38100" dir="2700000" algn="tl">
+                  <a:srgbClr val="000000">
+                    <a:alpha val="43137"/>
+                  </a:srgbClr>
+                </a:outerShdw>
+              </a:effectLst>
+              <a:latin typeface="Century Gothic" panose="020B0502020202020204" pitchFamily="34" charset="0"/>
+            </a:endParaRPr>
           </a:p>
         </p:txBody>
       </p:sp>
       <p:sp>
         <p:nvSpPr>
-          <p:cNvPr id="6" name="Прямоугольник 5"/>
+          <p:cNvPr id="8" name="Прямоугольник 7">
+            <a:extLst>
+              <a:ext uri="{FF2B5EF4-FFF2-40B4-BE49-F238E27FC236}">
+                <a16:creationId xmlns:a16="http://schemas.microsoft.com/office/drawing/2014/main" id="{D227F79E-6812-A733-0156-6F0C6A0369C6}"/>
+              </a:ext>
+            </a:extLst>
+          </p:cNvPr>
           <p:cNvSpPr/>
           <p:nvPr/>
         </p:nvSpPr>
         <p:spPr>
           <a:xfrm>
-            <a:off x="295702" y="1065424"/>
-            <a:ext cx="11600596" cy="5478423"/>
+            <a:off x="109183" y="1041023"/>
+            <a:ext cx="12082817" cy="586314"/>
+          </a:xfrm>
+          <a:prstGeom prst="rect">
+            <a:avLst/>
+          </a:prstGeom>
+        </p:spPr>
+        <p:txBody>
+          <a:bodyPr wrap="square">
+            <a:spAutoFit/>
+          </a:bodyPr>
+          <a:lstStyle/>
+          <a:p>
+            <a:pPr algn="just">
+              <a:lnSpc>
+                <a:spcPct val="150000"/>
+              </a:lnSpc>
+            </a:pPr>
+            <a:r>
+              <a:rPr lang="ru-RU" sz="2400" dirty="0"/>
+              <a:t>	</a:t>
+            </a:r>
+            <a:endParaRPr lang="ru-RU" sz="2000" dirty="0">
+              <a:latin typeface="Century Gothic" panose="020B0502020202020204" pitchFamily="34" charset="0"/>
+            </a:endParaRPr>
+          </a:p>
+        </p:txBody>
+      </p:sp>
+      <p:sp>
+        <p:nvSpPr>
+          <p:cNvPr id="22" name="Прямоугольник 5"/>
+          <p:cNvSpPr/>
+          <p:nvPr/>
+        </p:nvSpPr>
+        <p:spPr>
+          <a:xfrm>
+            <a:off x="295702" y="1616374"/>
+            <a:ext cx="11600596" cy="4555093"/>
           </a:xfrm>
           <a:prstGeom prst="rect">
             <a:avLst/>
@@ -6915,8 +7318,85 @@
                 <a:ea typeface="Calibri" panose="020F0502020204030204" pitchFamily="34" charset="0"/>
                 <a:cs typeface="Times New Roman" panose="02020603050405020304" pitchFamily="18" charset="0"/>
               </a:rPr>
-              <a:t>Использование автоматизированной системы мониторинга и управления технологическим процессом на ЛПЦ-4 ПАО «ММК» даст предприятию такие возможности как: </a:t>
-            </a:r>
+              <a:t> Автоматизация работы программного продукта </a:t>
+            </a:r>
+            <a:r>
+              <a:rPr lang="en-US" altLang="ru-RU" sz="2000" dirty="0" err="1">
+                <a:latin typeface="Century Gothic" panose="020B0502020202020204" pitchFamily="34" charset="0"/>
+                <a:ea typeface="Calibri" panose="020F0502020204030204" pitchFamily="34" charset="0"/>
+                <a:cs typeface="Times New Roman" panose="02020603050405020304" pitchFamily="18" charset="0"/>
+              </a:rPr>
+              <a:t>TranzWare</a:t>
+            </a:r>
+            <a:r>
+              <a:rPr lang="en-US" altLang="ru-RU" sz="2000" dirty="0">
+                <a:latin typeface="Century Gothic" panose="020B0502020202020204" pitchFamily="34" charset="0"/>
+                <a:ea typeface="Calibri" panose="020F0502020204030204" pitchFamily="34" charset="0"/>
+                <a:cs typeface="Times New Roman" panose="02020603050405020304" pitchFamily="18" charset="0"/>
+              </a:rPr>
+              <a:t> </a:t>
+            </a:r>
+            <a:r>
+              <a:rPr lang="en-US" altLang="ru-RU" sz="2000" dirty="0" err="1">
+                <a:latin typeface="Century Gothic" panose="020B0502020202020204" pitchFamily="34" charset="0"/>
+                <a:ea typeface="Calibri" panose="020F0502020204030204" pitchFamily="34" charset="0"/>
+                <a:cs typeface="Times New Roman" panose="02020603050405020304" pitchFamily="18" charset="0"/>
+              </a:rPr>
+              <a:t>CardFactory</a:t>
+            </a:r>
+            <a:r>
+              <a:rPr lang="ru-RU" altLang="ru-RU" sz="2000" dirty="0">
+                <a:latin typeface="Century Gothic" panose="020B0502020202020204" pitchFamily="34" charset="0"/>
+                <a:ea typeface="Calibri" panose="020F0502020204030204" pitchFamily="34" charset="0"/>
+                <a:cs typeface="Times New Roman" panose="02020603050405020304" pitchFamily="18" charset="0"/>
+              </a:rPr>
+              <a:t> с кардридерным модулем эмбоссера </a:t>
+            </a:r>
+            <a:r>
+              <a:rPr lang="en-US" altLang="ru-RU" sz="2000" dirty="0">
+                <a:latin typeface="Century Gothic" panose="020B0502020202020204" pitchFamily="34" charset="0"/>
+                <a:ea typeface="Calibri" panose="020F0502020204030204" pitchFamily="34" charset="0"/>
+                <a:cs typeface="Times New Roman" panose="02020603050405020304" pitchFamily="18" charset="0"/>
+              </a:rPr>
+              <a:t>MATICA </a:t>
+            </a:r>
+            <a:r>
+              <a:rPr lang="ru-RU" altLang="ru-RU" sz="2000" dirty="0" smtClean="0">
+                <a:latin typeface="Century Gothic" panose="020B0502020202020204" pitchFamily="34" charset="0"/>
+                <a:ea typeface="Calibri" panose="020F0502020204030204" pitchFamily="34" charset="0"/>
+                <a:cs typeface="Times New Roman" panose="02020603050405020304" pitchFamily="18" charset="0"/>
+              </a:rPr>
+              <a:t>даст компании ООО «</a:t>
+            </a:r>
+            <a:r>
+              <a:rPr lang="en-US" altLang="ru-RU" sz="2000" dirty="0" smtClean="0">
+                <a:latin typeface="Century Gothic" panose="020B0502020202020204" pitchFamily="34" charset="0"/>
+                <a:ea typeface="Calibri" panose="020F0502020204030204" pitchFamily="34" charset="0"/>
+                <a:cs typeface="Times New Roman" panose="02020603050405020304" pitchFamily="18" charset="0"/>
+              </a:rPr>
+              <a:t>Compass Plus</a:t>
+            </a:r>
+            <a:r>
+              <a:rPr lang="ru-RU" altLang="ru-RU" sz="2000" dirty="0" smtClean="0">
+                <a:latin typeface="Century Gothic" panose="020B0502020202020204" pitchFamily="34" charset="0"/>
+                <a:ea typeface="Calibri" panose="020F0502020204030204" pitchFamily="34" charset="0"/>
+                <a:cs typeface="Times New Roman" panose="02020603050405020304" pitchFamily="18" charset="0"/>
+              </a:rPr>
+              <a:t>» и ее клиентам такие преимущества как</a:t>
+            </a:r>
+            <a:r>
+              <a:rPr lang="ru-RU" altLang="ru-RU" sz="2000" dirty="0" smtClean="0">
+                <a:latin typeface="Century Gothic" panose="020B0502020202020204" pitchFamily="34" charset="0"/>
+                <a:ea typeface="Calibri" panose="020F0502020204030204" pitchFamily="34" charset="0"/>
+                <a:cs typeface="Times New Roman" panose="02020603050405020304" pitchFamily="18" charset="0"/>
+              </a:rPr>
+              <a:t>: </a:t>
+            </a:r>
+            <a:endParaRPr lang="ru-RU" altLang="ru-RU" sz="2000" dirty="0">
+              <a:latin typeface="Century Gothic" panose="020B0502020202020204" pitchFamily="34" charset="0"/>
+              <a:ea typeface="Calibri" panose="020F0502020204030204" pitchFamily="34" charset="0"/>
+              <a:cs typeface="Times New Roman" panose="02020603050405020304" pitchFamily="18" charset="0"/>
+            </a:endParaRPr>
           </a:p>
           <a:p>
             <a:pPr marL="342900" indent="-342900" algn="just">
@@ -6931,13 +7411,34 @@
               <a:defRPr/>
             </a:pPr>
             <a:r>
-              <a:rPr lang="ru-RU" altLang="ru-RU" sz="2000" dirty="0">
+              <a:rPr lang="ru-RU" altLang="ru-RU" sz="2000" dirty="0" smtClean="0">
                 <a:latin typeface="Century Gothic" panose="020B0502020202020204" pitchFamily="34" charset="0"/>
                 <a:ea typeface="Calibri" panose="020F0502020204030204" pitchFamily="34" charset="0"/>
                 <a:cs typeface="Times New Roman" panose="02020603050405020304" pitchFamily="18" charset="0"/>
               </a:rPr>
-              <a:t>Обеспечение пользователей непрерывной, актуальной и оперативной информацией о данных технологического процесса производства;</a:t>
-            </a:r>
+              <a:t>Повышение скорости выпуска карт при использовании эмбоссеров </a:t>
+            </a:r>
+            <a:r>
+              <a:rPr lang="en-US" altLang="ru-RU" sz="2000" dirty="0" smtClean="0">
+                <a:latin typeface="Century Gothic" panose="020B0502020202020204" pitchFamily="34" charset="0"/>
+                <a:ea typeface="Calibri" panose="020F0502020204030204" pitchFamily="34" charset="0"/>
+                <a:cs typeface="Times New Roman" panose="02020603050405020304" pitchFamily="18" charset="0"/>
+              </a:rPr>
+              <a:t>MATICA</a:t>
+            </a:r>
+            <a:r>
+              <a:rPr lang="ru-RU" altLang="ru-RU" sz="2000" dirty="0" smtClean="0">
+                <a:latin typeface="Century Gothic" panose="020B0502020202020204" pitchFamily="34" charset="0"/>
+                <a:ea typeface="Calibri" panose="020F0502020204030204" pitchFamily="34" charset="0"/>
+                <a:cs typeface="Times New Roman" panose="02020603050405020304" pitchFamily="18" charset="0"/>
+              </a:rPr>
+              <a:t>;</a:t>
+            </a:r>
+            <a:endParaRPr lang="ru-RU" altLang="ru-RU" sz="2000" dirty="0">
+              <a:latin typeface="Century Gothic" panose="020B0502020202020204" pitchFamily="34" charset="0"/>
+              <a:ea typeface="Calibri" panose="020F0502020204030204" pitchFamily="34" charset="0"/>
+              <a:cs typeface="Times New Roman" panose="02020603050405020304" pitchFamily="18" charset="0"/>
+            </a:endParaRPr>
           </a:p>
           <a:p>
             <a:pPr marL="342900" indent="-342900" algn="just">
@@ -6952,13 +7453,26 @@
               <a:defRPr/>
             </a:pPr>
             <a:r>
-              <a:rPr lang="ru-RU" altLang="ru-RU" sz="2000" dirty="0">
+              <a:rPr lang="ru-RU" altLang="ru-RU" sz="2000" dirty="0" smtClean="0">
                 <a:latin typeface="Century Gothic" panose="020B0502020202020204" pitchFamily="34" charset="0"/>
                 <a:ea typeface="Calibri" panose="020F0502020204030204" pitchFamily="34" charset="0"/>
                 <a:cs typeface="Times New Roman" panose="02020603050405020304" pitchFamily="18" charset="0"/>
               </a:rPr>
-              <a:t>Возможность ввода и редактирования первичных данных при необходимости;</a:t>
-            </a:r>
+              <a:t>Отсутствие необходимости отдельно производить запись информации на чип, весь процесс персонализации будет происходить непрерывно</a:t>
+            </a:r>
+            <a:r>
+              <a:rPr lang="ru-RU" altLang="ru-RU" sz="2000" dirty="0" smtClean="0">
+                <a:latin typeface="Century Gothic" panose="020B0502020202020204" pitchFamily="34" charset="0"/>
+                <a:ea typeface="Calibri" panose="020F0502020204030204" pitchFamily="34" charset="0"/>
+                <a:cs typeface="Times New Roman" panose="02020603050405020304" pitchFamily="18" charset="0"/>
+              </a:rPr>
+              <a:t>;</a:t>
+            </a:r>
+            <a:endParaRPr lang="ru-RU" altLang="ru-RU" sz="2000" dirty="0">
+              <a:latin typeface="Century Gothic" panose="020B0502020202020204" pitchFamily="34" charset="0"/>
+              <a:ea typeface="Calibri" panose="020F0502020204030204" pitchFamily="34" charset="0"/>
+              <a:cs typeface="Times New Roman" panose="02020603050405020304" pitchFamily="18" charset="0"/>
+            </a:endParaRPr>
           </a:p>
           <a:p>
             <a:pPr marL="342900" indent="-342900" algn="just">
@@ -6973,13 +7487,18 @@
               <a:defRPr/>
             </a:pPr>
             <a:r>
-              <a:rPr lang="ru-RU" altLang="ru-RU" sz="2000" dirty="0">
+              <a:rPr lang="ru-RU" altLang="ru-RU" sz="2000" dirty="0" smtClean="0">
                 <a:latin typeface="Century Gothic" panose="020B0502020202020204" pitchFamily="34" charset="0"/>
                 <a:ea typeface="Calibri" panose="020F0502020204030204" pitchFamily="34" charset="0"/>
                 <a:cs typeface="Times New Roman" panose="02020603050405020304" pitchFamily="18" charset="0"/>
               </a:rPr>
-              <a:t>Возможность редактирования уставных значение и состояний агрегатов прокатного стана;</a:t>
-            </a:r>
+              <a:t>Возможность удаленной работы с кардридерным модулем;</a:t>
+            </a:r>
+            <a:endParaRPr lang="ru-RU" altLang="ru-RU" sz="2000" dirty="0">
+              <a:latin typeface="Century Gothic" panose="020B0502020202020204" pitchFamily="34" charset="0"/>
+              <a:ea typeface="Calibri" panose="020F0502020204030204" pitchFamily="34" charset="0"/>
+              <a:cs typeface="Times New Roman" panose="02020603050405020304" pitchFamily="18" charset="0"/>
+            </a:endParaRPr>
           </a:p>
           <a:p>
             <a:pPr marL="342900" indent="-342900" algn="just">
@@ -6994,20 +7513,25 @@
               <a:defRPr/>
             </a:pPr>
             <a:r>
-              <a:rPr lang="ru-RU" altLang="ru-RU" sz="2000" dirty="0">
+              <a:rPr lang="ru-RU" altLang="ru-RU" sz="2000" dirty="0" smtClean="0">
                 <a:latin typeface="Century Gothic" panose="020B0502020202020204" pitchFamily="34" charset="0"/>
                 <a:ea typeface="Calibri" panose="020F0502020204030204" pitchFamily="34" charset="0"/>
                 <a:cs typeface="Times New Roman" panose="02020603050405020304" pitchFamily="18" charset="0"/>
               </a:rPr>
-              <a:t>Повышение эффективности работы стана за счет контроля перемещения слябов по линиям загрузки, состояния карты печей и связи со всеми системами автоматизации;</a:t>
-            </a:r>
+              <a:t>Возможность изменения настроек кардридерного модуля внутри собственного продукта;</a:t>
+            </a:r>
+            <a:endParaRPr lang="ru-RU" altLang="ru-RU" sz="2000" dirty="0">
+              <a:latin typeface="Century Gothic" panose="020B0502020202020204" pitchFamily="34" charset="0"/>
+              <a:ea typeface="Calibri" panose="020F0502020204030204" pitchFamily="34" charset="0"/>
+              <a:cs typeface="Times New Roman" panose="02020603050405020304" pitchFamily="18" charset="0"/>
+            </a:endParaRPr>
           </a:p>
         </p:txBody>
       </p:sp>
     </p:spTree>
     <p:extLst>
       <p:ext uri="{BB962C8B-B14F-4D97-AF65-F5344CB8AC3E}">
-        <p14:creationId xmlns:p14="http://schemas.microsoft.com/office/powerpoint/2010/main" val="3299038286"/>
+        <p14:creationId xmlns:p14="http://schemas.microsoft.com/office/powerpoint/2010/main" val="1353992015"/>
       </p:ext>
     </p:extLst>
   </p:cSld>
@@ -7018,263 +7542,6 @@
 </file>
 
 <file path=ppt/slides/slide13.xml><?xml version="1.0" encoding="utf-8"?>
-<p:sld xmlns:a="http://schemas.openxmlformats.org/drawingml/2006/main" xmlns:r="http://schemas.openxmlformats.org/officeDocument/2006/relationships" xmlns:p="http://schemas.openxmlformats.org/presentationml/2006/main">
-  <p:cSld>
-    <p:spTree>
-      <p:nvGrpSpPr>
-        <p:cNvPr id="1" name=""/>
-        <p:cNvGrpSpPr/>
-        <p:nvPr/>
-      </p:nvGrpSpPr>
-      <p:grpSpPr>
-        <a:xfrm>
-          <a:off x="0" y="0"/>
-          <a:ext cx="0" cy="0"/>
-          <a:chOff x="0" y="0"/>
-          <a:chExt cx="0" cy="0"/>
-        </a:xfrm>
-      </p:grpSpPr>
-      <p:pic>
-        <p:nvPicPr>
-          <p:cNvPr id="2" name="Picture 2" descr="C:\Users\Андрей\Desktop\1\Безымянный-1.png"/>
-          <p:cNvPicPr>
-            <a:picLocks noChangeAspect="1" noChangeArrowheads="1"/>
-          </p:cNvPicPr>
-          <p:nvPr/>
-        </p:nvPicPr>
-        <p:blipFill>
-          <a:blip r:embed="rId2">
-            <a:extLst>
-              <a:ext uri="{28A0092B-C50C-407E-A947-70E740481C1C}">
-                <a14:useLocalDpi xmlns:a14="http://schemas.microsoft.com/office/drawing/2010/main" val="0"/>
-              </a:ext>
-            </a:extLst>
-          </a:blip>
-          <a:srcRect/>
-          <a:stretch>
-            <a:fillRect/>
-          </a:stretch>
-        </p:blipFill>
-        <p:spPr bwMode="auto">
-          <a:xfrm>
-            <a:off x="0" y="0"/>
-            <a:ext cx="12192000" cy="982639"/>
-          </a:xfrm>
-          <a:prstGeom prst="rect">
-            <a:avLst/>
-          </a:prstGeom>
-          <a:noFill/>
-          <a:ln>
-            <a:noFill/>
-          </a:ln>
-          <a:extLst>
-            <a:ext uri="{909E8E84-426E-40DD-AFC4-6F175D3DCCD1}">
-              <a14:hiddenFill xmlns:a14="http://schemas.microsoft.com/office/drawing/2010/main">
-                <a:solidFill>
-                  <a:srgbClr val="FFFFFF"/>
-                </a:solidFill>
-              </a14:hiddenFill>
-            </a:ext>
-            <a:ext uri="{91240B29-F687-4F45-9708-019B960494DF}">
-              <a14:hiddenLine xmlns:a14="http://schemas.microsoft.com/office/drawing/2010/main" w="9525">
-                <a:solidFill>
-                  <a:srgbClr val="000000"/>
-                </a:solidFill>
-                <a:miter lim="800000"/>
-                <a:headEnd/>
-                <a:tailEnd/>
-              </a14:hiddenLine>
-            </a:ext>
-          </a:extLst>
-        </p:spPr>
-      </p:pic>
-      <p:sp>
-        <p:nvSpPr>
-          <p:cNvPr id="5" name="TextBox 4"/>
-          <p:cNvSpPr txBox="1"/>
-          <p:nvPr/>
-        </p:nvSpPr>
-        <p:spPr>
-          <a:xfrm>
-            <a:off x="4612943" y="450376"/>
-            <a:ext cx="184731" cy="369332"/>
-          </a:xfrm>
-          <a:prstGeom prst="rect">
-            <a:avLst/>
-          </a:prstGeom>
-          <a:noFill/>
-        </p:spPr>
-        <p:txBody>
-          <a:bodyPr wrap="none" rtlCol="0">
-            <a:spAutoFit/>
-          </a:bodyPr>
-          <a:lstStyle/>
-          <a:p>
-            <a:endParaRPr lang="ru-RU" dirty="0"/>
-          </a:p>
-        </p:txBody>
-      </p:sp>
-      <p:sp>
-        <p:nvSpPr>
-          <p:cNvPr id="7" name="TextBox 6"/>
-          <p:cNvSpPr txBox="1"/>
-          <p:nvPr/>
-        </p:nvSpPr>
-        <p:spPr>
-          <a:xfrm>
-            <a:off x="1770145" y="82785"/>
-            <a:ext cx="8651728" cy="707886"/>
-          </a:xfrm>
-          <a:prstGeom prst="rect">
-            <a:avLst/>
-          </a:prstGeom>
-          <a:noFill/>
-        </p:spPr>
-        <p:txBody>
-          <a:bodyPr wrap="none" rtlCol="0">
-            <a:spAutoFit/>
-          </a:bodyPr>
-          <a:lstStyle/>
-          <a:p>
-            <a:pPr algn="ctr"/>
-            <a:r>
-              <a:rPr lang="ru-RU" sz="4000" dirty="0">
-                <a:solidFill>
-                  <a:schemeClr val="bg1">
-                    <a:lumMod val="95000"/>
-                  </a:schemeClr>
-                </a:solidFill>
-                <a:effectLst>
-                  <a:outerShdw blurRad="38100" dist="38100" dir="2700000" algn="tl">
-                    <a:srgbClr val="000000">
-                      <a:alpha val="43137"/>
-                    </a:srgbClr>
-                  </a:outerShdw>
-                </a:effectLst>
-                <a:latin typeface="Century Gothic" panose="020B0502020202020204" pitchFamily="34" charset="0"/>
-              </a:rPr>
-              <a:t>Публикации за период обучения</a:t>
-            </a:r>
-          </a:p>
-        </p:txBody>
-      </p:sp>
-      <p:sp>
-        <p:nvSpPr>
-          <p:cNvPr id="8" name="Прямоугольник 7"/>
-          <p:cNvSpPr/>
-          <p:nvPr/>
-        </p:nvSpPr>
-        <p:spPr>
-          <a:xfrm>
-            <a:off x="354843" y="1187299"/>
-            <a:ext cx="11600596" cy="5632311"/>
-          </a:xfrm>
-          <a:prstGeom prst="rect">
-            <a:avLst/>
-          </a:prstGeom>
-        </p:spPr>
-        <p:txBody>
-          <a:bodyPr wrap="square">
-            <a:spAutoFit/>
-          </a:bodyPr>
-          <a:lstStyle/>
-          <a:p>
-            <a:pPr algn="just">
-              <a:lnSpc>
-                <a:spcPct val="150000"/>
-              </a:lnSpc>
-              <a:spcAft>
-                <a:spcPts val="1200"/>
-              </a:spcAft>
-              <a:defRPr/>
-            </a:pPr>
-            <a:r>
-              <a:rPr lang="en-US" altLang="ru-RU" sz="1700" dirty="0">
-                <a:latin typeface="Century Gothic" panose="020B0502020202020204" pitchFamily="34" charset="0"/>
-                <a:ea typeface="Calibri" panose="020F0502020204030204" pitchFamily="34" charset="0"/>
-                <a:cs typeface="Times New Roman" panose="02020603050405020304" pitchFamily="18" charset="0"/>
-              </a:rPr>
-              <a:t>	</a:t>
-            </a:r>
-            <a:r>
-              <a:rPr lang="ru-RU" altLang="ru-RU" sz="2000" dirty="0">
-                <a:latin typeface="Century Gothic" panose="020B0502020202020204" pitchFamily="34" charset="0"/>
-                <a:ea typeface="Calibri" panose="020F0502020204030204" pitchFamily="34" charset="0"/>
-                <a:cs typeface="Times New Roman" panose="02020603050405020304" pitchFamily="18" charset="0"/>
-              </a:rPr>
-              <a:t>1.	Калюжная А. В. Мониторинг в непрерывном производстве / Калюжная А.В., Егорова Л. Г. // Передовые инновационные разработки. Перспективы и опыт использования, проблемы внедрения в производство – М.: «Конверт». – 2019. – 100-101 с.</a:t>
-            </a:r>
-          </a:p>
-          <a:p>
-            <a:pPr algn="just">
-              <a:lnSpc>
-                <a:spcPct val="150000"/>
-              </a:lnSpc>
-              <a:spcAft>
-                <a:spcPts val="1200"/>
-              </a:spcAft>
-              <a:defRPr/>
-            </a:pPr>
-            <a:r>
-              <a:rPr lang="ru-RU" altLang="ru-RU" sz="2000" dirty="0">
-                <a:latin typeface="Century Gothic" panose="020B0502020202020204" pitchFamily="34" charset="0"/>
-                <a:ea typeface="Calibri" panose="020F0502020204030204" pitchFamily="34" charset="0"/>
-                <a:cs typeface="Times New Roman" panose="02020603050405020304" pitchFamily="18" charset="0"/>
-              </a:rPr>
-              <a:t>	2. 	Калюжная А. В. Автоматизация мониторинга непрерывного производства / Калюжная А.В., Егорова Л. Г. // Тезисы 77-й международной научно-технической конференции «актуальные проблемы современной науки, техники и образования». – Мгн, 2019. – 354 с.</a:t>
-            </a:r>
-          </a:p>
-          <a:p>
-            <a:pPr algn="just">
-              <a:lnSpc>
-                <a:spcPct val="150000"/>
-              </a:lnSpc>
-              <a:spcAft>
-                <a:spcPts val="1200"/>
-              </a:spcAft>
-              <a:defRPr/>
-            </a:pPr>
-            <a:r>
-              <a:rPr lang="ru-RU" altLang="ru-RU" sz="2000" dirty="0">
-                <a:latin typeface="Century Gothic" panose="020B0502020202020204" pitchFamily="34" charset="0"/>
-                <a:ea typeface="Calibri" panose="020F0502020204030204" pitchFamily="34" charset="0"/>
-                <a:cs typeface="Times New Roman" panose="02020603050405020304" pitchFamily="18" charset="0"/>
-              </a:rPr>
-              <a:t>	3. Калюжная А. В. Реинжиниринг бизнес-процессов предприятия на основе нотации BPMN // Сборник научных трудов XXI-й Российской научной конференции. Том 1. 26-28 апреля 2018 г. – М.: ФГБОУ ВО «РЭУ им. Г. В. Плеханова». – 2018. – 68-72 с.</a:t>
-            </a:r>
-          </a:p>
-          <a:p>
-            <a:pPr algn="just">
-              <a:lnSpc>
-                <a:spcPct val="150000"/>
-              </a:lnSpc>
-              <a:defRPr/>
-            </a:pPr>
-            <a:r>
-              <a:rPr lang="ru-RU" altLang="ru-RU" sz="2000" dirty="0">
-                <a:latin typeface="Century Gothic" panose="020B0502020202020204" pitchFamily="34" charset="0"/>
-                <a:ea typeface="Calibri" panose="020F0502020204030204" pitchFamily="34" charset="0"/>
-                <a:cs typeface="Times New Roman" panose="02020603050405020304" pitchFamily="18" charset="0"/>
-              </a:rPr>
-              <a:t> </a:t>
-            </a:r>
-          </a:p>
-        </p:txBody>
-      </p:sp>
-    </p:spTree>
-    <p:extLst>
-      <p:ext uri="{BB962C8B-B14F-4D97-AF65-F5344CB8AC3E}">
-        <p14:creationId xmlns:p14="http://schemas.microsoft.com/office/powerpoint/2010/main" val="628272190"/>
-      </p:ext>
-    </p:extLst>
-  </p:cSld>
-  <p:clrMapOvr>
-    <a:masterClrMapping/>
-  </p:clrMapOvr>
-</p:sld>
-</file>
-
-<file path=ppt/slides/slide14.xml><?xml version="1.0" encoding="utf-8"?>
 <p:sld xmlns:a="http://schemas.openxmlformats.org/drawingml/2006/main" xmlns:r="http://schemas.openxmlformats.org/officeDocument/2006/relationships" xmlns:p="http://schemas.openxmlformats.org/presentationml/2006/main">
   <p:cSld>
     <p:spTree>

</xml_diff>